<commit_message>
aggiunte di poco conto
</commit_message>
<xml_diff>
--- a/ArchitetturaInformale/ArchGen.pptx
+++ b/ArchitetturaInformale/ArchGen.pptx
@@ -8,6 +8,7 @@
     <p:sldId id="256" r:id="rId2"/>
     <p:sldId id="257" r:id="rId3"/>
     <p:sldId id="258" r:id="rId4"/>
+    <p:sldId id="259" r:id="rId5"/>
   </p:sldIdLst>
   <p:sldSz cx="9144000" cy="6858000" type="screen4x3"/>
   <p:notesSz cx="6858000" cy="9144000"/>
@@ -290,7 +291,7 @@
           <a:p>
             <a:fld id="{7F49D355-16BD-4E45-BD9A-5EA878CF7CBD}" type="datetimeFigureOut">
               <a:rPr lang="it-IT" smtClean="0"/>
-              <a:t>23/06/2018</a:t>
+              <a:t>29/06/2018</a:t>
             </a:fld>
             <a:endParaRPr lang="it-IT"/>
           </a:p>
@@ -455,7 +456,7 @@
           <a:p>
             <a:fld id="{7F49D355-16BD-4E45-BD9A-5EA878CF7CBD}" type="datetimeFigureOut">
               <a:rPr lang="it-IT" smtClean="0"/>
-              <a:t>23/06/2018</a:t>
+              <a:t>29/06/2018</a:t>
             </a:fld>
             <a:endParaRPr lang="it-IT"/>
           </a:p>
@@ -630,7 +631,7 @@
           <a:p>
             <a:fld id="{7F49D355-16BD-4E45-BD9A-5EA878CF7CBD}" type="datetimeFigureOut">
               <a:rPr lang="it-IT" smtClean="0"/>
-              <a:t>23/06/2018</a:t>
+              <a:t>29/06/2018</a:t>
             </a:fld>
             <a:endParaRPr lang="it-IT"/>
           </a:p>
@@ -795,7 +796,7 @@
           <a:p>
             <a:fld id="{7F49D355-16BD-4E45-BD9A-5EA878CF7CBD}" type="datetimeFigureOut">
               <a:rPr lang="it-IT" smtClean="0"/>
-              <a:t>23/06/2018</a:t>
+              <a:t>29/06/2018</a:t>
             </a:fld>
             <a:endParaRPr lang="it-IT"/>
           </a:p>
@@ -1036,7 +1037,7 @@
           <a:p>
             <a:fld id="{7F49D355-16BD-4E45-BD9A-5EA878CF7CBD}" type="datetimeFigureOut">
               <a:rPr lang="it-IT" smtClean="0"/>
-              <a:t>23/06/2018</a:t>
+              <a:t>29/06/2018</a:t>
             </a:fld>
             <a:endParaRPr lang="it-IT"/>
           </a:p>
@@ -1319,7 +1320,7 @@
           <a:p>
             <a:fld id="{7F49D355-16BD-4E45-BD9A-5EA878CF7CBD}" type="datetimeFigureOut">
               <a:rPr lang="it-IT" smtClean="0"/>
-              <a:t>23/06/2018</a:t>
+              <a:t>29/06/2018</a:t>
             </a:fld>
             <a:endParaRPr lang="it-IT"/>
           </a:p>
@@ -1736,7 +1737,7 @@
           <a:p>
             <a:fld id="{7F49D355-16BD-4E45-BD9A-5EA878CF7CBD}" type="datetimeFigureOut">
               <a:rPr lang="it-IT" smtClean="0"/>
-              <a:t>23/06/2018</a:t>
+              <a:t>29/06/2018</a:t>
             </a:fld>
             <a:endParaRPr lang="it-IT"/>
           </a:p>
@@ -1849,7 +1850,7 @@
           <a:p>
             <a:fld id="{7F49D355-16BD-4E45-BD9A-5EA878CF7CBD}" type="datetimeFigureOut">
               <a:rPr lang="it-IT" smtClean="0"/>
-              <a:t>23/06/2018</a:t>
+              <a:t>29/06/2018</a:t>
             </a:fld>
             <a:endParaRPr lang="it-IT"/>
           </a:p>
@@ -1939,7 +1940,7 @@
           <a:p>
             <a:fld id="{7F49D355-16BD-4E45-BD9A-5EA878CF7CBD}" type="datetimeFigureOut">
               <a:rPr lang="it-IT" smtClean="0"/>
-              <a:t>23/06/2018</a:t>
+              <a:t>29/06/2018</a:t>
             </a:fld>
             <a:endParaRPr lang="it-IT"/>
           </a:p>
@@ -2211,7 +2212,7 @@
           <a:p>
             <a:fld id="{7F49D355-16BD-4E45-BD9A-5EA878CF7CBD}" type="datetimeFigureOut">
               <a:rPr lang="it-IT" smtClean="0"/>
-              <a:t>23/06/2018</a:t>
+              <a:t>29/06/2018</a:t>
             </a:fld>
             <a:endParaRPr lang="it-IT"/>
           </a:p>
@@ -2459,7 +2460,7 @@
           <a:p>
             <a:fld id="{7F49D355-16BD-4E45-BD9A-5EA878CF7CBD}" type="datetimeFigureOut">
               <a:rPr lang="it-IT" smtClean="0"/>
-              <a:t>23/06/2018</a:t>
+              <a:t>29/06/2018</a:t>
             </a:fld>
             <a:endParaRPr lang="it-IT"/>
           </a:p>
@@ -2667,7 +2668,7 @@
           <a:p>
             <a:fld id="{7F49D355-16BD-4E45-BD9A-5EA878CF7CBD}" type="datetimeFigureOut">
               <a:rPr lang="it-IT" smtClean="0"/>
-              <a:t>23/06/2018</a:t>
+              <a:t>29/06/2018</a:t>
             </a:fld>
             <a:endParaRPr lang="it-IT"/>
           </a:p>
@@ -5618,6 +5619,1377 @@
     <p:extLst>
       <p:ext uri="{BB962C8B-B14F-4D97-AF65-F5344CB8AC3E}">
         <p14:creationId xmlns:p14="http://schemas.microsoft.com/office/powerpoint/2010/main" val="2470554592"/>
+      </p:ext>
+    </p:extLst>
+  </p:cSld>
+  <p:clrMapOvr>
+    <a:masterClrMapping/>
+  </p:clrMapOvr>
+</p:sld>
+</file>
+
+<file path=ppt/slides/slide4.xml><?xml version="1.0" encoding="utf-8"?>
+<p:sld xmlns:a="http://schemas.openxmlformats.org/drawingml/2006/main" xmlns:r="http://schemas.openxmlformats.org/officeDocument/2006/relationships" xmlns:p="http://schemas.openxmlformats.org/presentationml/2006/main">
+  <p:cSld>
+    <p:spTree>
+      <p:nvGrpSpPr>
+        <p:cNvPr id="1" name=""/>
+        <p:cNvGrpSpPr/>
+        <p:nvPr/>
+      </p:nvGrpSpPr>
+      <p:grpSpPr>
+        <a:xfrm>
+          <a:off x="0" y="0"/>
+          <a:ext cx="0" cy="0"/>
+          <a:chOff x="0" y="0"/>
+          <a:chExt cx="0" cy="0"/>
+        </a:xfrm>
+      </p:grpSpPr>
+      <p:sp>
+        <p:nvSpPr>
+          <p:cNvPr id="4" name="Rettangolo 3"/>
+          <p:cNvSpPr/>
+          <p:nvPr/>
+        </p:nvSpPr>
+        <p:spPr>
+          <a:xfrm>
+            <a:off x="2285746" y="1426319"/>
+            <a:ext cx="4752528" cy="3816424"/>
+          </a:xfrm>
+          <a:prstGeom prst="rect">
+            <a:avLst/>
+          </a:prstGeom>
+          <a:ln>
+            <a:solidFill>
+              <a:schemeClr val="tx2"/>
+            </a:solidFill>
+          </a:ln>
+        </p:spPr>
+        <p:style>
+          <a:lnRef idx="2">
+            <a:schemeClr val="accent6"/>
+          </a:lnRef>
+          <a:fillRef idx="1">
+            <a:schemeClr val="lt1"/>
+          </a:fillRef>
+          <a:effectRef idx="0">
+            <a:schemeClr val="accent6"/>
+          </a:effectRef>
+          <a:fontRef idx="minor">
+            <a:schemeClr val="dk1"/>
+          </a:fontRef>
+        </p:style>
+        <p:txBody>
+          <a:bodyPr rtlCol="0" anchor="ctr"/>
+          <a:lstStyle/>
+          <a:p>
+            <a:pPr algn="ctr"/>
+            <a:endParaRPr lang="it-IT"/>
+          </a:p>
+        </p:txBody>
+      </p:sp>
+      <p:sp>
+        <p:nvSpPr>
+          <p:cNvPr id="5" name="Rettangolo 4"/>
+          <p:cNvSpPr/>
+          <p:nvPr/>
+        </p:nvSpPr>
+        <p:spPr>
+          <a:xfrm>
+            <a:off x="7730364" y="1916832"/>
+            <a:ext cx="1296144" cy="864096"/>
+          </a:xfrm>
+          <a:prstGeom prst="rect">
+            <a:avLst/>
+          </a:prstGeom>
+          <a:ln/>
+        </p:spPr>
+        <p:style>
+          <a:lnRef idx="2">
+            <a:schemeClr val="accent6"/>
+          </a:lnRef>
+          <a:fillRef idx="1">
+            <a:schemeClr val="lt1"/>
+          </a:fillRef>
+          <a:effectRef idx="0">
+            <a:schemeClr val="accent6"/>
+          </a:effectRef>
+          <a:fontRef idx="minor">
+            <a:schemeClr val="dk1"/>
+          </a:fontRef>
+        </p:style>
+        <p:txBody>
+          <a:bodyPr rtlCol="0" anchor="ctr"/>
+          <a:lstStyle/>
+          <a:p>
+            <a:pPr algn="ctr"/>
+            <a:r>
+              <a:rPr lang="it-IT" dirty="0" smtClean="0"/>
+              <a:t>Robot</a:t>
+            </a:r>
+          </a:p>
+          <a:p>
+            <a:pPr algn="ctr"/>
+            <a:r>
+              <a:rPr lang="it-IT" dirty="0" smtClean="0"/>
+              <a:t>Fisico</a:t>
+            </a:r>
+          </a:p>
+        </p:txBody>
+      </p:sp>
+      <p:sp>
+        <p:nvSpPr>
+          <p:cNvPr id="7" name="Rettangolo 6"/>
+          <p:cNvSpPr/>
+          <p:nvPr/>
+        </p:nvSpPr>
+        <p:spPr>
+          <a:xfrm>
+            <a:off x="7730364" y="3789040"/>
+            <a:ext cx="1296144" cy="864096"/>
+          </a:xfrm>
+          <a:prstGeom prst="rect">
+            <a:avLst/>
+          </a:prstGeom>
+        </p:spPr>
+        <p:style>
+          <a:lnRef idx="2">
+            <a:schemeClr val="accent6"/>
+          </a:lnRef>
+          <a:fillRef idx="1">
+            <a:schemeClr val="lt1"/>
+          </a:fillRef>
+          <a:effectRef idx="0">
+            <a:schemeClr val="accent6"/>
+          </a:effectRef>
+          <a:fontRef idx="minor">
+            <a:schemeClr val="dk1"/>
+          </a:fontRef>
+        </p:style>
+        <p:txBody>
+          <a:bodyPr rtlCol="0" anchor="ctr"/>
+          <a:lstStyle/>
+          <a:p>
+            <a:pPr algn="ctr"/>
+            <a:r>
+              <a:rPr lang="it-IT" dirty="0" smtClean="0"/>
+              <a:t>Robot</a:t>
+            </a:r>
+          </a:p>
+          <a:p>
+            <a:pPr algn="ctr"/>
+            <a:r>
+              <a:rPr lang="it-IT" dirty="0" smtClean="0"/>
+              <a:t>Virtuale</a:t>
+            </a:r>
+          </a:p>
+        </p:txBody>
+      </p:sp>
+      <p:sp>
+        <p:nvSpPr>
+          <p:cNvPr id="8" name="Rettangolo 7"/>
+          <p:cNvSpPr/>
+          <p:nvPr/>
+        </p:nvSpPr>
+        <p:spPr>
+          <a:xfrm>
+            <a:off x="179512" y="2816932"/>
+            <a:ext cx="1547664" cy="1008112"/>
+          </a:xfrm>
+          <a:prstGeom prst="rect">
+            <a:avLst/>
+          </a:prstGeom>
+          <a:solidFill>
+            <a:schemeClr val="bg1"/>
+          </a:solidFill>
+          <a:ln>
+            <a:solidFill>
+              <a:srgbClr val="00B050"/>
+            </a:solidFill>
+          </a:ln>
+        </p:spPr>
+        <p:style>
+          <a:lnRef idx="2">
+            <a:schemeClr val="accent1">
+              <a:shade val="50000"/>
+            </a:schemeClr>
+          </a:lnRef>
+          <a:fillRef idx="1">
+            <a:schemeClr val="accent1"/>
+          </a:fillRef>
+          <a:effectRef idx="0">
+            <a:schemeClr val="accent1"/>
+          </a:effectRef>
+          <a:fontRef idx="minor">
+            <a:schemeClr val="lt1"/>
+          </a:fontRef>
+        </p:style>
+        <p:txBody>
+          <a:bodyPr rtlCol="0" anchor="ctr"/>
+          <a:lstStyle/>
+          <a:p>
+            <a:pPr algn="ctr"/>
+            <a:r>
+              <a:rPr lang="it-IT" dirty="0" smtClean="0">
+                <a:solidFill>
+                  <a:schemeClr val="tx1"/>
+                </a:solidFill>
+              </a:rPr>
+              <a:t>Utente</a:t>
+            </a:r>
+          </a:p>
+          <a:p>
+            <a:pPr algn="ctr"/>
+            <a:r>
+              <a:rPr lang="it-IT" dirty="0" smtClean="0">
+                <a:solidFill>
+                  <a:schemeClr val="tx1"/>
+                </a:solidFill>
+              </a:rPr>
+              <a:t>Autorizzato</a:t>
+            </a:r>
+            <a:endParaRPr lang="it-IT" dirty="0">
+              <a:solidFill>
+                <a:schemeClr val="tx1"/>
+              </a:solidFill>
+            </a:endParaRPr>
+          </a:p>
+        </p:txBody>
+      </p:sp>
+      <p:cxnSp>
+        <p:nvCxnSpPr>
+          <p:cNvPr id="3" name="Connettore 2 2"/>
+          <p:cNvCxnSpPr>
+            <a:stCxn id="8" idx="3"/>
+            <a:endCxn id="4" idx="1"/>
+          </p:cNvCxnSpPr>
+          <p:nvPr/>
+        </p:nvCxnSpPr>
+        <p:spPr>
+          <a:xfrm>
+            <a:off x="1727176" y="3320988"/>
+            <a:ext cx="558570" cy="13543"/>
+          </a:xfrm>
+          <a:prstGeom prst="straightConnector1">
+            <a:avLst/>
+          </a:prstGeom>
+          <a:ln w="31750">
+            <a:solidFill>
+              <a:schemeClr val="tx2"/>
+            </a:solidFill>
+            <a:headEnd type="arrow"/>
+            <a:tailEnd type="arrow"/>
+          </a:ln>
+        </p:spPr>
+        <p:style>
+          <a:lnRef idx="1">
+            <a:schemeClr val="accent1"/>
+          </a:lnRef>
+          <a:fillRef idx="0">
+            <a:schemeClr val="accent1"/>
+          </a:fillRef>
+          <a:effectRef idx="0">
+            <a:schemeClr val="accent1"/>
+          </a:effectRef>
+          <a:fontRef idx="minor">
+            <a:schemeClr val="tx1"/>
+          </a:fontRef>
+        </p:style>
+      </p:cxnSp>
+      <p:cxnSp>
+        <p:nvCxnSpPr>
+          <p:cNvPr id="9" name="Connettore 2 8"/>
+          <p:cNvCxnSpPr/>
+          <p:nvPr/>
+        </p:nvCxnSpPr>
+        <p:spPr>
+          <a:xfrm>
+            <a:off x="7020272" y="2348880"/>
+            <a:ext cx="710092" cy="0"/>
+          </a:xfrm>
+          <a:prstGeom prst="straightConnector1">
+            <a:avLst/>
+          </a:prstGeom>
+          <a:ln w="31750">
+            <a:solidFill>
+              <a:schemeClr val="tx2"/>
+            </a:solidFill>
+            <a:headEnd type="arrow"/>
+            <a:tailEnd type="arrow"/>
+          </a:ln>
+        </p:spPr>
+        <p:style>
+          <a:lnRef idx="1">
+            <a:schemeClr val="accent1"/>
+          </a:lnRef>
+          <a:fillRef idx="0">
+            <a:schemeClr val="accent1"/>
+          </a:fillRef>
+          <a:effectRef idx="0">
+            <a:schemeClr val="accent1"/>
+          </a:effectRef>
+          <a:fontRef idx="minor">
+            <a:schemeClr val="tx1"/>
+          </a:fontRef>
+        </p:style>
+      </p:cxnSp>
+      <p:cxnSp>
+        <p:nvCxnSpPr>
+          <p:cNvPr id="11" name="Connettore 2 10"/>
+          <p:cNvCxnSpPr/>
+          <p:nvPr/>
+        </p:nvCxnSpPr>
+        <p:spPr>
+          <a:xfrm>
+            <a:off x="7020272" y="4221088"/>
+            <a:ext cx="710092" cy="0"/>
+          </a:xfrm>
+          <a:prstGeom prst="straightConnector1">
+            <a:avLst/>
+          </a:prstGeom>
+          <a:ln w="31750">
+            <a:solidFill>
+              <a:schemeClr val="tx2"/>
+            </a:solidFill>
+            <a:headEnd type="arrow"/>
+            <a:tailEnd type="arrow"/>
+          </a:ln>
+        </p:spPr>
+        <p:style>
+          <a:lnRef idx="1">
+            <a:schemeClr val="accent1"/>
+          </a:lnRef>
+          <a:fillRef idx="0">
+            <a:schemeClr val="accent1"/>
+          </a:fillRef>
+          <a:effectRef idx="0">
+            <a:schemeClr val="accent1"/>
+          </a:effectRef>
+          <a:fontRef idx="minor">
+            <a:schemeClr val="tx1"/>
+          </a:fontRef>
+        </p:style>
+      </p:cxnSp>
+      <p:sp>
+        <p:nvSpPr>
+          <p:cNvPr id="2" name="Ovale 1"/>
+          <p:cNvSpPr/>
+          <p:nvPr/>
+        </p:nvSpPr>
+        <p:spPr>
+          <a:xfrm>
+            <a:off x="2760548" y="3066719"/>
+            <a:ext cx="1269141" cy="608159"/>
+          </a:xfrm>
+          <a:prstGeom prst="ellipse">
+            <a:avLst/>
+          </a:prstGeom>
+          <a:ln>
+            <a:solidFill>
+              <a:schemeClr val="tx2"/>
+            </a:solidFill>
+          </a:ln>
+        </p:spPr>
+        <p:style>
+          <a:lnRef idx="2">
+            <a:schemeClr val="accent6"/>
+          </a:lnRef>
+          <a:fillRef idx="1">
+            <a:schemeClr val="lt1"/>
+          </a:fillRef>
+          <a:effectRef idx="0">
+            <a:schemeClr val="accent6"/>
+          </a:effectRef>
+          <a:fontRef idx="minor">
+            <a:schemeClr val="dk1"/>
+          </a:fontRef>
+        </p:style>
+        <p:txBody>
+          <a:bodyPr rtlCol="0" anchor="ctr"/>
+          <a:lstStyle/>
+          <a:p>
+            <a:pPr algn="ctr"/>
+            <a:r>
+              <a:rPr lang="it-IT" dirty="0" smtClean="0"/>
+              <a:t>Mind</a:t>
+            </a:r>
+            <a:endParaRPr lang="it-IT" dirty="0"/>
+          </a:p>
+        </p:txBody>
+      </p:sp>
+      <p:sp>
+        <p:nvSpPr>
+          <p:cNvPr id="10" name="Ovale 9"/>
+          <p:cNvSpPr/>
+          <p:nvPr/>
+        </p:nvSpPr>
+        <p:spPr>
+          <a:xfrm>
+            <a:off x="5661121" y="3123575"/>
+            <a:ext cx="1241654" cy="864096"/>
+          </a:xfrm>
+          <a:prstGeom prst="ellipse">
+            <a:avLst/>
+          </a:prstGeom>
+          <a:ln>
+            <a:solidFill>
+              <a:schemeClr val="tx2"/>
+            </a:solidFill>
+          </a:ln>
+        </p:spPr>
+        <p:style>
+          <a:lnRef idx="2">
+            <a:schemeClr val="accent6"/>
+          </a:lnRef>
+          <a:fillRef idx="1">
+            <a:schemeClr val="lt1"/>
+          </a:fillRef>
+          <a:effectRef idx="0">
+            <a:schemeClr val="accent6"/>
+          </a:effectRef>
+          <a:fontRef idx="minor">
+            <a:schemeClr val="dk1"/>
+          </a:fontRef>
+        </p:style>
+        <p:txBody>
+          <a:bodyPr rtlCol="0" anchor="ctr"/>
+          <a:lstStyle/>
+          <a:p>
+            <a:pPr algn="ctr"/>
+            <a:r>
+              <a:rPr lang="it-IT" sz="1400" dirty="0" smtClean="0"/>
+              <a:t>Robot</a:t>
+            </a:r>
+          </a:p>
+          <a:p>
+            <a:pPr algn="ctr"/>
+            <a:r>
+              <a:rPr lang="it-IT" sz="1400" dirty="0" smtClean="0"/>
+              <a:t>Executor </a:t>
+            </a:r>
+            <a:endParaRPr lang="it-IT" sz="1400" dirty="0"/>
+          </a:p>
+        </p:txBody>
+      </p:sp>
+      <p:sp>
+        <p:nvSpPr>
+          <p:cNvPr id="6" name="Rettangolo arrotondato 5"/>
+          <p:cNvSpPr/>
+          <p:nvPr/>
+        </p:nvSpPr>
+        <p:spPr>
+          <a:xfrm>
+            <a:off x="2497269" y="1556793"/>
+            <a:ext cx="1989221" cy="914400"/>
+          </a:xfrm>
+          <a:prstGeom prst="roundRect">
+            <a:avLst/>
+          </a:prstGeom>
+          <a:ln>
+            <a:solidFill>
+              <a:schemeClr val="tx2"/>
+            </a:solidFill>
+          </a:ln>
+        </p:spPr>
+        <p:style>
+          <a:lnRef idx="2">
+            <a:schemeClr val="accent6"/>
+          </a:lnRef>
+          <a:fillRef idx="1">
+            <a:schemeClr val="lt1"/>
+          </a:fillRef>
+          <a:effectRef idx="0">
+            <a:schemeClr val="accent6"/>
+          </a:effectRef>
+          <a:fontRef idx="minor">
+            <a:schemeClr val="dk1"/>
+          </a:fontRef>
+        </p:style>
+        <p:txBody>
+          <a:bodyPr rtlCol="0" anchor="ctr"/>
+          <a:lstStyle/>
+          <a:p>
+            <a:pPr algn="ctr"/>
+            <a:r>
+              <a:rPr lang="it-IT" dirty="0" smtClean="0"/>
+              <a:t>Modello</a:t>
+            </a:r>
+            <a:endParaRPr lang="it-IT" dirty="0"/>
+          </a:p>
+        </p:txBody>
+      </p:sp>
+      <p:cxnSp>
+        <p:nvCxnSpPr>
+          <p:cNvPr id="13" name="Connettore 2 12"/>
+          <p:cNvCxnSpPr>
+            <a:stCxn id="2" idx="0"/>
+          </p:cNvCxnSpPr>
+          <p:nvPr/>
+        </p:nvCxnSpPr>
+        <p:spPr>
+          <a:xfrm flipH="1" flipV="1">
+            <a:off x="3395118" y="2454424"/>
+            <a:ext cx="1" cy="612295"/>
+          </a:xfrm>
+          <a:prstGeom prst="straightConnector1">
+            <a:avLst/>
+          </a:prstGeom>
+          <a:ln w="31750">
+            <a:solidFill>
+              <a:schemeClr val="tx2"/>
+            </a:solidFill>
+            <a:headEnd type="arrow"/>
+            <a:tailEnd type="arrow"/>
+          </a:ln>
+        </p:spPr>
+        <p:style>
+          <a:lnRef idx="1">
+            <a:schemeClr val="accent1"/>
+          </a:lnRef>
+          <a:fillRef idx="0">
+            <a:schemeClr val="accent1"/>
+          </a:fillRef>
+          <a:effectRef idx="0">
+            <a:schemeClr val="accent1"/>
+          </a:effectRef>
+          <a:fontRef idx="minor">
+            <a:schemeClr val="tx1"/>
+          </a:fontRef>
+        </p:style>
+      </p:cxnSp>
+      <p:cxnSp>
+        <p:nvCxnSpPr>
+          <p:cNvPr id="15" name="Connettore 2 14"/>
+          <p:cNvCxnSpPr/>
+          <p:nvPr/>
+        </p:nvCxnSpPr>
+        <p:spPr>
+          <a:xfrm flipV="1">
+            <a:off x="3387884" y="3674878"/>
+            <a:ext cx="7235" cy="655969"/>
+          </a:xfrm>
+          <a:prstGeom prst="straightConnector1">
+            <a:avLst/>
+          </a:prstGeom>
+          <a:ln w="31750">
+            <a:solidFill>
+              <a:schemeClr val="tx2"/>
+            </a:solidFill>
+            <a:headEnd type="arrow"/>
+            <a:tailEnd type="arrow"/>
+          </a:ln>
+        </p:spPr>
+        <p:style>
+          <a:lnRef idx="1">
+            <a:schemeClr val="accent1"/>
+          </a:lnRef>
+          <a:fillRef idx="0">
+            <a:schemeClr val="accent1"/>
+          </a:fillRef>
+          <a:effectRef idx="0">
+            <a:schemeClr val="accent1"/>
+          </a:effectRef>
+          <a:fontRef idx="minor">
+            <a:schemeClr val="tx1"/>
+          </a:fontRef>
+        </p:style>
+      </p:cxnSp>
+      <p:sp>
+        <p:nvSpPr>
+          <p:cNvPr id="18" name="Rettangolo 17"/>
+          <p:cNvSpPr/>
+          <p:nvPr/>
+        </p:nvSpPr>
+        <p:spPr>
+          <a:xfrm>
+            <a:off x="116759" y="5571089"/>
+            <a:ext cx="2052228" cy="864096"/>
+          </a:xfrm>
+          <a:prstGeom prst="rect">
+            <a:avLst/>
+          </a:prstGeom>
+        </p:spPr>
+        <p:style>
+          <a:lnRef idx="2">
+            <a:schemeClr val="accent1">
+              <a:shade val="50000"/>
+            </a:schemeClr>
+          </a:lnRef>
+          <a:fillRef idx="1">
+            <a:schemeClr val="accent1"/>
+          </a:fillRef>
+          <a:effectRef idx="0">
+            <a:schemeClr val="accent1"/>
+          </a:effectRef>
+          <a:fontRef idx="minor">
+            <a:schemeClr val="lt1"/>
+          </a:fontRef>
+        </p:style>
+        <p:txBody>
+          <a:bodyPr rtlCol="0" anchor="ctr"/>
+          <a:lstStyle/>
+          <a:p>
+            <a:pPr algn="ctr"/>
+            <a:r>
+              <a:rPr lang="it-IT" dirty="0" smtClean="0"/>
+              <a:t>Provider </a:t>
+            </a:r>
+          </a:p>
+          <a:p>
+            <a:pPr algn="ctr"/>
+            <a:r>
+              <a:rPr lang="it-IT" dirty="0" smtClean="0"/>
+              <a:t>Autenticatore</a:t>
+            </a:r>
+            <a:endParaRPr lang="it-IT" dirty="0"/>
+          </a:p>
+        </p:txBody>
+      </p:sp>
+      <p:sp>
+        <p:nvSpPr>
+          <p:cNvPr id="19" name="Rettangolo 18"/>
+          <p:cNvSpPr/>
+          <p:nvPr/>
+        </p:nvSpPr>
+        <p:spPr>
+          <a:xfrm>
+            <a:off x="3298358" y="5571089"/>
+            <a:ext cx="2124206" cy="864096"/>
+          </a:xfrm>
+          <a:prstGeom prst="rect">
+            <a:avLst/>
+          </a:prstGeom>
+          <a:ln>
+            <a:solidFill>
+              <a:schemeClr val="tx2"/>
+            </a:solidFill>
+          </a:ln>
+        </p:spPr>
+        <p:style>
+          <a:lnRef idx="2">
+            <a:schemeClr val="accent6"/>
+          </a:lnRef>
+          <a:fillRef idx="1">
+            <a:schemeClr val="lt1"/>
+          </a:fillRef>
+          <a:effectRef idx="0">
+            <a:schemeClr val="accent6"/>
+          </a:effectRef>
+          <a:fontRef idx="minor">
+            <a:schemeClr val="dk1"/>
+          </a:fontRef>
+        </p:style>
+        <p:txBody>
+          <a:bodyPr rtlCol="0" anchor="ctr"/>
+          <a:lstStyle/>
+          <a:p>
+            <a:pPr algn="ctr"/>
+            <a:r>
+              <a:rPr lang="it-IT" dirty="0" smtClean="0"/>
+              <a:t>FrontEnd Server</a:t>
+            </a:r>
+            <a:endParaRPr lang="it-IT" dirty="0"/>
+          </a:p>
+        </p:txBody>
+      </p:sp>
+      <p:cxnSp>
+        <p:nvCxnSpPr>
+          <p:cNvPr id="23" name="Connettore 2 22"/>
+          <p:cNvCxnSpPr>
+            <a:stCxn id="10" idx="6"/>
+          </p:cNvCxnSpPr>
+          <p:nvPr/>
+        </p:nvCxnSpPr>
+        <p:spPr>
+          <a:xfrm flipV="1">
+            <a:off x="6902775" y="2380975"/>
+            <a:ext cx="117497" cy="1174648"/>
+          </a:xfrm>
+          <a:prstGeom prst="straightConnector1">
+            <a:avLst/>
+          </a:prstGeom>
+          <a:ln>
+            <a:headEnd type="arrow"/>
+            <a:tailEnd type="arrow"/>
+          </a:ln>
+        </p:spPr>
+        <p:style>
+          <a:lnRef idx="1">
+            <a:schemeClr val="accent1"/>
+          </a:lnRef>
+          <a:fillRef idx="0">
+            <a:schemeClr val="accent1"/>
+          </a:fillRef>
+          <a:effectRef idx="0">
+            <a:schemeClr val="accent1"/>
+          </a:effectRef>
+          <a:fontRef idx="minor">
+            <a:schemeClr val="tx1"/>
+          </a:fontRef>
+        </p:style>
+      </p:cxnSp>
+      <p:cxnSp>
+        <p:nvCxnSpPr>
+          <p:cNvPr id="25" name="Connettore 2 24"/>
+          <p:cNvCxnSpPr>
+            <a:stCxn id="10" idx="6"/>
+          </p:cNvCxnSpPr>
+          <p:nvPr/>
+        </p:nvCxnSpPr>
+        <p:spPr>
+          <a:xfrm>
+            <a:off x="6902775" y="3555623"/>
+            <a:ext cx="117497" cy="665465"/>
+          </a:xfrm>
+          <a:prstGeom prst="straightConnector1">
+            <a:avLst/>
+          </a:prstGeom>
+          <a:ln>
+            <a:headEnd type="arrow"/>
+            <a:tailEnd type="arrow"/>
+          </a:ln>
+        </p:spPr>
+        <p:style>
+          <a:lnRef idx="1">
+            <a:schemeClr val="accent1"/>
+          </a:lnRef>
+          <a:fillRef idx="0">
+            <a:schemeClr val="accent1"/>
+          </a:fillRef>
+          <a:effectRef idx="0">
+            <a:schemeClr val="accent1"/>
+          </a:effectRef>
+          <a:fontRef idx="minor">
+            <a:schemeClr val="tx1"/>
+          </a:fontRef>
+        </p:style>
+      </p:cxnSp>
+      <p:cxnSp>
+        <p:nvCxnSpPr>
+          <p:cNvPr id="27" name="Connettore 2 26"/>
+          <p:cNvCxnSpPr>
+            <a:stCxn id="19" idx="1"/>
+            <a:endCxn id="18" idx="3"/>
+          </p:cNvCxnSpPr>
+          <p:nvPr/>
+        </p:nvCxnSpPr>
+        <p:spPr>
+          <a:xfrm flipH="1">
+            <a:off x="2168987" y="6003137"/>
+            <a:ext cx="1129371" cy="0"/>
+          </a:xfrm>
+          <a:prstGeom prst="straightConnector1">
+            <a:avLst/>
+          </a:prstGeom>
+          <a:ln>
+            <a:headEnd type="arrow"/>
+            <a:tailEnd type="arrow"/>
+          </a:ln>
+        </p:spPr>
+        <p:style>
+          <a:lnRef idx="1">
+            <a:schemeClr val="accent1"/>
+          </a:lnRef>
+          <a:fillRef idx="0">
+            <a:schemeClr val="accent1"/>
+          </a:fillRef>
+          <a:effectRef idx="0">
+            <a:schemeClr val="accent1"/>
+          </a:effectRef>
+          <a:fontRef idx="minor">
+            <a:schemeClr val="tx1"/>
+          </a:fontRef>
+        </p:style>
+      </p:cxnSp>
+      <p:cxnSp>
+        <p:nvCxnSpPr>
+          <p:cNvPr id="35" name="Connettore 2 34"/>
+          <p:cNvCxnSpPr>
+            <a:endCxn id="8" idx="2"/>
+          </p:cNvCxnSpPr>
+          <p:nvPr/>
+        </p:nvCxnSpPr>
+        <p:spPr>
+          <a:xfrm flipV="1">
+            <a:off x="953344" y="3825044"/>
+            <a:ext cx="0" cy="1746045"/>
+          </a:xfrm>
+          <a:prstGeom prst="straightConnector1">
+            <a:avLst/>
+          </a:prstGeom>
+          <a:ln>
+            <a:tailEnd type="arrow"/>
+          </a:ln>
+        </p:spPr>
+        <p:style>
+          <a:lnRef idx="1">
+            <a:schemeClr val="accent1"/>
+          </a:lnRef>
+          <a:fillRef idx="0">
+            <a:schemeClr val="accent1"/>
+          </a:fillRef>
+          <a:effectRef idx="0">
+            <a:schemeClr val="accent1"/>
+          </a:effectRef>
+          <a:fontRef idx="minor">
+            <a:schemeClr val="tx1"/>
+          </a:fontRef>
+        </p:style>
+      </p:cxnSp>
+      <p:sp>
+        <p:nvSpPr>
+          <p:cNvPr id="22" name="Rettangolo 21"/>
+          <p:cNvSpPr/>
+          <p:nvPr/>
+        </p:nvSpPr>
+        <p:spPr>
+          <a:xfrm>
+            <a:off x="2402848" y="271380"/>
+            <a:ext cx="2052228" cy="864096"/>
+          </a:xfrm>
+          <a:prstGeom prst="rect">
+            <a:avLst/>
+          </a:prstGeom>
+        </p:spPr>
+        <p:style>
+          <a:lnRef idx="2">
+            <a:schemeClr val="accent1">
+              <a:shade val="50000"/>
+            </a:schemeClr>
+          </a:lnRef>
+          <a:fillRef idx="1">
+            <a:schemeClr val="accent1"/>
+          </a:fillRef>
+          <a:effectRef idx="0">
+            <a:schemeClr val="accent1"/>
+          </a:effectRef>
+          <a:fontRef idx="minor">
+            <a:schemeClr val="lt1"/>
+          </a:fontRef>
+        </p:style>
+        <p:txBody>
+          <a:bodyPr rtlCol="0" anchor="ctr"/>
+          <a:lstStyle/>
+          <a:p>
+            <a:pPr algn="ctr"/>
+            <a:r>
+              <a:rPr lang="it-IT" dirty="0" smtClean="0"/>
+              <a:t>Provider </a:t>
+            </a:r>
+          </a:p>
+          <a:p>
+            <a:pPr algn="ctr"/>
+            <a:r>
+              <a:rPr lang="it-IT" dirty="0" smtClean="0"/>
+              <a:t>Meteo</a:t>
+            </a:r>
+          </a:p>
+          <a:p>
+            <a:pPr algn="ctr"/>
+            <a:r>
+              <a:rPr lang="it-IT" dirty="0" smtClean="0"/>
+              <a:t>(OWM)</a:t>
+            </a:r>
+            <a:endParaRPr lang="it-IT" dirty="0"/>
+          </a:p>
+        </p:txBody>
+      </p:sp>
+      <p:sp>
+        <p:nvSpPr>
+          <p:cNvPr id="24" name="Rettangolo 23"/>
+          <p:cNvSpPr/>
+          <p:nvPr/>
+        </p:nvSpPr>
+        <p:spPr>
+          <a:xfrm>
+            <a:off x="4862016" y="260648"/>
+            <a:ext cx="2052228" cy="864096"/>
+          </a:xfrm>
+          <a:prstGeom prst="rect">
+            <a:avLst/>
+          </a:prstGeom>
+        </p:spPr>
+        <p:style>
+          <a:lnRef idx="2">
+            <a:schemeClr val="accent1">
+              <a:shade val="50000"/>
+            </a:schemeClr>
+          </a:lnRef>
+          <a:fillRef idx="1">
+            <a:schemeClr val="accent1"/>
+          </a:fillRef>
+          <a:effectRef idx="0">
+            <a:schemeClr val="accent1"/>
+          </a:effectRef>
+          <a:fontRef idx="minor">
+            <a:schemeClr val="lt1"/>
+          </a:fontRef>
+        </p:style>
+        <p:txBody>
+          <a:bodyPr rtlCol="0" anchor="ctr"/>
+          <a:lstStyle/>
+          <a:p>
+            <a:pPr algn="ctr"/>
+            <a:r>
+              <a:rPr lang="it-IT" dirty="0" smtClean="0"/>
+              <a:t>Provider</a:t>
+            </a:r>
+            <a:endParaRPr lang="it-IT" dirty="0" smtClean="0"/>
+          </a:p>
+          <a:p>
+            <a:pPr algn="ctr"/>
+            <a:r>
+              <a:rPr lang="it-IT" dirty="0" smtClean="0"/>
+              <a:t>Tempo</a:t>
+            </a:r>
+            <a:endParaRPr lang="it-IT" dirty="0"/>
+          </a:p>
+        </p:txBody>
+      </p:sp>
+      <p:sp>
+        <p:nvSpPr>
+          <p:cNvPr id="26" name="Ovale 25"/>
+          <p:cNvSpPr/>
+          <p:nvPr/>
+        </p:nvSpPr>
+        <p:spPr>
+          <a:xfrm>
+            <a:off x="5004048" y="1556793"/>
+            <a:ext cx="1656184" cy="1152128"/>
+          </a:xfrm>
+          <a:prstGeom prst="ellipse">
+            <a:avLst/>
+          </a:prstGeom>
+          <a:ln>
+            <a:solidFill>
+              <a:schemeClr val="tx2"/>
+            </a:solidFill>
+          </a:ln>
+        </p:spPr>
+        <p:style>
+          <a:lnRef idx="2">
+            <a:schemeClr val="accent6"/>
+          </a:lnRef>
+          <a:fillRef idx="1">
+            <a:schemeClr val="lt1"/>
+          </a:fillRef>
+          <a:effectRef idx="0">
+            <a:schemeClr val="accent6"/>
+          </a:effectRef>
+          <a:fontRef idx="minor">
+            <a:schemeClr val="dk1"/>
+          </a:fontRef>
+        </p:style>
+        <p:txBody>
+          <a:bodyPr rtlCol="0" anchor="ctr"/>
+          <a:lstStyle/>
+          <a:p>
+            <a:pPr algn="ctr"/>
+            <a:r>
+              <a:rPr lang="it-IT" sz="1600" dirty="0" smtClean="0"/>
+              <a:t>Notificatore</a:t>
+            </a:r>
+            <a:endParaRPr lang="it-IT" sz="1600" dirty="0"/>
+          </a:p>
+        </p:txBody>
+      </p:sp>
+      <p:cxnSp>
+        <p:nvCxnSpPr>
+          <p:cNvPr id="31" name="Connettore 2 30"/>
+          <p:cNvCxnSpPr>
+            <a:stCxn id="34" idx="6"/>
+            <a:endCxn id="10" idx="3"/>
+          </p:cNvCxnSpPr>
+          <p:nvPr/>
+        </p:nvCxnSpPr>
+        <p:spPr>
+          <a:xfrm flipV="1">
+            <a:off x="4306317" y="3861127"/>
+            <a:ext cx="1536640" cy="773800"/>
+          </a:xfrm>
+          <a:prstGeom prst="straightConnector1">
+            <a:avLst/>
+          </a:prstGeom>
+          <a:ln>
+            <a:tailEnd type="arrow"/>
+          </a:ln>
+        </p:spPr>
+        <p:style>
+          <a:lnRef idx="1">
+            <a:schemeClr val="accent1"/>
+          </a:lnRef>
+          <a:fillRef idx="0">
+            <a:schemeClr val="accent1"/>
+          </a:fillRef>
+          <a:effectRef idx="0">
+            <a:schemeClr val="accent1"/>
+          </a:effectRef>
+          <a:fontRef idx="minor">
+            <a:schemeClr val="tx1"/>
+          </a:fontRef>
+        </p:style>
+      </p:cxnSp>
+      <p:cxnSp>
+        <p:nvCxnSpPr>
+          <p:cNvPr id="36" name="Connettore 2 35"/>
+          <p:cNvCxnSpPr>
+            <a:stCxn id="24" idx="2"/>
+          </p:cNvCxnSpPr>
+          <p:nvPr/>
+        </p:nvCxnSpPr>
+        <p:spPr>
+          <a:xfrm flipH="1">
+            <a:off x="5832140" y="1124744"/>
+            <a:ext cx="55990" cy="442781"/>
+          </a:xfrm>
+          <a:prstGeom prst="straightConnector1">
+            <a:avLst/>
+          </a:prstGeom>
+          <a:ln>
+            <a:headEnd type="arrow"/>
+            <a:tailEnd type="arrow"/>
+          </a:ln>
+        </p:spPr>
+        <p:style>
+          <a:lnRef idx="1">
+            <a:schemeClr val="accent1"/>
+          </a:lnRef>
+          <a:fillRef idx="0">
+            <a:schemeClr val="accent1"/>
+          </a:fillRef>
+          <a:effectRef idx="0">
+            <a:schemeClr val="accent1"/>
+          </a:effectRef>
+          <a:fontRef idx="minor">
+            <a:schemeClr val="tx1"/>
+          </a:fontRef>
+        </p:style>
+      </p:cxnSp>
+      <p:cxnSp>
+        <p:nvCxnSpPr>
+          <p:cNvPr id="38" name="Connettore 2 37"/>
+          <p:cNvCxnSpPr>
+            <a:stCxn id="22" idx="2"/>
+            <a:endCxn id="26" idx="1"/>
+          </p:cNvCxnSpPr>
+          <p:nvPr/>
+        </p:nvCxnSpPr>
+        <p:spPr>
+          <a:xfrm>
+            <a:off x="3428962" y="1135476"/>
+            <a:ext cx="1817629" cy="590042"/>
+          </a:xfrm>
+          <a:prstGeom prst="straightConnector1">
+            <a:avLst/>
+          </a:prstGeom>
+          <a:ln>
+            <a:headEnd type="arrow"/>
+            <a:tailEnd type="arrow"/>
+          </a:ln>
+        </p:spPr>
+        <p:style>
+          <a:lnRef idx="1">
+            <a:schemeClr val="accent1"/>
+          </a:lnRef>
+          <a:fillRef idx="0">
+            <a:schemeClr val="accent1"/>
+          </a:fillRef>
+          <a:effectRef idx="0">
+            <a:schemeClr val="accent1"/>
+          </a:effectRef>
+          <a:fontRef idx="minor">
+            <a:schemeClr val="tx1"/>
+          </a:fontRef>
+        </p:style>
+      </p:cxnSp>
+      <p:sp>
+        <p:nvSpPr>
+          <p:cNvPr id="12" name="CasellaDiTesto 11"/>
+          <p:cNvSpPr txBox="1"/>
+          <p:nvPr/>
+        </p:nvSpPr>
+        <p:spPr>
+          <a:xfrm>
+            <a:off x="5481101" y="4330847"/>
+            <a:ext cx="1179131" cy="369332"/>
+          </a:xfrm>
+          <a:prstGeom prst="rect">
+            <a:avLst/>
+          </a:prstGeom>
+          <a:noFill/>
+        </p:spPr>
+        <p:txBody>
+          <a:bodyPr wrap="square" rtlCol="0">
+            <a:spAutoFit/>
+          </a:bodyPr>
+          <a:lstStyle/>
+          <a:p>
+            <a:pPr algn="ctr"/>
+            <a:r>
+              <a:rPr lang="it-IT" b="1" dirty="0" smtClean="0">
+                <a:solidFill>
+                  <a:schemeClr val="accent2">
+                    <a:lumMod val="75000"/>
+                  </a:schemeClr>
+                </a:solidFill>
+              </a:rPr>
+              <a:t>mqtt</a:t>
+            </a:r>
+            <a:endParaRPr lang="it-IT" b="1" dirty="0">
+              <a:solidFill>
+                <a:schemeClr val="accent2">
+                  <a:lumMod val="75000"/>
+                </a:schemeClr>
+              </a:solidFill>
+            </a:endParaRPr>
+          </a:p>
+        </p:txBody>
+      </p:sp>
+      <p:cxnSp>
+        <p:nvCxnSpPr>
+          <p:cNvPr id="30" name="Connettore 2 29"/>
+          <p:cNvCxnSpPr>
+            <a:stCxn id="26" idx="3"/>
+            <a:endCxn id="2" idx="7"/>
+          </p:cNvCxnSpPr>
+          <p:nvPr/>
+        </p:nvCxnSpPr>
+        <p:spPr>
+          <a:xfrm flipH="1">
+            <a:off x="3843828" y="2540196"/>
+            <a:ext cx="1402763" cy="615586"/>
+          </a:xfrm>
+          <a:prstGeom prst="straightConnector1">
+            <a:avLst/>
+          </a:prstGeom>
+          <a:ln>
+            <a:tailEnd type="arrow"/>
+          </a:ln>
+        </p:spPr>
+        <p:style>
+          <a:lnRef idx="1">
+            <a:schemeClr val="accent1"/>
+          </a:lnRef>
+          <a:fillRef idx="0">
+            <a:schemeClr val="accent1"/>
+          </a:fillRef>
+          <a:effectRef idx="0">
+            <a:schemeClr val="accent1"/>
+          </a:effectRef>
+          <a:fontRef idx="minor">
+            <a:schemeClr val="tx1"/>
+          </a:fontRef>
+        </p:style>
+      </p:cxnSp>
+      <p:sp>
+        <p:nvSpPr>
+          <p:cNvPr id="40" name="Pergamena 1 39"/>
+          <p:cNvSpPr/>
+          <p:nvPr/>
+        </p:nvSpPr>
+        <p:spPr>
+          <a:xfrm>
+            <a:off x="0" y="116631"/>
+            <a:ext cx="2285746" cy="2016225"/>
+          </a:xfrm>
+          <a:prstGeom prst="verticalScroll">
+            <a:avLst/>
+          </a:prstGeom>
+          <a:ln>
+            <a:solidFill>
+              <a:schemeClr val="bg2">
+                <a:lumMod val="50000"/>
+              </a:schemeClr>
+            </a:solidFill>
+          </a:ln>
+        </p:spPr>
+        <p:style>
+          <a:lnRef idx="2">
+            <a:schemeClr val="accent6"/>
+          </a:lnRef>
+          <a:fillRef idx="1">
+            <a:schemeClr val="lt1"/>
+          </a:fillRef>
+          <a:effectRef idx="0">
+            <a:schemeClr val="accent6"/>
+          </a:effectRef>
+          <a:fontRef idx="minor">
+            <a:schemeClr val="dk1"/>
+          </a:fontRef>
+        </p:style>
+        <p:txBody>
+          <a:bodyPr rtlCol="0" anchor="ctr"/>
+          <a:lstStyle/>
+          <a:p>
+            <a:pPr marL="285750" indent="-285750" algn="ctr">
+              <a:buFont typeface="Arial" panose="020B0604020202020204" pitchFamily="34" charset="0"/>
+              <a:buChar char="•"/>
+            </a:pPr>
+            <a:r>
+              <a:rPr lang="it-IT" sz="1300" dirty="0" smtClean="0"/>
+              <a:t>Blu = contesto robot</a:t>
+            </a:r>
+          </a:p>
+          <a:p>
+            <a:pPr marL="285750" indent="-285750" algn="ctr">
+              <a:buFont typeface="Arial" panose="020B0604020202020204" pitchFamily="34" charset="0"/>
+              <a:buChar char="•"/>
+            </a:pPr>
+            <a:r>
+              <a:rPr lang="it-IT" sz="1300" dirty="0" smtClean="0"/>
+              <a:t>Arancio = robot fisico/</a:t>
+            </a:r>
+            <a:r>
+              <a:rPr lang="it-IT" sz="1300" dirty="0" err="1" smtClean="0"/>
+              <a:t>virtual</a:t>
+            </a:r>
+            <a:endParaRPr lang="it-IT" sz="1300" dirty="0" smtClean="0"/>
+          </a:p>
+          <a:p>
+            <a:pPr marL="285750" indent="-285750" algn="ctr">
+              <a:buFont typeface="Arial" panose="020B0604020202020204" pitchFamily="34" charset="0"/>
+              <a:buChar char="•"/>
+            </a:pPr>
+            <a:r>
+              <a:rPr lang="it-IT" sz="1300" dirty="0" smtClean="0"/>
+              <a:t>Verde = contesto pc/</a:t>
+            </a:r>
+            <a:r>
+              <a:rPr lang="it-IT" sz="1300" dirty="0" err="1" smtClean="0"/>
+              <a:t>smartphone</a:t>
+            </a:r>
+            <a:r>
+              <a:rPr lang="it-IT" sz="1300" dirty="0" smtClean="0"/>
+              <a:t> </a:t>
+            </a:r>
+          </a:p>
+          <a:p>
+            <a:pPr marL="285750" indent="-285750" algn="ctr">
+              <a:buFont typeface="Arial" panose="020B0604020202020204" pitchFamily="34" charset="0"/>
+              <a:buChar char="•"/>
+            </a:pPr>
+            <a:r>
+              <a:rPr lang="it-IT" sz="1300" dirty="0" smtClean="0"/>
+              <a:t>Blu pieno  = servizi esterni</a:t>
+            </a:r>
+            <a:endParaRPr lang="it-IT" sz="1300" dirty="0"/>
+          </a:p>
+        </p:txBody>
+      </p:sp>
+      <p:sp>
+        <p:nvSpPr>
+          <p:cNvPr id="34" name="Ovale 33"/>
+          <p:cNvSpPr/>
+          <p:nvPr/>
+        </p:nvSpPr>
+        <p:spPr>
+          <a:xfrm>
+            <a:off x="2551606" y="4330847"/>
+            <a:ext cx="1754711" cy="608159"/>
+          </a:xfrm>
+          <a:prstGeom prst="ellipse">
+            <a:avLst/>
+          </a:prstGeom>
+          <a:ln>
+            <a:solidFill>
+              <a:schemeClr val="tx2"/>
+            </a:solidFill>
+          </a:ln>
+        </p:spPr>
+        <p:style>
+          <a:lnRef idx="2">
+            <a:schemeClr val="accent6"/>
+          </a:lnRef>
+          <a:fillRef idx="1">
+            <a:schemeClr val="lt1"/>
+          </a:fillRef>
+          <a:effectRef idx="0">
+            <a:schemeClr val="accent6"/>
+          </a:effectRef>
+          <a:fontRef idx="minor">
+            <a:schemeClr val="dk1"/>
+          </a:fontRef>
+        </p:style>
+        <p:txBody>
+          <a:bodyPr rtlCol="0" anchor="ctr"/>
+          <a:lstStyle/>
+          <a:p>
+            <a:pPr algn="ctr"/>
+            <a:r>
+              <a:rPr lang="it-IT" sz="1300" dirty="0" smtClean="0"/>
+              <a:t>CoreMoveLogic</a:t>
+            </a:r>
+            <a:endParaRPr lang="it-IT" sz="1300" dirty="0"/>
+          </a:p>
+        </p:txBody>
+      </p:sp>
+      <p:sp>
+        <p:nvSpPr>
+          <p:cNvPr id="54" name="Ovale 53"/>
+          <p:cNvSpPr/>
+          <p:nvPr/>
+        </p:nvSpPr>
+        <p:spPr>
+          <a:xfrm>
+            <a:off x="2277349" y="1417443"/>
+            <a:ext cx="4734526" cy="3807089"/>
+          </a:xfrm>
+          <a:prstGeom prst="ellipse">
+            <a:avLst/>
+          </a:prstGeom>
+          <a:solidFill>
+            <a:schemeClr val="accent2">
+              <a:lumMod val="50000"/>
+            </a:schemeClr>
+          </a:solidFill>
+          <a:ln>
+            <a:solidFill>
+              <a:schemeClr val="accent2">
+                <a:lumMod val="60000"/>
+                <a:lumOff val="40000"/>
+              </a:schemeClr>
+            </a:solidFill>
+          </a:ln>
+          <a:effectLst/>
+          <a:scene3d>
+            <a:camera prst="orthographicFront">
+              <a:rot lat="0" lon="0" rev="0"/>
+            </a:camera>
+            <a:lightRig rig="chilly" dir="t">
+              <a:rot lat="0" lon="0" rev="18480000"/>
+            </a:lightRig>
+          </a:scene3d>
+          <a:sp3d prstMaterial="clear">
+            <a:bevelT h="63500"/>
+          </a:sp3d>
+        </p:spPr>
+        <p:style>
+          <a:lnRef idx="2">
+            <a:schemeClr val="accent6"/>
+          </a:lnRef>
+          <a:fillRef idx="1">
+            <a:schemeClr val="lt1"/>
+          </a:fillRef>
+          <a:effectRef idx="0">
+            <a:schemeClr val="accent6"/>
+          </a:effectRef>
+          <a:fontRef idx="minor">
+            <a:schemeClr val="dk1"/>
+          </a:fontRef>
+        </p:style>
+        <p:txBody>
+          <a:bodyPr rtlCol="0" anchor="ctr"/>
+          <a:lstStyle/>
+          <a:p>
+            <a:pPr algn="ctr"/>
+            <a:endParaRPr lang="it-IT"/>
+          </a:p>
+        </p:txBody>
+      </p:sp>
+    </p:spTree>
+    <p:extLst>
+      <p:ext uri="{BB962C8B-B14F-4D97-AF65-F5344CB8AC3E}">
+        <p14:creationId xmlns:p14="http://schemas.microsoft.com/office/powerpoint/2010/main" val="809657917"/>
       </p:ext>
     </p:extLst>
   </p:cSld>

</xml_diff>

<commit_message>
arch gen fuffosa cambiata
</commit_message>
<xml_diff>
--- a/ArchitetturaInformale/ArchGen.pptx
+++ b/ArchitetturaInformale/ArchGen.pptx
@@ -291,7 +291,7 @@
           <a:p>
             <a:fld id="{7F49D355-16BD-4E45-BD9A-5EA878CF7CBD}" type="datetimeFigureOut">
               <a:rPr lang="it-IT" smtClean="0"/>
-              <a:t>29/06/2018</a:t>
+              <a:t>02/07/2018</a:t>
             </a:fld>
             <a:endParaRPr lang="it-IT"/>
           </a:p>
@@ -456,7 +456,7 @@
           <a:p>
             <a:fld id="{7F49D355-16BD-4E45-BD9A-5EA878CF7CBD}" type="datetimeFigureOut">
               <a:rPr lang="it-IT" smtClean="0"/>
-              <a:t>29/06/2018</a:t>
+              <a:t>02/07/2018</a:t>
             </a:fld>
             <a:endParaRPr lang="it-IT"/>
           </a:p>
@@ -631,7 +631,7 @@
           <a:p>
             <a:fld id="{7F49D355-16BD-4E45-BD9A-5EA878CF7CBD}" type="datetimeFigureOut">
               <a:rPr lang="it-IT" smtClean="0"/>
-              <a:t>29/06/2018</a:t>
+              <a:t>02/07/2018</a:t>
             </a:fld>
             <a:endParaRPr lang="it-IT"/>
           </a:p>
@@ -796,7 +796,7 @@
           <a:p>
             <a:fld id="{7F49D355-16BD-4E45-BD9A-5EA878CF7CBD}" type="datetimeFigureOut">
               <a:rPr lang="it-IT" smtClean="0"/>
-              <a:t>29/06/2018</a:t>
+              <a:t>02/07/2018</a:t>
             </a:fld>
             <a:endParaRPr lang="it-IT"/>
           </a:p>
@@ -1037,7 +1037,7 @@
           <a:p>
             <a:fld id="{7F49D355-16BD-4E45-BD9A-5EA878CF7CBD}" type="datetimeFigureOut">
               <a:rPr lang="it-IT" smtClean="0"/>
-              <a:t>29/06/2018</a:t>
+              <a:t>02/07/2018</a:t>
             </a:fld>
             <a:endParaRPr lang="it-IT"/>
           </a:p>
@@ -1320,7 +1320,7 @@
           <a:p>
             <a:fld id="{7F49D355-16BD-4E45-BD9A-5EA878CF7CBD}" type="datetimeFigureOut">
               <a:rPr lang="it-IT" smtClean="0"/>
-              <a:t>29/06/2018</a:t>
+              <a:t>02/07/2018</a:t>
             </a:fld>
             <a:endParaRPr lang="it-IT"/>
           </a:p>
@@ -1737,7 +1737,7 @@
           <a:p>
             <a:fld id="{7F49D355-16BD-4E45-BD9A-5EA878CF7CBD}" type="datetimeFigureOut">
               <a:rPr lang="it-IT" smtClean="0"/>
-              <a:t>29/06/2018</a:t>
+              <a:t>02/07/2018</a:t>
             </a:fld>
             <a:endParaRPr lang="it-IT"/>
           </a:p>
@@ -1850,7 +1850,7 @@
           <a:p>
             <a:fld id="{7F49D355-16BD-4E45-BD9A-5EA878CF7CBD}" type="datetimeFigureOut">
               <a:rPr lang="it-IT" smtClean="0"/>
-              <a:t>29/06/2018</a:t>
+              <a:t>02/07/2018</a:t>
             </a:fld>
             <a:endParaRPr lang="it-IT"/>
           </a:p>
@@ -1940,7 +1940,7 @@
           <a:p>
             <a:fld id="{7F49D355-16BD-4E45-BD9A-5EA878CF7CBD}" type="datetimeFigureOut">
               <a:rPr lang="it-IT" smtClean="0"/>
-              <a:t>29/06/2018</a:t>
+              <a:t>02/07/2018</a:t>
             </a:fld>
             <a:endParaRPr lang="it-IT"/>
           </a:p>
@@ -2212,7 +2212,7 @@
           <a:p>
             <a:fld id="{7F49D355-16BD-4E45-BD9A-5EA878CF7CBD}" type="datetimeFigureOut">
               <a:rPr lang="it-IT" smtClean="0"/>
-              <a:t>29/06/2018</a:t>
+              <a:t>02/07/2018</a:t>
             </a:fld>
             <a:endParaRPr lang="it-IT"/>
           </a:p>
@@ -2460,7 +2460,7 @@
           <a:p>
             <a:fld id="{7F49D355-16BD-4E45-BD9A-5EA878CF7CBD}" type="datetimeFigureOut">
               <a:rPr lang="it-IT" smtClean="0"/>
-              <a:t>29/06/2018</a:t>
+              <a:t>02/07/2018</a:t>
             </a:fld>
             <a:endParaRPr lang="it-IT"/>
           </a:p>
@@ -2668,7 +2668,7 @@
           <a:p>
             <a:fld id="{7F49D355-16BD-4E45-BD9A-5EA878CF7CBD}" type="datetimeFigureOut">
               <a:rPr lang="it-IT" smtClean="0"/>
-              <a:t>29/06/2018</a:t>
+              <a:t>02/07/2018</a:t>
             </a:fld>
             <a:endParaRPr lang="it-IT"/>
           </a:p>
@@ -6534,7 +6534,6 @@
               <a:rPr lang="it-IT" dirty="0" smtClean="0"/>
               <a:t>Provider</a:t>
             </a:r>
-            <a:endParaRPr lang="it-IT" dirty="0" smtClean="0"/>
           </a:p>
           <a:p>
             <a:pPr algn="ctr"/>
@@ -6931,8 +6930,8 @@
         </p:nvSpPr>
         <p:spPr>
           <a:xfrm>
-            <a:off x="2277349" y="1417443"/>
-            <a:ext cx="4734526" cy="3807089"/>
+            <a:off x="2294747" y="1387865"/>
+            <a:ext cx="4734526" cy="5017742"/>
           </a:xfrm>
           <a:prstGeom prst="ellipse">
             <a:avLst/>
@@ -6986,6 +6985,39 @@
           </a:p>
         </p:txBody>
       </p:sp>
+      <p:cxnSp>
+        <p:nvCxnSpPr>
+          <p:cNvPr id="32" name="Connettore 2 31"/>
+          <p:cNvCxnSpPr/>
+          <p:nvPr/>
+        </p:nvCxnSpPr>
+        <p:spPr>
+          <a:xfrm flipH="1" flipV="1">
+            <a:off x="4352560" y="5242743"/>
+            <a:ext cx="7901" cy="328346"/>
+          </a:xfrm>
+          <a:prstGeom prst="straightConnector1">
+            <a:avLst/>
+          </a:prstGeom>
+          <a:ln>
+            <a:tailEnd type="arrow"/>
+          </a:ln>
+        </p:spPr>
+        <p:style>
+          <a:lnRef idx="1">
+            <a:schemeClr val="accent1"/>
+          </a:lnRef>
+          <a:fillRef idx="0">
+            <a:schemeClr val="accent1"/>
+          </a:fillRef>
+          <a:effectRef idx="0">
+            <a:schemeClr val="accent1"/>
+          </a:effectRef>
+          <a:fontRef idx="minor">
+            <a:schemeClr val="tx1"/>
+          </a:fontRef>
+        </p:style>
+      </p:cxnSp>
     </p:spTree>
     <p:extLst>
       <p:ext uri="{BB962C8B-B14F-4D97-AF65-F5344CB8AC3E}">

</xml_diff>

<commit_message>
modifica arc inf, e gener pdf
</commit_message>
<xml_diff>
--- a/ArchitetturaInformale/ArchGen.pptx
+++ b/ArchitetturaInformale/ArchGen.pptx
@@ -5,10 +5,11 @@
     <p:sldMasterId id="2147483648" r:id="rId1"/>
   </p:sldMasterIdLst>
   <p:sldIdLst>
-    <p:sldId id="256" r:id="rId2"/>
-    <p:sldId id="257" r:id="rId3"/>
-    <p:sldId id="258" r:id="rId4"/>
-    <p:sldId id="259" r:id="rId5"/>
+    <p:sldId id="260" r:id="rId2"/>
+    <p:sldId id="256" r:id="rId3"/>
+    <p:sldId id="257" r:id="rId4"/>
+    <p:sldId id="258" r:id="rId5"/>
+    <p:sldId id="259" r:id="rId6"/>
   </p:sldIdLst>
   <p:sldSz cx="9144000" cy="6858000" type="screen4x3"/>
   <p:notesSz cx="6858000" cy="9144000"/>
@@ -3040,424 +3041,111 @@
       </p:grpSpPr>
       <p:sp>
         <p:nvSpPr>
-          <p:cNvPr id="4" name="Rettangolo 3"/>
-          <p:cNvSpPr/>
-          <p:nvPr/>
-        </p:nvSpPr>
-        <p:spPr>
-          <a:xfrm>
-            <a:off x="2267744" y="1412776"/>
-            <a:ext cx="4752528" cy="3816424"/>
-          </a:xfrm>
-          <a:prstGeom prst="rect">
-            <a:avLst/>
-          </a:prstGeom>
-          <a:ln>
-            <a:solidFill>
-              <a:schemeClr val="tx2"/>
-            </a:solidFill>
-          </a:ln>
-        </p:spPr>
-        <p:style>
-          <a:lnRef idx="2">
-            <a:schemeClr val="accent6"/>
-          </a:lnRef>
-          <a:fillRef idx="1">
-            <a:schemeClr val="lt1"/>
-          </a:fillRef>
-          <a:effectRef idx="0">
-            <a:schemeClr val="accent6"/>
-          </a:effectRef>
-          <a:fontRef idx="minor">
-            <a:schemeClr val="dk1"/>
-          </a:fontRef>
-        </p:style>
-        <p:txBody>
-          <a:bodyPr rtlCol="0" anchor="ctr"/>
-          <a:lstStyle/>
+          <p:cNvPr id="2" name="Titolo 1"/>
+          <p:cNvSpPr>
+            <a:spLocks noGrp="1"/>
+          </p:cNvSpPr>
+          <p:nvPr>
+            <p:ph type="title"/>
+          </p:nvPr>
+        </p:nvSpPr>
+        <p:spPr>
+          <a:xfrm>
+            <a:off x="0" y="274638"/>
+            <a:ext cx="9144000" cy="1143000"/>
+          </a:xfrm>
+        </p:spPr>
+        <p:txBody>
+          <a:bodyPr>
+            <a:normAutofit/>
+          </a:bodyPr>
+          <a:lstStyle/>
+          <a:p>
+            <a:r>
+              <a:rPr lang="it-IT" dirty="0" smtClean="0"/>
+              <a:t>INGEGNERIA DEI SISTEMI SOFTWARE</a:t>
+            </a:r>
+            <a:endParaRPr lang="it-IT" dirty="0"/>
+          </a:p>
+        </p:txBody>
+      </p:sp>
+      <p:sp>
+        <p:nvSpPr>
+          <p:cNvPr id="3" name="Segnaposto contenuto 2"/>
+          <p:cNvSpPr>
+            <a:spLocks noGrp="1"/>
+          </p:cNvSpPr>
+          <p:nvPr>
+            <p:ph idx="1"/>
+          </p:nvPr>
+        </p:nvSpPr>
+        <p:spPr/>
+        <p:txBody>
+          <a:bodyPr>
+            <a:normAutofit fontScale="92500" lnSpcReduction="10000"/>
+          </a:bodyPr>
+          <a:lstStyle/>
+          <a:p>
+            <a:pPr algn="ctr">
+              <a:buFont typeface="Wingdings" panose="05000000000000000000" pitchFamily="2" charset="2"/>
+              <a:buChar char="Ø"/>
+            </a:pPr>
+            <a:endParaRPr lang="it-IT" dirty="0"/>
+          </a:p>
           <a:p>
             <a:pPr algn="ctr"/>
-            <a:endParaRPr lang="it-IT"/>
-          </a:p>
-        </p:txBody>
-      </p:sp>
-      <p:sp>
-        <p:nvSpPr>
-          <p:cNvPr id="5" name="Rettangolo 4"/>
-          <p:cNvSpPr/>
-          <p:nvPr/>
-        </p:nvSpPr>
-        <p:spPr>
-          <a:xfrm>
-            <a:off x="7730364" y="1916832"/>
-            <a:ext cx="1296144" cy="864096"/>
-          </a:xfrm>
-          <a:prstGeom prst="rect">
-            <a:avLst/>
-          </a:prstGeom>
-          <a:ln/>
-        </p:spPr>
-        <p:style>
-          <a:lnRef idx="2">
-            <a:schemeClr val="accent6"/>
-          </a:lnRef>
-          <a:fillRef idx="1">
-            <a:schemeClr val="lt1"/>
-          </a:fillRef>
-          <a:effectRef idx="0">
-            <a:schemeClr val="accent6"/>
-          </a:effectRef>
-          <a:fontRef idx="minor">
-            <a:schemeClr val="dk1"/>
-          </a:fontRef>
-        </p:style>
-        <p:txBody>
-          <a:bodyPr rtlCol="0" anchor="ctr"/>
-          <a:lstStyle/>
+            <a:r>
+              <a:rPr lang="it-IT" dirty="0" smtClean="0"/>
+              <a:t>Andrea Torchi</a:t>
+            </a:r>
+          </a:p>
           <a:p>
             <a:pPr algn="ctr"/>
             <a:r>
               <a:rPr lang="it-IT" dirty="0" smtClean="0"/>
-              <a:t>Robot</a:t>
+              <a:t>Francesco Giovanelli</a:t>
             </a:r>
           </a:p>
           <a:p>
             <a:pPr algn="ctr"/>
             <a:r>
               <a:rPr lang="it-IT" dirty="0" smtClean="0"/>
-              <a:t>Fisico</a:t>
-            </a:r>
-          </a:p>
-        </p:txBody>
-      </p:sp>
-      <p:sp>
-        <p:nvSpPr>
-          <p:cNvPr id="7" name="Rettangolo 6"/>
-          <p:cNvSpPr/>
-          <p:nvPr/>
-        </p:nvSpPr>
-        <p:spPr>
-          <a:xfrm>
-            <a:off x="7730364" y="3789040"/>
-            <a:ext cx="1296144" cy="864096"/>
-          </a:xfrm>
-          <a:prstGeom prst="rect">
-            <a:avLst/>
-          </a:prstGeom>
-        </p:spPr>
-        <p:style>
-          <a:lnRef idx="2">
-            <a:schemeClr val="accent6"/>
-          </a:lnRef>
-          <a:fillRef idx="1">
-            <a:schemeClr val="lt1"/>
-          </a:fillRef>
-          <a:effectRef idx="0">
-            <a:schemeClr val="accent6"/>
-          </a:effectRef>
-          <a:fontRef idx="minor">
-            <a:schemeClr val="dk1"/>
-          </a:fontRef>
-        </p:style>
-        <p:txBody>
-          <a:bodyPr rtlCol="0" anchor="ctr"/>
-          <a:lstStyle/>
+              <a:t>Giuseppe Tempesta</a:t>
+            </a:r>
+          </a:p>
           <a:p>
             <a:pPr algn="ctr"/>
-            <a:r>
-              <a:rPr lang="it-IT" dirty="0" smtClean="0"/>
-              <a:t>Robot</a:t>
-            </a:r>
-          </a:p>
-          <a:p>
-            <a:pPr algn="ctr"/>
-            <a:r>
-              <a:rPr lang="it-IT" dirty="0" smtClean="0"/>
-              <a:t>Virtuale</a:t>
-            </a:r>
-          </a:p>
-        </p:txBody>
-      </p:sp>
-      <p:sp>
-        <p:nvSpPr>
-          <p:cNvPr id="8" name="Rettangolo 7"/>
-          <p:cNvSpPr/>
-          <p:nvPr/>
-        </p:nvSpPr>
-        <p:spPr>
-          <a:xfrm>
-            <a:off x="179512" y="2816932"/>
-            <a:ext cx="1547664" cy="1008112"/>
-          </a:xfrm>
-          <a:prstGeom prst="rect">
-            <a:avLst/>
-          </a:prstGeom>
-          <a:solidFill>
-            <a:schemeClr val="bg1"/>
-          </a:solidFill>
-          <a:ln>
-            <a:solidFill>
-              <a:srgbClr val="00B050"/>
-            </a:solidFill>
-          </a:ln>
-        </p:spPr>
-        <p:style>
-          <a:lnRef idx="2">
-            <a:schemeClr val="accent1">
-              <a:shade val="50000"/>
-            </a:schemeClr>
-          </a:lnRef>
-          <a:fillRef idx="1">
-            <a:schemeClr val="accent1"/>
-          </a:fillRef>
-          <a:effectRef idx="0">
-            <a:schemeClr val="accent1"/>
-          </a:effectRef>
-          <a:fontRef idx="minor">
-            <a:schemeClr val="lt1"/>
-          </a:fontRef>
-        </p:style>
-        <p:txBody>
-          <a:bodyPr rtlCol="0" anchor="ctr"/>
-          <a:lstStyle/>
-          <a:p>
-            <a:pPr algn="ctr"/>
-            <a:r>
-              <a:rPr lang="it-IT" dirty="0" smtClean="0">
-                <a:solidFill>
-                  <a:schemeClr val="tx1"/>
-                </a:solidFill>
-              </a:rPr>
-              <a:t>Utente</a:t>
-            </a:r>
-          </a:p>
-          <a:p>
-            <a:pPr algn="ctr"/>
-            <a:r>
-              <a:rPr lang="it-IT" dirty="0" smtClean="0">
-                <a:solidFill>
-                  <a:schemeClr val="tx1"/>
-                </a:solidFill>
-              </a:rPr>
-              <a:t>Autorizzato</a:t>
-            </a:r>
-            <a:endParaRPr lang="it-IT" dirty="0">
-              <a:solidFill>
-                <a:schemeClr val="tx1"/>
-              </a:solidFill>
-            </a:endParaRPr>
-          </a:p>
-        </p:txBody>
-      </p:sp>
-      <p:cxnSp>
-        <p:nvCxnSpPr>
-          <p:cNvPr id="3" name="Connettore 2 2"/>
-          <p:cNvCxnSpPr>
-            <a:stCxn id="8" idx="3"/>
-            <a:endCxn id="4" idx="1"/>
-          </p:cNvCxnSpPr>
-          <p:nvPr/>
-        </p:nvCxnSpPr>
-        <p:spPr>
-          <a:xfrm>
-            <a:off x="1727176" y="3320988"/>
-            <a:ext cx="540000" cy="0"/>
-          </a:xfrm>
-          <a:prstGeom prst="straightConnector1">
-            <a:avLst/>
-          </a:prstGeom>
-          <a:ln w="31750">
-            <a:solidFill>
-              <a:schemeClr val="tx2"/>
-            </a:solidFill>
-            <a:headEnd type="arrow"/>
-            <a:tailEnd type="arrow"/>
-          </a:ln>
-        </p:spPr>
-        <p:style>
-          <a:lnRef idx="1">
-            <a:schemeClr val="accent1"/>
-          </a:lnRef>
-          <a:fillRef idx="0">
-            <a:schemeClr val="accent1"/>
-          </a:fillRef>
-          <a:effectRef idx="0">
-            <a:schemeClr val="accent1"/>
-          </a:effectRef>
-          <a:fontRef idx="minor">
-            <a:schemeClr val="tx1"/>
-          </a:fontRef>
-        </p:style>
-      </p:cxnSp>
-      <p:cxnSp>
-        <p:nvCxnSpPr>
-          <p:cNvPr id="9" name="Connettore 2 8"/>
-          <p:cNvCxnSpPr/>
-          <p:nvPr/>
-        </p:nvCxnSpPr>
-        <p:spPr>
-          <a:xfrm>
-            <a:off x="7020272" y="2348880"/>
-            <a:ext cx="710092" cy="0"/>
-          </a:xfrm>
-          <a:prstGeom prst="straightConnector1">
-            <a:avLst/>
-          </a:prstGeom>
-          <a:ln w="31750">
-            <a:solidFill>
-              <a:schemeClr val="tx2"/>
-            </a:solidFill>
-            <a:headEnd type="arrow"/>
-            <a:tailEnd type="arrow"/>
-          </a:ln>
-        </p:spPr>
-        <p:style>
-          <a:lnRef idx="1">
-            <a:schemeClr val="accent1"/>
-          </a:lnRef>
-          <a:fillRef idx="0">
-            <a:schemeClr val="accent1"/>
-          </a:fillRef>
-          <a:effectRef idx="0">
-            <a:schemeClr val="accent1"/>
-          </a:effectRef>
-          <a:fontRef idx="minor">
-            <a:schemeClr val="tx1"/>
-          </a:fontRef>
-        </p:style>
-      </p:cxnSp>
-      <p:cxnSp>
-        <p:nvCxnSpPr>
-          <p:cNvPr id="11" name="Connettore 2 10"/>
-          <p:cNvCxnSpPr/>
-          <p:nvPr/>
-        </p:nvCxnSpPr>
-        <p:spPr>
-          <a:xfrm>
-            <a:off x="7020272" y="4221088"/>
-            <a:ext cx="710092" cy="0"/>
-          </a:xfrm>
-          <a:prstGeom prst="straightConnector1">
-            <a:avLst/>
-          </a:prstGeom>
-          <a:ln w="31750">
-            <a:solidFill>
-              <a:schemeClr val="tx2"/>
-            </a:solidFill>
-            <a:headEnd type="arrow"/>
-            <a:tailEnd type="arrow"/>
-          </a:ln>
-        </p:spPr>
-        <p:style>
-          <a:lnRef idx="1">
-            <a:schemeClr val="accent1"/>
-          </a:lnRef>
-          <a:fillRef idx="0">
-            <a:schemeClr val="accent1"/>
-          </a:fillRef>
-          <a:effectRef idx="0">
-            <a:schemeClr val="accent1"/>
-          </a:effectRef>
-          <a:fontRef idx="minor">
-            <a:schemeClr val="tx1"/>
-          </a:fontRef>
-        </p:style>
-      </p:cxnSp>
-      <p:sp>
-        <p:nvSpPr>
-          <p:cNvPr id="6" name="Pergamena 1 5"/>
-          <p:cNvSpPr/>
-          <p:nvPr/>
-        </p:nvSpPr>
-        <p:spPr>
-          <a:xfrm>
-            <a:off x="179512" y="116632"/>
-            <a:ext cx="2088232" cy="1584176"/>
-          </a:xfrm>
-          <a:prstGeom prst="verticalScroll">
-            <a:avLst/>
-          </a:prstGeom>
-          <a:ln>
-            <a:solidFill>
-              <a:schemeClr val="bg2">
-                <a:lumMod val="50000"/>
-              </a:schemeClr>
-            </a:solidFill>
-          </a:ln>
-        </p:spPr>
-        <p:style>
-          <a:lnRef idx="2">
-            <a:schemeClr val="accent6"/>
-          </a:lnRef>
-          <a:fillRef idx="1">
-            <a:schemeClr val="lt1"/>
-          </a:fillRef>
-          <a:effectRef idx="0">
-            <a:schemeClr val="accent6"/>
-          </a:effectRef>
-          <a:fontRef idx="minor">
-            <a:schemeClr val="dk1"/>
-          </a:fontRef>
-        </p:style>
-        <p:txBody>
-          <a:bodyPr rtlCol="0" anchor="ctr"/>
-          <a:lstStyle/>
-          <a:p>
-            <a:pPr marL="285750" indent="-285750" algn="ctr">
-              <a:buFont typeface="Arial" panose="020B0604020202020204" pitchFamily="34" charset="0"/>
-              <a:buChar char="•"/>
+            <a:endParaRPr lang="it-IT" dirty="0"/>
+          </a:p>
+          <a:p>
+            <a:pPr marL="0" indent="0" algn="ctr">
+              <a:buNone/>
             </a:pPr>
             <a:r>
-              <a:rPr lang="it-IT" sz="1300" dirty="0" smtClean="0"/>
-              <a:t>Blu = contesto robot</a:t>
-            </a:r>
-          </a:p>
-          <a:p>
-            <a:pPr marL="285750" indent="-285750" algn="ctr">
-              <a:buFont typeface="Arial" panose="020B0604020202020204" pitchFamily="34" charset="0"/>
-              <a:buChar char="•"/>
-            </a:pPr>
-            <a:r>
-              <a:rPr lang="it-IT" sz="1300" dirty="0" smtClean="0"/>
-              <a:t>Arancio = robot fisico/</a:t>
-            </a:r>
-            <a:r>
-              <a:rPr lang="it-IT" sz="1300" dirty="0" err="1" smtClean="0"/>
-              <a:t>virtual</a:t>
-            </a:r>
-            <a:endParaRPr lang="it-IT" sz="1300" dirty="0" smtClean="0"/>
-          </a:p>
-          <a:p>
-            <a:pPr marL="285750" indent="-285750" algn="ctr">
-              <a:buFont typeface="Arial" panose="020B0604020202020204" pitchFamily="34" charset="0"/>
-              <a:buChar char="•"/>
-            </a:pPr>
-            <a:r>
-              <a:rPr lang="it-IT" sz="1300" dirty="0" smtClean="0"/>
-              <a:t>Verde = contesto pc/</a:t>
-            </a:r>
-            <a:r>
-              <a:rPr lang="it-IT" sz="1300" dirty="0" err="1" smtClean="0"/>
-              <a:t>smartphone</a:t>
-            </a:r>
-            <a:r>
-              <a:rPr lang="it-IT" sz="1300" dirty="0" smtClean="0"/>
-              <a:t> </a:t>
-            </a:r>
-            <a:endParaRPr lang="it-IT" sz="1300" dirty="0"/>
+              <a:rPr lang="it-IT" u="sng" dirty="0" smtClean="0"/>
+              <a:t>Queste slide contengono una rappresentazione delle entità presenti, assolutamente informale e poco significativa, ma utile per vedere graficamente di quali pezzi si compone il sistema</a:t>
+            </a:r>
+            <a:endParaRPr lang="it-IT" u="sng" dirty="0"/>
           </a:p>
         </p:txBody>
       </p:sp>
     </p:spTree>
     <p:extLst>
       <p:ext uri="{BB962C8B-B14F-4D97-AF65-F5344CB8AC3E}">
-        <p14:creationId xmlns:p14="http://schemas.microsoft.com/office/powerpoint/2010/main" val="677034703"/>
+        <p14:creationId xmlns:p14="http://schemas.microsoft.com/office/powerpoint/2010/main" val="464794635"/>
       </p:ext>
     </p:extLst>
   </p:cSld>
   <p:clrMapOvr>
     <a:masterClrMapping/>
   </p:clrMapOvr>
+  <p:timing>
+    <p:tnLst>
+      <p:par>
+        <p:cTn id="1" dur="indefinite" restart="never" nodeType="tmRoot"/>
+      </p:par>
+    </p:tnLst>
+  </p:timing>
 </p:sld>
 </file>
 
@@ -3486,7 +3174,7 @@
         </p:nvSpPr>
         <p:spPr>
           <a:xfrm>
-            <a:off x="2285746" y="1412776"/>
+            <a:off x="2267744" y="1412776"/>
             <a:ext cx="4752528" cy="3816424"/>
           </a:xfrm>
           <a:prstGeom prst="rect">
@@ -3529,7 +3217,7 @@
         </p:nvSpPr>
         <p:spPr>
           <a:xfrm>
-            <a:off x="7730364" y="1916832"/>
+            <a:off x="7730364" y="1484784"/>
             <a:ext cx="1296144" cy="864096"/>
           </a:xfrm>
           <a:prstGeom prst="rect">
@@ -3578,7 +3266,7 @@
         </p:nvSpPr>
         <p:spPr>
           <a:xfrm>
-            <a:off x="7730364" y="3789040"/>
+            <a:off x="7730364" y="2762703"/>
             <a:ext cx="1296144" cy="864096"/>
           </a:xfrm>
           <a:prstGeom prst="rect">
@@ -3701,7 +3389,7 @@
         <p:spPr>
           <a:xfrm>
             <a:off x="1727176" y="3320988"/>
-            <a:ext cx="558570" cy="0"/>
+            <a:ext cx="540000" cy="0"/>
           </a:xfrm>
           <a:prstGeom prst="straightConnector1">
             <a:avLst/>
@@ -3737,7 +3425,7 @@
         </p:nvCxnSpPr>
         <p:spPr>
           <a:xfrm>
-            <a:off x="7020272" y="2348880"/>
+            <a:off x="7020272" y="1938148"/>
             <a:ext cx="710092" cy="0"/>
           </a:xfrm>
           <a:prstGeom prst="straightConnector1">
@@ -3774,7 +3462,7 @@
         </p:nvCxnSpPr>
         <p:spPr>
           <a:xfrm>
-            <a:off x="7020272" y="4221088"/>
+            <a:off x="7020272" y="3194751"/>
             <a:ext cx="710092" cy="0"/>
           </a:xfrm>
           <a:prstGeom prst="straightConnector1">
@@ -3805,350 +3493,7 @@
       </p:cxnSp>
       <p:sp>
         <p:nvSpPr>
-          <p:cNvPr id="2" name="Ovale 1"/>
-          <p:cNvSpPr/>
-          <p:nvPr/>
-        </p:nvSpPr>
-        <p:spPr>
-          <a:xfrm>
-            <a:off x="2663788" y="3091481"/>
-            <a:ext cx="1656184" cy="1152128"/>
-          </a:xfrm>
-          <a:prstGeom prst="ellipse">
-            <a:avLst/>
-          </a:prstGeom>
-          <a:ln>
-            <a:solidFill>
-              <a:schemeClr val="tx2"/>
-            </a:solidFill>
-          </a:ln>
-        </p:spPr>
-        <p:style>
-          <a:lnRef idx="2">
-            <a:schemeClr val="accent6"/>
-          </a:lnRef>
-          <a:fillRef idx="1">
-            <a:schemeClr val="lt1"/>
-          </a:fillRef>
-          <a:effectRef idx="0">
-            <a:schemeClr val="accent6"/>
-          </a:effectRef>
-          <a:fontRef idx="minor">
-            <a:schemeClr val="dk1"/>
-          </a:fontRef>
-        </p:style>
-        <p:txBody>
-          <a:bodyPr rtlCol="0" anchor="ctr"/>
-          <a:lstStyle/>
-          <a:p>
-            <a:pPr algn="ctr"/>
-            <a:r>
-              <a:rPr lang="it-IT" dirty="0" smtClean="0"/>
-              <a:t>Mind del Robot</a:t>
-            </a:r>
-            <a:endParaRPr lang="it-IT" dirty="0"/>
-          </a:p>
-        </p:txBody>
-      </p:sp>
-      <p:sp>
-        <p:nvSpPr>
-          <p:cNvPr id="10" name="Ovale 9"/>
-          <p:cNvSpPr/>
-          <p:nvPr/>
-        </p:nvSpPr>
-        <p:spPr>
-          <a:xfrm>
-            <a:off x="5004048" y="3091481"/>
-            <a:ext cx="1656184" cy="1152128"/>
-          </a:xfrm>
-          <a:prstGeom prst="ellipse">
-            <a:avLst/>
-          </a:prstGeom>
-          <a:ln>
-            <a:solidFill>
-              <a:schemeClr val="tx2"/>
-            </a:solidFill>
-          </a:ln>
-        </p:spPr>
-        <p:style>
-          <a:lnRef idx="2">
-            <a:schemeClr val="accent6"/>
-          </a:lnRef>
-          <a:fillRef idx="1">
-            <a:schemeClr val="lt1"/>
-          </a:fillRef>
-          <a:effectRef idx="0">
-            <a:schemeClr val="accent6"/>
-          </a:effectRef>
-          <a:fontRef idx="minor">
-            <a:schemeClr val="dk1"/>
-          </a:fontRef>
-        </p:style>
-        <p:txBody>
-          <a:bodyPr rtlCol="0" anchor="ctr"/>
-          <a:lstStyle/>
-          <a:p>
-            <a:pPr algn="ctr"/>
-            <a:r>
-              <a:rPr lang="it-IT" dirty="0" smtClean="0"/>
-              <a:t>Robot</a:t>
-            </a:r>
-          </a:p>
-          <a:p>
-            <a:pPr algn="ctr"/>
-            <a:r>
-              <a:rPr lang="it-IT" dirty="0" smtClean="0"/>
-              <a:t>Executor </a:t>
-            </a:r>
-            <a:endParaRPr lang="it-IT" dirty="0"/>
-          </a:p>
-        </p:txBody>
-      </p:sp>
-      <p:sp>
-        <p:nvSpPr>
-          <p:cNvPr id="6" name="Rettangolo arrotondato 5"/>
-          <p:cNvSpPr/>
-          <p:nvPr/>
-        </p:nvSpPr>
-        <p:spPr>
-          <a:xfrm>
-            <a:off x="3491880" y="1556792"/>
-            <a:ext cx="2340260" cy="914400"/>
-          </a:xfrm>
-          <a:prstGeom prst="roundRect">
-            <a:avLst/>
-          </a:prstGeom>
-          <a:ln>
-            <a:solidFill>
-              <a:schemeClr val="tx2"/>
-            </a:solidFill>
-          </a:ln>
-        </p:spPr>
-        <p:style>
-          <a:lnRef idx="2">
-            <a:schemeClr val="accent6"/>
-          </a:lnRef>
-          <a:fillRef idx="1">
-            <a:schemeClr val="lt1"/>
-          </a:fillRef>
-          <a:effectRef idx="0">
-            <a:schemeClr val="accent6"/>
-          </a:effectRef>
-          <a:fontRef idx="minor">
-            <a:schemeClr val="dk1"/>
-          </a:fontRef>
-        </p:style>
-        <p:txBody>
-          <a:bodyPr rtlCol="0" anchor="ctr"/>
-          <a:lstStyle/>
-          <a:p>
-            <a:pPr algn="ctr"/>
-            <a:r>
-              <a:rPr lang="it-IT" dirty="0" smtClean="0"/>
-              <a:t>Modello</a:t>
-            </a:r>
-            <a:endParaRPr lang="it-IT" dirty="0"/>
-          </a:p>
-        </p:txBody>
-      </p:sp>
-      <p:cxnSp>
-        <p:nvCxnSpPr>
-          <p:cNvPr id="13" name="Connettore 2 12"/>
-          <p:cNvCxnSpPr/>
-          <p:nvPr/>
-        </p:nvCxnSpPr>
-        <p:spPr>
-          <a:xfrm flipV="1">
-            <a:off x="3491880" y="2471192"/>
-            <a:ext cx="828092" cy="620289"/>
-          </a:xfrm>
-          <a:prstGeom prst="straightConnector1">
-            <a:avLst/>
-          </a:prstGeom>
-          <a:ln w="31750">
-            <a:solidFill>
-              <a:schemeClr val="tx2"/>
-            </a:solidFill>
-            <a:headEnd type="arrow"/>
-            <a:tailEnd type="arrow"/>
-          </a:ln>
-        </p:spPr>
-        <p:style>
-          <a:lnRef idx="1">
-            <a:schemeClr val="accent1"/>
-          </a:lnRef>
-          <a:fillRef idx="0">
-            <a:schemeClr val="accent1"/>
-          </a:fillRef>
-          <a:effectRef idx="0">
-            <a:schemeClr val="accent1"/>
-          </a:effectRef>
-          <a:fontRef idx="minor">
-            <a:schemeClr val="tx1"/>
-          </a:fontRef>
-        </p:style>
-      </p:cxnSp>
-      <p:cxnSp>
-        <p:nvCxnSpPr>
-          <p:cNvPr id="15" name="Connettore 2 14"/>
-          <p:cNvCxnSpPr>
-            <a:endCxn id="10" idx="2"/>
-          </p:cNvCxnSpPr>
-          <p:nvPr/>
-        </p:nvCxnSpPr>
-        <p:spPr>
-          <a:xfrm flipV="1">
-            <a:off x="4319972" y="3667545"/>
-            <a:ext cx="684076" cy="1"/>
-          </a:xfrm>
-          <a:prstGeom prst="straightConnector1">
-            <a:avLst/>
-          </a:prstGeom>
-          <a:ln w="31750">
-            <a:solidFill>
-              <a:schemeClr val="tx2"/>
-            </a:solidFill>
-            <a:headEnd type="arrow"/>
-            <a:tailEnd type="arrow"/>
-          </a:ln>
-        </p:spPr>
-        <p:style>
-          <a:lnRef idx="1">
-            <a:schemeClr val="accent1"/>
-          </a:lnRef>
-          <a:fillRef idx="0">
-            <a:schemeClr val="accent1"/>
-          </a:fillRef>
-          <a:effectRef idx="0">
-            <a:schemeClr val="accent1"/>
-          </a:effectRef>
-          <a:fontRef idx="minor">
-            <a:schemeClr val="tx1"/>
-          </a:fontRef>
-        </p:style>
-      </p:cxnSp>
-      <p:sp>
-        <p:nvSpPr>
-          <p:cNvPr id="19" name="Rettangolo 18"/>
-          <p:cNvSpPr/>
-          <p:nvPr/>
-        </p:nvSpPr>
-        <p:spPr>
-          <a:xfrm>
-            <a:off x="3932929" y="4509120"/>
-            <a:ext cx="1458162" cy="576064"/>
-          </a:xfrm>
-          <a:prstGeom prst="rect">
-            <a:avLst/>
-          </a:prstGeom>
-          <a:ln>
-            <a:solidFill>
-              <a:schemeClr val="tx2"/>
-            </a:solidFill>
-          </a:ln>
-        </p:spPr>
-        <p:style>
-          <a:lnRef idx="2">
-            <a:schemeClr val="accent6"/>
-          </a:lnRef>
-          <a:fillRef idx="1">
-            <a:schemeClr val="lt1"/>
-          </a:fillRef>
-          <a:effectRef idx="0">
-            <a:schemeClr val="accent6"/>
-          </a:effectRef>
-          <a:fontRef idx="minor">
-            <a:schemeClr val="dk1"/>
-          </a:fontRef>
-        </p:style>
-        <p:txBody>
-          <a:bodyPr rtlCol="0" anchor="ctr"/>
-          <a:lstStyle/>
-          <a:p>
-            <a:pPr algn="ctr"/>
-            <a:r>
-              <a:rPr lang="it-IT" dirty="0" smtClean="0"/>
-              <a:t>FrontEnd Server</a:t>
-            </a:r>
-            <a:endParaRPr lang="it-IT" dirty="0"/>
-          </a:p>
-        </p:txBody>
-      </p:sp>
-      <p:cxnSp>
-        <p:nvCxnSpPr>
-          <p:cNvPr id="23" name="Connettore 2 22"/>
-          <p:cNvCxnSpPr>
-            <a:stCxn id="10" idx="6"/>
-          </p:cNvCxnSpPr>
-          <p:nvPr/>
-        </p:nvCxnSpPr>
-        <p:spPr>
-          <a:xfrm flipV="1">
-            <a:off x="6660232" y="2348880"/>
-            <a:ext cx="360040" cy="1318665"/>
-          </a:xfrm>
-          <a:prstGeom prst="straightConnector1">
-            <a:avLst/>
-          </a:prstGeom>
-          <a:ln>
-            <a:headEnd type="arrow"/>
-            <a:tailEnd type="arrow"/>
-          </a:ln>
-        </p:spPr>
-        <p:style>
-          <a:lnRef idx="1">
-            <a:schemeClr val="accent1"/>
-          </a:lnRef>
-          <a:fillRef idx="0">
-            <a:schemeClr val="accent1"/>
-          </a:fillRef>
-          <a:effectRef idx="0">
-            <a:schemeClr val="accent1"/>
-          </a:effectRef>
-          <a:fontRef idx="minor">
-            <a:schemeClr val="tx1"/>
-          </a:fontRef>
-        </p:style>
-      </p:cxnSp>
-      <p:cxnSp>
-        <p:nvCxnSpPr>
-          <p:cNvPr id="25" name="Connettore 2 24"/>
-          <p:cNvCxnSpPr>
-            <a:stCxn id="10" idx="6"/>
-          </p:cNvCxnSpPr>
-          <p:nvPr/>
-        </p:nvCxnSpPr>
-        <p:spPr>
-          <a:xfrm>
-            <a:off x="6660232" y="3667545"/>
-            <a:ext cx="378042" cy="576064"/>
-          </a:xfrm>
-          <a:prstGeom prst="straightConnector1">
-            <a:avLst/>
-          </a:prstGeom>
-          <a:ln>
-            <a:headEnd type="arrow"/>
-            <a:tailEnd type="arrow"/>
-          </a:ln>
-        </p:spPr>
-        <p:style>
-          <a:lnRef idx="1">
-            <a:schemeClr val="accent1"/>
-          </a:lnRef>
-          <a:fillRef idx="0">
-            <a:schemeClr val="accent1"/>
-          </a:fillRef>
-          <a:effectRef idx="0">
-            <a:schemeClr val="accent1"/>
-          </a:effectRef>
-          <a:fontRef idx="minor">
-            <a:schemeClr val="tx1"/>
-          </a:fontRef>
-        </p:style>
-      </p:cxnSp>
-      <p:sp>
-        <p:nvSpPr>
-          <p:cNvPr id="17" name="Pergamena 1 16"/>
+          <p:cNvPr id="6" name="Pergamena 1 5"/>
           <p:cNvSpPr/>
           <p:nvPr/>
         </p:nvSpPr>
@@ -4231,16 +3576,195 @@
           </a:p>
         </p:txBody>
       </p:sp>
+      <p:sp>
+        <p:nvSpPr>
+          <p:cNvPr id="10" name="Rettangolo 9"/>
+          <p:cNvSpPr/>
+          <p:nvPr/>
+        </p:nvSpPr>
+        <p:spPr>
+          <a:xfrm>
+            <a:off x="7743746" y="3870265"/>
+            <a:ext cx="648072" cy="648072"/>
+          </a:xfrm>
+          <a:prstGeom prst="rect">
+            <a:avLst/>
+          </a:prstGeom>
+        </p:spPr>
+        <p:style>
+          <a:lnRef idx="2">
+            <a:schemeClr val="accent6"/>
+          </a:lnRef>
+          <a:fillRef idx="1">
+            <a:schemeClr val="lt1"/>
+          </a:fillRef>
+          <a:effectRef idx="0">
+            <a:schemeClr val="accent6"/>
+          </a:effectRef>
+          <a:fontRef idx="minor">
+            <a:schemeClr val="dk1"/>
+          </a:fontRef>
+        </p:style>
+        <p:txBody>
+          <a:bodyPr rtlCol="0" anchor="ctr"/>
+          <a:lstStyle/>
+          <a:p>
+            <a:pPr algn="ctr"/>
+            <a:r>
+              <a:rPr lang="it-IT" dirty="0" smtClean="0"/>
+              <a:t>LED</a:t>
+            </a:r>
+          </a:p>
+        </p:txBody>
+      </p:sp>
+      <p:sp>
+        <p:nvSpPr>
+          <p:cNvPr id="15" name="Rettangolo 14"/>
+          <p:cNvSpPr/>
+          <p:nvPr/>
+        </p:nvSpPr>
+        <p:spPr>
+          <a:xfrm>
+            <a:off x="7730364" y="4595548"/>
+            <a:ext cx="648072" cy="648072"/>
+          </a:xfrm>
+          <a:prstGeom prst="rect">
+            <a:avLst/>
+          </a:prstGeom>
+        </p:spPr>
+        <p:style>
+          <a:lnRef idx="2">
+            <a:schemeClr val="accent6"/>
+          </a:lnRef>
+          <a:fillRef idx="1">
+            <a:schemeClr val="lt1"/>
+          </a:fillRef>
+          <a:effectRef idx="0">
+            <a:schemeClr val="accent6"/>
+          </a:effectRef>
+          <a:fontRef idx="minor">
+            <a:schemeClr val="dk1"/>
+          </a:fontRef>
+        </p:style>
+        <p:txBody>
+          <a:bodyPr rtlCol="0" anchor="ctr"/>
+          <a:lstStyle/>
+          <a:p>
+            <a:pPr algn="ctr"/>
+            <a:r>
+              <a:rPr lang="it-IT" sz="1200" dirty="0" smtClean="0"/>
+              <a:t>LED</a:t>
+            </a:r>
+          </a:p>
+          <a:p>
+            <a:pPr algn="ctr"/>
+            <a:r>
+              <a:rPr lang="it-IT" sz="1200" dirty="0" smtClean="0"/>
+              <a:t>HUE</a:t>
+            </a:r>
+          </a:p>
+          <a:p>
+            <a:pPr algn="ctr"/>
+            <a:r>
+              <a:rPr lang="it-IT" sz="1200" dirty="0" smtClean="0"/>
+              <a:t>LAMP</a:t>
+            </a:r>
+          </a:p>
+        </p:txBody>
+      </p:sp>
+      <p:cxnSp>
+        <p:nvCxnSpPr>
+          <p:cNvPr id="18" name="Connettore 2 17"/>
+          <p:cNvCxnSpPr/>
+          <p:nvPr/>
+        </p:nvCxnSpPr>
+        <p:spPr>
+          <a:xfrm>
+            <a:off x="7033654" y="4194301"/>
+            <a:ext cx="710092" cy="0"/>
+          </a:xfrm>
+          <a:prstGeom prst="straightConnector1">
+            <a:avLst/>
+          </a:prstGeom>
+          <a:ln w="31750">
+            <a:solidFill>
+              <a:schemeClr val="tx2"/>
+            </a:solidFill>
+            <a:headEnd type="none"/>
+            <a:tailEnd type="arrow"/>
+          </a:ln>
+        </p:spPr>
+        <p:style>
+          <a:lnRef idx="1">
+            <a:schemeClr val="accent1"/>
+          </a:lnRef>
+          <a:fillRef idx="0">
+            <a:schemeClr val="accent1"/>
+          </a:fillRef>
+          <a:effectRef idx="0">
+            <a:schemeClr val="accent1"/>
+          </a:effectRef>
+          <a:fontRef idx="minor">
+            <a:schemeClr val="tx1"/>
+          </a:fontRef>
+        </p:style>
+      </p:cxnSp>
+      <p:cxnSp>
+        <p:nvCxnSpPr>
+          <p:cNvPr id="19" name="Connettore 2 18"/>
+          <p:cNvCxnSpPr>
+            <a:endCxn id="15" idx="1"/>
+          </p:cNvCxnSpPr>
+          <p:nvPr/>
+        </p:nvCxnSpPr>
+        <p:spPr>
+          <a:xfrm>
+            <a:off x="7033654" y="4194301"/>
+            <a:ext cx="696710" cy="725283"/>
+          </a:xfrm>
+          <a:prstGeom prst="straightConnector1">
+            <a:avLst/>
+          </a:prstGeom>
+          <a:ln w="31750">
+            <a:solidFill>
+              <a:schemeClr val="tx2"/>
+            </a:solidFill>
+            <a:headEnd type="none"/>
+            <a:tailEnd type="arrow"/>
+          </a:ln>
+        </p:spPr>
+        <p:style>
+          <a:lnRef idx="1">
+            <a:schemeClr val="accent1"/>
+          </a:lnRef>
+          <a:fillRef idx="0">
+            <a:schemeClr val="accent1"/>
+          </a:fillRef>
+          <a:effectRef idx="0">
+            <a:schemeClr val="accent1"/>
+          </a:effectRef>
+          <a:fontRef idx="minor">
+            <a:schemeClr val="tx1"/>
+          </a:fontRef>
+        </p:style>
+      </p:cxnSp>
     </p:spTree>
     <p:extLst>
       <p:ext uri="{BB962C8B-B14F-4D97-AF65-F5344CB8AC3E}">
-        <p14:creationId xmlns:p14="http://schemas.microsoft.com/office/powerpoint/2010/main" val="5359794"/>
+        <p14:creationId xmlns:p14="http://schemas.microsoft.com/office/powerpoint/2010/main" val="677034703"/>
       </p:ext>
     </p:extLst>
   </p:cSld>
   <p:clrMapOvr>
     <a:masterClrMapping/>
   </p:clrMapOvr>
+  <p:timing>
+    <p:tnLst>
+      <p:par>
+        <p:cTn id="1" dur="indefinite" restart="never" nodeType="tmRoot"/>
+      </p:par>
+    </p:tnLst>
+  </p:timing>
 </p:sld>
 </file>
 
@@ -4269,7 +3793,7 @@
         </p:nvSpPr>
         <p:spPr>
           <a:xfrm>
-            <a:off x="2285746" y="1426319"/>
+            <a:off x="2285746" y="1412776"/>
             <a:ext cx="4752528" cy="3816424"/>
           </a:xfrm>
           <a:prstGeom prst="rect">
@@ -4312,7 +3836,7 @@
         </p:nvSpPr>
         <p:spPr>
           <a:xfrm>
-            <a:off x="7730364" y="1916832"/>
+            <a:off x="7743746" y="1412776"/>
             <a:ext cx="1296144" cy="864096"/>
           </a:xfrm>
           <a:prstGeom prst="rect">
@@ -4361,7 +3885,7 @@
         </p:nvSpPr>
         <p:spPr>
           <a:xfrm>
-            <a:off x="7730364" y="3789040"/>
+            <a:off x="7730364" y="2816932"/>
             <a:ext cx="1296144" cy="864096"/>
           </a:xfrm>
           <a:prstGeom prst="rect">
@@ -4484,7 +4008,7 @@
         <p:spPr>
           <a:xfrm>
             <a:off x="1727176" y="3320988"/>
-            <a:ext cx="558570" cy="13543"/>
+            <a:ext cx="558570" cy="0"/>
           </a:xfrm>
           <a:prstGeom prst="straightConnector1">
             <a:avLst/>
@@ -4520,7 +4044,7 @@
         </p:nvCxnSpPr>
         <p:spPr>
           <a:xfrm>
-            <a:off x="7020272" y="2348880"/>
+            <a:off x="7038274" y="1852286"/>
             <a:ext cx="710092" cy="0"/>
           </a:xfrm>
           <a:prstGeom prst="straightConnector1">
@@ -4557,7 +4081,7 @@
         </p:nvCxnSpPr>
         <p:spPr>
           <a:xfrm>
-            <a:off x="7020272" y="4221088"/>
+            <a:off x="7038274" y="3285995"/>
             <a:ext cx="710092" cy="0"/>
           </a:xfrm>
           <a:prstGeom prst="straightConnector1">
@@ -4695,8 +4219,8 @@
         </p:nvSpPr>
         <p:spPr>
           <a:xfrm>
-            <a:off x="2497269" y="1556793"/>
-            <a:ext cx="1989221" cy="914400"/>
+            <a:off x="3491880" y="1556792"/>
+            <a:ext cx="2340260" cy="914400"/>
           </a:xfrm>
           <a:prstGeom prst="roundRect">
             <a:avLst/>
@@ -4737,15 +4261,13 @@
       <p:cxnSp>
         <p:nvCxnSpPr>
           <p:cNvPr id="13" name="Connettore 2 12"/>
-          <p:cNvCxnSpPr>
-            <a:stCxn id="2" idx="0"/>
-          </p:cNvCxnSpPr>
+          <p:cNvCxnSpPr/>
           <p:nvPr/>
         </p:nvCxnSpPr>
         <p:spPr>
           <a:xfrm flipV="1">
-            <a:off x="3491880" y="2471193"/>
-            <a:ext cx="0" cy="620288"/>
+            <a:off x="3491880" y="2471192"/>
+            <a:ext cx="828092" cy="620289"/>
           </a:xfrm>
           <a:prstGeom prst="straightConnector1">
             <a:avLst/>
@@ -4814,57 +4336,6 @@
       </p:cxnSp>
       <p:sp>
         <p:nvSpPr>
-          <p:cNvPr id="18" name="Rettangolo 17"/>
-          <p:cNvSpPr/>
-          <p:nvPr/>
-        </p:nvSpPr>
-        <p:spPr>
-          <a:xfrm>
-            <a:off x="3608893" y="5805264"/>
-            <a:ext cx="2052228" cy="864096"/>
-          </a:xfrm>
-          <a:prstGeom prst="rect">
-            <a:avLst/>
-          </a:prstGeom>
-        </p:spPr>
-        <p:style>
-          <a:lnRef idx="2">
-            <a:schemeClr val="accent1">
-              <a:shade val="50000"/>
-            </a:schemeClr>
-          </a:lnRef>
-          <a:fillRef idx="1">
-            <a:schemeClr val="accent1"/>
-          </a:fillRef>
-          <a:effectRef idx="0">
-            <a:schemeClr val="accent1"/>
-          </a:effectRef>
-          <a:fontRef idx="minor">
-            <a:schemeClr val="lt1"/>
-          </a:fontRef>
-        </p:style>
-        <p:txBody>
-          <a:bodyPr rtlCol="0" anchor="ctr"/>
-          <a:lstStyle/>
-          <a:p>
-            <a:pPr algn="ctr"/>
-            <a:r>
-              <a:rPr lang="it-IT" dirty="0" smtClean="0"/>
-              <a:t>Provider </a:t>
-            </a:r>
-          </a:p>
-          <a:p>
-            <a:pPr algn="ctr"/>
-            <a:r>
-              <a:rPr lang="it-IT" dirty="0" smtClean="0"/>
-              <a:t>Autenticatore</a:t>
-            </a:r>
-            <a:endParaRPr lang="it-IT" dirty="0"/>
-          </a:p>
-        </p:txBody>
-      </p:sp>
-      <p:sp>
-        <p:nvSpPr>
           <p:cNvPr id="19" name="Rettangolo 18"/>
           <p:cNvSpPr/>
           <p:nvPr/>
@@ -4920,8 +4391,1089 @@
         </p:nvCxnSpPr>
         <p:spPr>
           <a:xfrm flipV="1">
-            <a:off x="6660232" y="2348880"/>
-            <a:ext cx="360040" cy="1318665"/>
+            <a:off x="6660232" y="1852286"/>
+            <a:ext cx="360040" cy="1815259"/>
+          </a:xfrm>
+          <a:prstGeom prst="straightConnector1">
+            <a:avLst/>
+          </a:prstGeom>
+          <a:ln>
+            <a:headEnd type="arrow"/>
+            <a:tailEnd type="arrow"/>
+          </a:ln>
+        </p:spPr>
+        <p:style>
+          <a:lnRef idx="1">
+            <a:schemeClr val="accent1"/>
+          </a:lnRef>
+          <a:fillRef idx="0">
+            <a:schemeClr val="accent1"/>
+          </a:fillRef>
+          <a:effectRef idx="0">
+            <a:schemeClr val="accent1"/>
+          </a:effectRef>
+          <a:fontRef idx="minor">
+            <a:schemeClr val="tx1"/>
+          </a:fontRef>
+        </p:style>
+      </p:cxnSp>
+      <p:cxnSp>
+        <p:nvCxnSpPr>
+          <p:cNvPr id="25" name="Connettore 2 24"/>
+          <p:cNvCxnSpPr>
+            <a:stCxn id="10" idx="6"/>
+            <a:endCxn id="4" idx="3"/>
+          </p:cNvCxnSpPr>
+          <p:nvPr/>
+        </p:nvCxnSpPr>
+        <p:spPr>
+          <a:xfrm flipV="1">
+            <a:off x="6660232" y="3320988"/>
+            <a:ext cx="378042" cy="346557"/>
+          </a:xfrm>
+          <a:prstGeom prst="straightConnector1">
+            <a:avLst/>
+          </a:prstGeom>
+          <a:ln>
+            <a:headEnd type="arrow"/>
+            <a:tailEnd type="arrow"/>
+          </a:ln>
+        </p:spPr>
+        <p:style>
+          <a:lnRef idx="1">
+            <a:schemeClr val="accent1"/>
+          </a:lnRef>
+          <a:fillRef idx="0">
+            <a:schemeClr val="accent1"/>
+          </a:fillRef>
+          <a:effectRef idx="0">
+            <a:schemeClr val="accent1"/>
+          </a:effectRef>
+          <a:fontRef idx="minor">
+            <a:schemeClr val="tx1"/>
+          </a:fontRef>
+        </p:style>
+      </p:cxnSp>
+      <p:sp>
+        <p:nvSpPr>
+          <p:cNvPr id="17" name="Pergamena 1 16"/>
+          <p:cNvSpPr/>
+          <p:nvPr/>
+        </p:nvSpPr>
+        <p:spPr>
+          <a:xfrm>
+            <a:off x="179512" y="116632"/>
+            <a:ext cx="2088232" cy="1584176"/>
+          </a:xfrm>
+          <a:prstGeom prst="verticalScroll">
+            <a:avLst/>
+          </a:prstGeom>
+          <a:ln>
+            <a:solidFill>
+              <a:schemeClr val="bg2">
+                <a:lumMod val="50000"/>
+              </a:schemeClr>
+            </a:solidFill>
+          </a:ln>
+        </p:spPr>
+        <p:style>
+          <a:lnRef idx="2">
+            <a:schemeClr val="accent6"/>
+          </a:lnRef>
+          <a:fillRef idx="1">
+            <a:schemeClr val="lt1"/>
+          </a:fillRef>
+          <a:effectRef idx="0">
+            <a:schemeClr val="accent6"/>
+          </a:effectRef>
+          <a:fontRef idx="minor">
+            <a:schemeClr val="dk1"/>
+          </a:fontRef>
+        </p:style>
+        <p:txBody>
+          <a:bodyPr rtlCol="0" anchor="ctr"/>
+          <a:lstStyle/>
+          <a:p>
+            <a:pPr marL="285750" indent="-285750" algn="ctr">
+              <a:buFont typeface="Arial" panose="020B0604020202020204" pitchFamily="34" charset="0"/>
+              <a:buChar char="•"/>
+            </a:pPr>
+            <a:r>
+              <a:rPr lang="it-IT" sz="1300" dirty="0" smtClean="0"/>
+              <a:t>Blu = contesto robot</a:t>
+            </a:r>
+          </a:p>
+          <a:p>
+            <a:pPr marL="285750" indent="-285750" algn="ctr">
+              <a:buFont typeface="Arial" panose="020B0604020202020204" pitchFamily="34" charset="0"/>
+              <a:buChar char="•"/>
+            </a:pPr>
+            <a:r>
+              <a:rPr lang="it-IT" sz="1300" dirty="0" smtClean="0"/>
+              <a:t>Arancio = robot fisico/</a:t>
+            </a:r>
+            <a:r>
+              <a:rPr lang="it-IT" sz="1300" dirty="0" err="1" smtClean="0"/>
+              <a:t>virtual</a:t>
+            </a:r>
+            <a:endParaRPr lang="it-IT" sz="1300" dirty="0" smtClean="0"/>
+          </a:p>
+          <a:p>
+            <a:pPr marL="285750" indent="-285750" algn="ctr">
+              <a:buFont typeface="Arial" panose="020B0604020202020204" pitchFamily="34" charset="0"/>
+              <a:buChar char="•"/>
+            </a:pPr>
+            <a:r>
+              <a:rPr lang="it-IT" sz="1300" dirty="0" smtClean="0"/>
+              <a:t>Verde = contesto pc/</a:t>
+            </a:r>
+            <a:r>
+              <a:rPr lang="it-IT" sz="1300" dirty="0" err="1" smtClean="0"/>
+              <a:t>smartphone</a:t>
+            </a:r>
+            <a:r>
+              <a:rPr lang="it-IT" sz="1300" dirty="0" smtClean="0"/>
+              <a:t> </a:t>
+            </a:r>
+            <a:endParaRPr lang="it-IT" sz="1300" dirty="0"/>
+          </a:p>
+        </p:txBody>
+      </p:sp>
+      <p:sp>
+        <p:nvSpPr>
+          <p:cNvPr id="18" name="Rettangolo 17"/>
+          <p:cNvSpPr/>
+          <p:nvPr/>
+        </p:nvSpPr>
+        <p:spPr>
+          <a:xfrm>
+            <a:off x="7743746" y="3903801"/>
+            <a:ext cx="648072" cy="648072"/>
+          </a:xfrm>
+          <a:prstGeom prst="rect">
+            <a:avLst/>
+          </a:prstGeom>
+        </p:spPr>
+        <p:style>
+          <a:lnRef idx="2">
+            <a:schemeClr val="accent6"/>
+          </a:lnRef>
+          <a:fillRef idx="1">
+            <a:schemeClr val="lt1"/>
+          </a:fillRef>
+          <a:effectRef idx="0">
+            <a:schemeClr val="accent6"/>
+          </a:effectRef>
+          <a:fontRef idx="minor">
+            <a:schemeClr val="dk1"/>
+          </a:fontRef>
+        </p:style>
+        <p:txBody>
+          <a:bodyPr rtlCol="0" anchor="ctr"/>
+          <a:lstStyle/>
+          <a:p>
+            <a:pPr algn="ctr"/>
+            <a:r>
+              <a:rPr lang="it-IT" dirty="0" smtClean="0"/>
+              <a:t>LED</a:t>
+            </a:r>
+          </a:p>
+        </p:txBody>
+      </p:sp>
+      <p:sp>
+        <p:nvSpPr>
+          <p:cNvPr id="20" name="Rettangolo 19"/>
+          <p:cNvSpPr/>
+          <p:nvPr/>
+        </p:nvSpPr>
+        <p:spPr>
+          <a:xfrm>
+            <a:off x="7730364" y="4629084"/>
+            <a:ext cx="648072" cy="648072"/>
+          </a:xfrm>
+          <a:prstGeom prst="rect">
+            <a:avLst/>
+          </a:prstGeom>
+        </p:spPr>
+        <p:style>
+          <a:lnRef idx="2">
+            <a:schemeClr val="accent6"/>
+          </a:lnRef>
+          <a:fillRef idx="1">
+            <a:schemeClr val="lt1"/>
+          </a:fillRef>
+          <a:effectRef idx="0">
+            <a:schemeClr val="accent6"/>
+          </a:effectRef>
+          <a:fontRef idx="minor">
+            <a:schemeClr val="dk1"/>
+          </a:fontRef>
+        </p:style>
+        <p:txBody>
+          <a:bodyPr rtlCol="0" anchor="ctr"/>
+          <a:lstStyle/>
+          <a:p>
+            <a:pPr algn="ctr"/>
+            <a:r>
+              <a:rPr lang="it-IT" sz="1200" dirty="0" smtClean="0"/>
+              <a:t>LED</a:t>
+            </a:r>
+          </a:p>
+          <a:p>
+            <a:pPr algn="ctr"/>
+            <a:r>
+              <a:rPr lang="it-IT" sz="1200" dirty="0" smtClean="0"/>
+              <a:t>HUE</a:t>
+            </a:r>
+          </a:p>
+          <a:p>
+            <a:pPr algn="ctr"/>
+            <a:r>
+              <a:rPr lang="it-IT" sz="1200" dirty="0" smtClean="0"/>
+              <a:t>LAMP</a:t>
+            </a:r>
+          </a:p>
+        </p:txBody>
+      </p:sp>
+      <p:cxnSp>
+        <p:nvCxnSpPr>
+          <p:cNvPr id="21" name="Connettore 2 20"/>
+          <p:cNvCxnSpPr/>
+          <p:nvPr/>
+        </p:nvCxnSpPr>
+        <p:spPr>
+          <a:xfrm>
+            <a:off x="7033654" y="4227837"/>
+            <a:ext cx="710092" cy="0"/>
+          </a:xfrm>
+          <a:prstGeom prst="straightConnector1">
+            <a:avLst/>
+          </a:prstGeom>
+          <a:ln w="31750">
+            <a:solidFill>
+              <a:schemeClr val="tx2"/>
+            </a:solidFill>
+            <a:headEnd type="none"/>
+            <a:tailEnd type="arrow"/>
+          </a:ln>
+        </p:spPr>
+        <p:style>
+          <a:lnRef idx="1">
+            <a:schemeClr val="accent1"/>
+          </a:lnRef>
+          <a:fillRef idx="0">
+            <a:schemeClr val="accent1"/>
+          </a:fillRef>
+          <a:effectRef idx="0">
+            <a:schemeClr val="accent1"/>
+          </a:effectRef>
+          <a:fontRef idx="minor">
+            <a:schemeClr val="tx1"/>
+          </a:fontRef>
+        </p:style>
+      </p:cxnSp>
+      <p:cxnSp>
+        <p:nvCxnSpPr>
+          <p:cNvPr id="22" name="Connettore 2 21"/>
+          <p:cNvCxnSpPr>
+            <a:endCxn id="20" idx="1"/>
+          </p:cNvCxnSpPr>
+          <p:nvPr/>
+        </p:nvCxnSpPr>
+        <p:spPr>
+          <a:xfrm>
+            <a:off x="7033654" y="4227837"/>
+            <a:ext cx="696710" cy="725283"/>
+          </a:xfrm>
+          <a:prstGeom prst="straightConnector1">
+            <a:avLst/>
+          </a:prstGeom>
+          <a:ln w="31750">
+            <a:solidFill>
+              <a:schemeClr val="tx2"/>
+            </a:solidFill>
+            <a:headEnd type="none"/>
+            <a:tailEnd type="arrow"/>
+          </a:ln>
+        </p:spPr>
+        <p:style>
+          <a:lnRef idx="1">
+            <a:schemeClr val="accent1"/>
+          </a:lnRef>
+          <a:fillRef idx="0">
+            <a:schemeClr val="accent1"/>
+          </a:fillRef>
+          <a:effectRef idx="0">
+            <a:schemeClr val="accent1"/>
+          </a:effectRef>
+          <a:fontRef idx="minor">
+            <a:schemeClr val="tx1"/>
+          </a:fontRef>
+        </p:style>
+      </p:cxnSp>
+      <p:sp>
+        <p:nvSpPr>
+          <p:cNvPr id="24" name="Rettangolo 23"/>
+          <p:cNvSpPr/>
+          <p:nvPr/>
+        </p:nvSpPr>
+        <p:spPr>
+          <a:xfrm>
+            <a:off x="3593702" y="116632"/>
+            <a:ext cx="2322258" cy="864096"/>
+          </a:xfrm>
+          <a:prstGeom prst="rect">
+            <a:avLst/>
+          </a:prstGeom>
+        </p:spPr>
+        <p:style>
+          <a:lnRef idx="2">
+            <a:schemeClr val="accent1">
+              <a:shade val="50000"/>
+            </a:schemeClr>
+          </a:lnRef>
+          <a:fillRef idx="1">
+            <a:schemeClr val="accent1"/>
+          </a:fillRef>
+          <a:effectRef idx="0">
+            <a:schemeClr val="accent1"/>
+          </a:effectRef>
+          <a:fontRef idx="minor">
+            <a:schemeClr val="lt1"/>
+          </a:fontRef>
+        </p:style>
+        <p:txBody>
+          <a:bodyPr rtlCol="0" anchor="ctr"/>
+          <a:lstStyle/>
+          <a:p>
+            <a:pPr algn="ctr"/>
+            <a:r>
+              <a:rPr lang="it-IT" dirty="0" smtClean="0"/>
+              <a:t>Temperatura/Tempo</a:t>
+            </a:r>
+            <a:endParaRPr lang="it-IT" dirty="0"/>
+          </a:p>
+        </p:txBody>
+      </p:sp>
+      <p:cxnSp>
+        <p:nvCxnSpPr>
+          <p:cNvPr id="26" name="Connettore 2 25"/>
+          <p:cNvCxnSpPr/>
+          <p:nvPr/>
+        </p:nvCxnSpPr>
+        <p:spPr>
+          <a:xfrm>
+            <a:off x="4754831" y="980728"/>
+            <a:ext cx="0" cy="432048"/>
+          </a:xfrm>
+          <a:prstGeom prst="straightConnector1">
+            <a:avLst/>
+          </a:prstGeom>
+          <a:ln w="31750">
+            <a:solidFill>
+              <a:schemeClr val="tx2"/>
+            </a:solidFill>
+            <a:headEnd type="arrow"/>
+            <a:tailEnd type="arrow"/>
+          </a:ln>
+        </p:spPr>
+        <p:style>
+          <a:lnRef idx="1">
+            <a:schemeClr val="accent1"/>
+          </a:lnRef>
+          <a:fillRef idx="0">
+            <a:schemeClr val="accent1"/>
+          </a:fillRef>
+          <a:effectRef idx="0">
+            <a:schemeClr val="accent1"/>
+          </a:effectRef>
+          <a:fontRef idx="minor">
+            <a:schemeClr val="tx1"/>
+          </a:fontRef>
+        </p:style>
+      </p:cxnSp>
+    </p:spTree>
+    <p:extLst>
+      <p:ext uri="{BB962C8B-B14F-4D97-AF65-F5344CB8AC3E}">
+        <p14:creationId xmlns:p14="http://schemas.microsoft.com/office/powerpoint/2010/main" val="5359794"/>
+      </p:ext>
+    </p:extLst>
+  </p:cSld>
+  <p:clrMapOvr>
+    <a:masterClrMapping/>
+  </p:clrMapOvr>
+  <p:timing>
+    <p:tnLst>
+      <p:par>
+        <p:cTn id="1" dur="indefinite" restart="never" nodeType="tmRoot"/>
+      </p:par>
+    </p:tnLst>
+  </p:timing>
+</p:sld>
+</file>
+
+<file path=ppt/slides/slide4.xml><?xml version="1.0" encoding="utf-8"?>
+<p:sld xmlns:a="http://schemas.openxmlformats.org/drawingml/2006/main" xmlns:r="http://schemas.openxmlformats.org/officeDocument/2006/relationships" xmlns:p="http://schemas.openxmlformats.org/presentationml/2006/main">
+  <p:cSld>
+    <p:spTree>
+      <p:nvGrpSpPr>
+        <p:cNvPr id="1" name=""/>
+        <p:cNvGrpSpPr/>
+        <p:nvPr/>
+      </p:nvGrpSpPr>
+      <p:grpSpPr>
+        <a:xfrm>
+          <a:off x="0" y="0"/>
+          <a:ext cx="0" cy="0"/>
+          <a:chOff x="0" y="0"/>
+          <a:chExt cx="0" cy="0"/>
+        </a:xfrm>
+      </p:grpSpPr>
+      <p:sp>
+        <p:nvSpPr>
+          <p:cNvPr id="4" name="Rettangolo 3"/>
+          <p:cNvSpPr/>
+          <p:nvPr/>
+        </p:nvSpPr>
+        <p:spPr>
+          <a:xfrm>
+            <a:off x="2285746" y="1426319"/>
+            <a:ext cx="4752528" cy="3816424"/>
+          </a:xfrm>
+          <a:prstGeom prst="rect">
+            <a:avLst/>
+          </a:prstGeom>
+          <a:ln>
+            <a:solidFill>
+              <a:schemeClr val="tx2"/>
+            </a:solidFill>
+          </a:ln>
+        </p:spPr>
+        <p:style>
+          <a:lnRef idx="2">
+            <a:schemeClr val="accent6"/>
+          </a:lnRef>
+          <a:fillRef idx="1">
+            <a:schemeClr val="lt1"/>
+          </a:fillRef>
+          <a:effectRef idx="0">
+            <a:schemeClr val="accent6"/>
+          </a:effectRef>
+          <a:fontRef idx="minor">
+            <a:schemeClr val="dk1"/>
+          </a:fontRef>
+        </p:style>
+        <p:txBody>
+          <a:bodyPr rtlCol="0" anchor="ctr"/>
+          <a:lstStyle/>
+          <a:p>
+            <a:pPr algn="ctr"/>
+            <a:endParaRPr lang="it-IT"/>
+          </a:p>
+        </p:txBody>
+      </p:sp>
+      <p:sp>
+        <p:nvSpPr>
+          <p:cNvPr id="5" name="Rettangolo 4"/>
+          <p:cNvSpPr/>
+          <p:nvPr/>
+        </p:nvSpPr>
+        <p:spPr>
+          <a:xfrm>
+            <a:off x="7730364" y="1417443"/>
+            <a:ext cx="1296144" cy="864096"/>
+          </a:xfrm>
+          <a:prstGeom prst="rect">
+            <a:avLst/>
+          </a:prstGeom>
+          <a:ln/>
+        </p:spPr>
+        <p:style>
+          <a:lnRef idx="2">
+            <a:schemeClr val="accent6"/>
+          </a:lnRef>
+          <a:fillRef idx="1">
+            <a:schemeClr val="lt1"/>
+          </a:fillRef>
+          <a:effectRef idx="0">
+            <a:schemeClr val="accent6"/>
+          </a:effectRef>
+          <a:fontRef idx="minor">
+            <a:schemeClr val="dk1"/>
+          </a:fontRef>
+        </p:style>
+        <p:txBody>
+          <a:bodyPr rtlCol="0" anchor="ctr"/>
+          <a:lstStyle/>
+          <a:p>
+            <a:pPr algn="ctr"/>
+            <a:r>
+              <a:rPr lang="it-IT" dirty="0" smtClean="0"/>
+              <a:t>Robot</a:t>
+            </a:r>
+          </a:p>
+          <a:p>
+            <a:pPr algn="ctr"/>
+            <a:r>
+              <a:rPr lang="it-IT" dirty="0" smtClean="0"/>
+              <a:t>Fisico</a:t>
+            </a:r>
+          </a:p>
+        </p:txBody>
+      </p:sp>
+      <p:sp>
+        <p:nvSpPr>
+          <p:cNvPr id="7" name="Rettangolo 6"/>
+          <p:cNvSpPr/>
+          <p:nvPr/>
+        </p:nvSpPr>
+        <p:spPr>
+          <a:xfrm>
+            <a:off x="7730364" y="2659433"/>
+            <a:ext cx="1296144" cy="864096"/>
+          </a:xfrm>
+          <a:prstGeom prst="rect">
+            <a:avLst/>
+          </a:prstGeom>
+        </p:spPr>
+        <p:style>
+          <a:lnRef idx="2">
+            <a:schemeClr val="accent6"/>
+          </a:lnRef>
+          <a:fillRef idx="1">
+            <a:schemeClr val="lt1"/>
+          </a:fillRef>
+          <a:effectRef idx="0">
+            <a:schemeClr val="accent6"/>
+          </a:effectRef>
+          <a:fontRef idx="minor">
+            <a:schemeClr val="dk1"/>
+          </a:fontRef>
+        </p:style>
+        <p:txBody>
+          <a:bodyPr rtlCol="0" anchor="ctr"/>
+          <a:lstStyle/>
+          <a:p>
+            <a:pPr algn="ctr"/>
+            <a:r>
+              <a:rPr lang="it-IT" dirty="0" smtClean="0"/>
+              <a:t>Robot</a:t>
+            </a:r>
+          </a:p>
+          <a:p>
+            <a:pPr algn="ctr"/>
+            <a:r>
+              <a:rPr lang="it-IT" dirty="0" smtClean="0"/>
+              <a:t>Virtuale</a:t>
+            </a:r>
+          </a:p>
+        </p:txBody>
+      </p:sp>
+      <p:sp>
+        <p:nvSpPr>
+          <p:cNvPr id="8" name="Rettangolo 7"/>
+          <p:cNvSpPr/>
+          <p:nvPr/>
+        </p:nvSpPr>
+        <p:spPr>
+          <a:xfrm>
+            <a:off x="179512" y="2816932"/>
+            <a:ext cx="1547664" cy="1008112"/>
+          </a:xfrm>
+          <a:prstGeom prst="rect">
+            <a:avLst/>
+          </a:prstGeom>
+          <a:solidFill>
+            <a:schemeClr val="bg1"/>
+          </a:solidFill>
+          <a:ln>
+            <a:solidFill>
+              <a:srgbClr val="00B050"/>
+            </a:solidFill>
+          </a:ln>
+        </p:spPr>
+        <p:style>
+          <a:lnRef idx="2">
+            <a:schemeClr val="accent1">
+              <a:shade val="50000"/>
+            </a:schemeClr>
+          </a:lnRef>
+          <a:fillRef idx="1">
+            <a:schemeClr val="accent1"/>
+          </a:fillRef>
+          <a:effectRef idx="0">
+            <a:schemeClr val="accent1"/>
+          </a:effectRef>
+          <a:fontRef idx="minor">
+            <a:schemeClr val="lt1"/>
+          </a:fontRef>
+        </p:style>
+        <p:txBody>
+          <a:bodyPr rtlCol="0" anchor="ctr"/>
+          <a:lstStyle/>
+          <a:p>
+            <a:pPr algn="ctr"/>
+            <a:r>
+              <a:rPr lang="it-IT" dirty="0" smtClean="0">
+                <a:solidFill>
+                  <a:schemeClr val="tx1"/>
+                </a:solidFill>
+              </a:rPr>
+              <a:t>Utente</a:t>
+            </a:r>
+          </a:p>
+        </p:txBody>
+      </p:sp>
+      <p:cxnSp>
+        <p:nvCxnSpPr>
+          <p:cNvPr id="3" name="Connettore 2 2"/>
+          <p:cNvCxnSpPr>
+            <a:stCxn id="8" idx="3"/>
+            <a:endCxn id="4" idx="1"/>
+          </p:cNvCxnSpPr>
+          <p:nvPr/>
+        </p:nvCxnSpPr>
+        <p:spPr>
+          <a:xfrm>
+            <a:off x="1727176" y="3320988"/>
+            <a:ext cx="558570" cy="13543"/>
+          </a:xfrm>
+          <a:prstGeom prst="straightConnector1">
+            <a:avLst/>
+          </a:prstGeom>
+          <a:ln w="31750">
+            <a:solidFill>
+              <a:schemeClr val="tx2"/>
+            </a:solidFill>
+            <a:headEnd type="arrow"/>
+            <a:tailEnd type="arrow"/>
+          </a:ln>
+        </p:spPr>
+        <p:style>
+          <a:lnRef idx="1">
+            <a:schemeClr val="accent1"/>
+          </a:lnRef>
+          <a:fillRef idx="0">
+            <a:schemeClr val="accent1"/>
+          </a:fillRef>
+          <a:effectRef idx="0">
+            <a:schemeClr val="accent1"/>
+          </a:effectRef>
+          <a:fontRef idx="minor">
+            <a:schemeClr val="tx1"/>
+          </a:fontRef>
+        </p:style>
+      </p:cxnSp>
+      <p:cxnSp>
+        <p:nvCxnSpPr>
+          <p:cNvPr id="9" name="Connettore 2 8"/>
+          <p:cNvCxnSpPr/>
+          <p:nvPr/>
+        </p:nvCxnSpPr>
+        <p:spPr>
+          <a:xfrm>
+            <a:off x="7020272" y="1849491"/>
+            <a:ext cx="710092" cy="0"/>
+          </a:xfrm>
+          <a:prstGeom prst="straightConnector1">
+            <a:avLst/>
+          </a:prstGeom>
+          <a:ln w="31750">
+            <a:solidFill>
+              <a:schemeClr val="tx2"/>
+            </a:solidFill>
+            <a:headEnd type="arrow"/>
+            <a:tailEnd type="arrow"/>
+          </a:ln>
+        </p:spPr>
+        <p:style>
+          <a:lnRef idx="1">
+            <a:schemeClr val="accent1"/>
+          </a:lnRef>
+          <a:fillRef idx="0">
+            <a:schemeClr val="accent1"/>
+          </a:fillRef>
+          <a:effectRef idx="0">
+            <a:schemeClr val="accent1"/>
+          </a:effectRef>
+          <a:fontRef idx="minor">
+            <a:schemeClr val="tx1"/>
+          </a:fontRef>
+        </p:style>
+      </p:cxnSp>
+      <p:cxnSp>
+        <p:nvCxnSpPr>
+          <p:cNvPr id="11" name="Connettore 2 10"/>
+          <p:cNvCxnSpPr/>
+          <p:nvPr/>
+        </p:nvCxnSpPr>
+        <p:spPr>
+          <a:xfrm>
+            <a:off x="7038274" y="3091481"/>
+            <a:ext cx="710092" cy="0"/>
+          </a:xfrm>
+          <a:prstGeom prst="straightConnector1">
+            <a:avLst/>
+          </a:prstGeom>
+          <a:ln w="31750">
+            <a:solidFill>
+              <a:schemeClr val="tx2"/>
+            </a:solidFill>
+            <a:headEnd type="arrow"/>
+            <a:tailEnd type="arrow"/>
+          </a:ln>
+        </p:spPr>
+        <p:style>
+          <a:lnRef idx="1">
+            <a:schemeClr val="accent1"/>
+          </a:lnRef>
+          <a:fillRef idx="0">
+            <a:schemeClr val="accent1"/>
+          </a:fillRef>
+          <a:effectRef idx="0">
+            <a:schemeClr val="accent1"/>
+          </a:effectRef>
+          <a:fontRef idx="minor">
+            <a:schemeClr val="tx1"/>
+          </a:fontRef>
+        </p:style>
+      </p:cxnSp>
+      <p:sp>
+        <p:nvSpPr>
+          <p:cNvPr id="2" name="Ovale 1"/>
+          <p:cNvSpPr/>
+          <p:nvPr/>
+        </p:nvSpPr>
+        <p:spPr>
+          <a:xfrm>
+            <a:off x="2663788" y="3091481"/>
+            <a:ext cx="1656184" cy="1152128"/>
+          </a:xfrm>
+          <a:prstGeom prst="ellipse">
+            <a:avLst/>
+          </a:prstGeom>
+          <a:ln>
+            <a:solidFill>
+              <a:schemeClr val="tx2"/>
+            </a:solidFill>
+          </a:ln>
+        </p:spPr>
+        <p:style>
+          <a:lnRef idx="2">
+            <a:schemeClr val="accent6"/>
+          </a:lnRef>
+          <a:fillRef idx="1">
+            <a:schemeClr val="lt1"/>
+          </a:fillRef>
+          <a:effectRef idx="0">
+            <a:schemeClr val="accent6"/>
+          </a:effectRef>
+          <a:fontRef idx="minor">
+            <a:schemeClr val="dk1"/>
+          </a:fontRef>
+        </p:style>
+        <p:txBody>
+          <a:bodyPr rtlCol="0" anchor="ctr"/>
+          <a:lstStyle/>
+          <a:p>
+            <a:pPr algn="ctr"/>
+            <a:r>
+              <a:rPr lang="it-IT" dirty="0" smtClean="0"/>
+              <a:t>Mind del Robot</a:t>
+            </a:r>
+            <a:endParaRPr lang="it-IT" dirty="0"/>
+          </a:p>
+        </p:txBody>
+      </p:sp>
+      <p:sp>
+        <p:nvSpPr>
+          <p:cNvPr id="10" name="Ovale 9"/>
+          <p:cNvSpPr/>
+          <p:nvPr/>
+        </p:nvSpPr>
+        <p:spPr>
+          <a:xfrm>
+            <a:off x="5004048" y="3091481"/>
+            <a:ext cx="1656184" cy="1152128"/>
+          </a:xfrm>
+          <a:prstGeom prst="ellipse">
+            <a:avLst/>
+          </a:prstGeom>
+          <a:ln>
+            <a:solidFill>
+              <a:schemeClr val="tx2"/>
+            </a:solidFill>
+          </a:ln>
+        </p:spPr>
+        <p:style>
+          <a:lnRef idx="2">
+            <a:schemeClr val="accent6"/>
+          </a:lnRef>
+          <a:fillRef idx="1">
+            <a:schemeClr val="lt1"/>
+          </a:fillRef>
+          <a:effectRef idx="0">
+            <a:schemeClr val="accent6"/>
+          </a:effectRef>
+          <a:fontRef idx="minor">
+            <a:schemeClr val="dk1"/>
+          </a:fontRef>
+        </p:style>
+        <p:txBody>
+          <a:bodyPr rtlCol="0" anchor="ctr"/>
+          <a:lstStyle/>
+          <a:p>
+            <a:pPr algn="ctr"/>
+            <a:r>
+              <a:rPr lang="it-IT" dirty="0" smtClean="0"/>
+              <a:t>Robot</a:t>
+            </a:r>
+          </a:p>
+          <a:p>
+            <a:pPr algn="ctr"/>
+            <a:r>
+              <a:rPr lang="it-IT" dirty="0" smtClean="0"/>
+              <a:t>Executor </a:t>
+            </a:r>
+            <a:endParaRPr lang="it-IT" dirty="0"/>
+          </a:p>
+        </p:txBody>
+      </p:sp>
+      <p:sp>
+        <p:nvSpPr>
+          <p:cNvPr id="6" name="Rettangolo arrotondato 5"/>
+          <p:cNvSpPr/>
+          <p:nvPr/>
+        </p:nvSpPr>
+        <p:spPr>
+          <a:xfrm>
+            <a:off x="2497269" y="1556793"/>
+            <a:ext cx="1989221" cy="914400"/>
+          </a:xfrm>
+          <a:prstGeom prst="roundRect">
+            <a:avLst/>
+          </a:prstGeom>
+          <a:ln>
+            <a:solidFill>
+              <a:schemeClr val="tx2"/>
+            </a:solidFill>
+          </a:ln>
+        </p:spPr>
+        <p:style>
+          <a:lnRef idx="2">
+            <a:schemeClr val="accent6"/>
+          </a:lnRef>
+          <a:fillRef idx="1">
+            <a:schemeClr val="lt1"/>
+          </a:fillRef>
+          <a:effectRef idx="0">
+            <a:schemeClr val="accent6"/>
+          </a:effectRef>
+          <a:fontRef idx="minor">
+            <a:schemeClr val="dk1"/>
+          </a:fontRef>
+        </p:style>
+        <p:txBody>
+          <a:bodyPr rtlCol="0" anchor="ctr"/>
+          <a:lstStyle/>
+          <a:p>
+            <a:pPr algn="ctr"/>
+            <a:r>
+              <a:rPr lang="it-IT" dirty="0" smtClean="0"/>
+              <a:t>Modello</a:t>
+            </a:r>
+            <a:endParaRPr lang="it-IT" dirty="0"/>
+          </a:p>
+        </p:txBody>
+      </p:sp>
+      <p:cxnSp>
+        <p:nvCxnSpPr>
+          <p:cNvPr id="13" name="Connettore 2 12"/>
+          <p:cNvCxnSpPr>
+            <a:stCxn id="2" idx="0"/>
+          </p:cNvCxnSpPr>
+          <p:nvPr/>
+        </p:nvCxnSpPr>
+        <p:spPr>
+          <a:xfrm flipV="1">
+            <a:off x="3491880" y="2471193"/>
+            <a:ext cx="0" cy="620288"/>
+          </a:xfrm>
+          <a:prstGeom prst="straightConnector1">
+            <a:avLst/>
+          </a:prstGeom>
+          <a:ln w="31750">
+            <a:solidFill>
+              <a:schemeClr val="tx2"/>
+            </a:solidFill>
+            <a:headEnd type="arrow"/>
+            <a:tailEnd type="arrow"/>
+          </a:ln>
+        </p:spPr>
+        <p:style>
+          <a:lnRef idx="1">
+            <a:schemeClr val="accent1"/>
+          </a:lnRef>
+          <a:fillRef idx="0">
+            <a:schemeClr val="accent1"/>
+          </a:fillRef>
+          <a:effectRef idx="0">
+            <a:schemeClr val="accent1"/>
+          </a:effectRef>
+          <a:fontRef idx="minor">
+            <a:schemeClr val="tx1"/>
+          </a:fontRef>
+        </p:style>
+      </p:cxnSp>
+      <p:cxnSp>
+        <p:nvCxnSpPr>
+          <p:cNvPr id="15" name="Connettore 2 14"/>
+          <p:cNvCxnSpPr>
+            <a:endCxn id="10" idx="2"/>
+          </p:cNvCxnSpPr>
+          <p:nvPr/>
+        </p:nvCxnSpPr>
+        <p:spPr>
+          <a:xfrm flipV="1">
+            <a:off x="4319972" y="3667545"/>
+            <a:ext cx="684076" cy="1"/>
+          </a:xfrm>
+          <a:prstGeom prst="straightConnector1">
+            <a:avLst/>
+          </a:prstGeom>
+          <a:ln w="31750">
+            <a:solidFill>
+              <a:schemeClr val="tx2"/>
+            </a:solidFill>
+            <a:headEnd type="arrow"/>
+            <a:tailEnd type="arrow"/>
+          </a:ln>
+        </p:spPr>
+        <p:style>
+          <a:lnRef idx="1">
+            <a:schemeClr val="accent1"/>
+          </a:lnRef>
+          <a:fillRef idx="0">
+            <a:schemeClr val="accent1"/>
+          </a:fillRef>
+          <a:effectRef idx="0">
+            <a:schemeClr val="accent1"/>
+          </a:effectRef>
+          <a:fontRef idx="minor">
+            <a:schemeClr val="tx1"/>
+          </a:fontRef>
+        </p:style>
+      </p:cxnSp>
+      <p:sp>
+        <p:nvSpPr>
+          <p:cNvPr id="18" name="Rettangolo 17"/>
+          <p:cNvSpPr/>
+          <p:nvPr/>
+        </p:nvSpPr>
+        <p:spPr>
+          <a:xfrm>
+            <a:off x="3608893" y="5805264"/>
+            <a:ext cx="2052228" cy="864096"/>
+          </a:xfrm>
+          <a:prstGeom prst="rect">
+            <a:avLst/>
+          </a:prstGeom>
+        </p:spPr>
+        <p:style>
+          <a:lnRef idx="2">
+            <a:schemeClr val="accent1">
+              <a:shade val="50000"/>
+            </a:schemeClr>
+          </a:lnRef>
+          <a:fillRef idx="1">
+            <a:schemeClr val="accent1"/>
+          </a:fillRef>
+          <a:effectRef idx="0">
+            <a:schemeClr val="accent1"/>
+          </a:effectRef>
+          <a:fontRef idx="minor">
+            <a:schemeClr val="lt1"/>
+          </a:fontRef>
+        </p:style>
+        <p:txBody>
+          <a:bodyPr rtlCol="0" anchor="ctr"/>
+          <a:lstStyle/>
+          <a:p>
+            <a:pPr algn="ctr"/>
+            <a:r>
+              <a:rPr lang="it-IT" dirty="0" smtClean="0"/>
+              <a:t>Provider </a:t>
+            </a:r>
+          </a:p>
+          <a:p>
+            <a:pPr algn="ctr"/>
+            <a:r>
+              <a:rPr lang="it-IT" dirty="0" smtClean="0"/>
+              <a:t>Autenticatore</a:t>
+            </a:r>
+            <a:endParaRPr lang="it-IT" dirty="0"/>
+          </a:p>
+        </p:txBody>
+      </p:sp>
+      <p:sp>
+        <p:nvSpPr>
+          <p:cNvPr id="19" name="Rettangolo 18"/>
+          <p:cNvSpPr/>
+          <p:nvPr/>
+        </p:nvSpPr>
+        <p:spPr>
+          <a:xfrm>
+            <a:off x="3932929" y="4509120"/>
+            <a:ext cx="1458162" cy="576064"/>
+          </a:xfrm>
+          <a:prstGeom prst="rect">
+            <a:avLst/>
+          </a:prstGeom>
+          <a:ln>
+            <a:solidFill>
+              <a:schemeClr val="tx2"/>
+            </a:solidFill>
+          </a:ln>
+        </p:spPr>
+        <p:style>
+          <a:lnRef idx="2">
+            <a:schemeClr val="accent6"/>
+          </a:lnRef>
+          <a:fillRef idx="1">
+            <a:schemeClr val="lt1"/>
+          </a:fillRef>
+          <a:effectRef idx="0">
+            <a:schemeClr val="accent6"/>
+          </a:effectRef>
+          <a:fontRef idx="minor">
+            <a:schemeClr val="dk1"/>
+          </a:fontRef>
+        </p:style>
+        <p:txBody>
+          <a:bodyPr rtlCol="0" anchor="ctr"/>
+          <a:lstStyle/>
+          <a:p>
+            <a:pPr algn="ctr"/>
+            <a:r>
+              <a:rPr lang="it-IT" dirty="0" smtClean="0"/>
+              <a:t>FrontEnd Server</a:t>
+            </a:r>
+            <a:endParaRPr lang="it-IT" dirty="0"/>
+          </a:p>
+        </p:txBody>
+      </p:sp>
+      <p:cxnSp>
+        <p:nvCxnSpPr>
+          <p:cNvPr id="23" name="Connettore 2 22"/>
+          <p:cNvCxnSpPr>
+            <a:stCxn id="10" idx="6"/>
+          </p:cNvCxnSpPr>
+          <p:nvPr/>
+        </p:nvCxnSpPr>
+        <p:spPr>
+          <a:xfrm flipV="1">
+            <a:off x="6660232" y="1849491"/>
+            <a:ext cx="378042" cy="1818054"/>
           </a:xfrm>
           <a:prstGeom prst="straightConnector1">
             <a:avLst/>
@@ -4955,9 +5507,9 @@
           <p:nvPr/>
         </p:nvCxnSpPr>
         <p:spPr>
-          <a:xfrm>
-            <a:off x="6660232" y="3667545"/>
-            <a:ext cx="378042" cy="576064"/>
+          <a:xfrm flipV="1">
+            <a:off x="6660232" y="3091481"/>
+            <a:ext cx="360040" cy="576064"/>
           </a:xfrm>
           <a:prstGeom prst="straightConnector1">
             <a:avLst/>
@@ -5615,6 +6167,178 @@
           </a:p>
         </p:txBody>
       </p:sp>
+      <p:sp>
+        <p:nvSpPr>
+          <p:cNvPr id="34" name="Rettangolo 33"/>
+          <p:cNvSpPr/>
+          <p:nvPr/>
+        </p:nvSpPr>
+        <p:spPr>
+          <a:xfrm>
+            <a:off x="7743746" y="3903801"/>
+            <a:ext cx="648072" cy="648072"/>
+          </a:xfrm>
+          <a:prstGeom prst="rect">
+            <a:avLst/>
+          </a:prstGeom>
+        </p:spPr>
+        <p:style>
+          <a:lnRef idx="2">
+            <a:schemeClr val="accent6"/>
+          </a:lnRef>
+          <a:fillRef idx="1">
+            <a:schemeClr val="lt1"/>
+          </a:fillRef>
+          <a:effectRef idx="0">
+            <a:schemeClr val="accent6"/>
+          </a:effectRef>
+          <a:fontRef idx="minor">
+            <a:schemeClr val="dk1"/>
+          </a:fontRef>
+        </p:style>
+        <p:txBody>
+          <a:bodyPr rtlCol="0" anchor="ctr"/>
+          <a:lstStyle/>
+          <a:p>
+            <a:pPr algn="ctr"/>
+            <a:r>
+              <a:rPr lang="it-IT" dirty="0" smtClean="0"/>
+              <a:t>LED</a:t>
+            </a:r>
+          </a:p>
+        </p:txBody>
+      </p:sp>
+      <p:sp>
+        <p:nvSpPr>
+          <p:cNvPr id="37" name="Rettangolo 36"/>
+          <p:cNvSpPr/>
+          <p:nvPr/>
+        </p:nvSpPr>
+        <p:spPr>
+          <a:xfrm>
+            <a:off x="7730364" y="4629084"/>
+            <a:ext cx="648072" cy="648072"/>
+          </a:xfrm>
+          <a:prstGeom prst="rect">
+            <a:avLst/>
+          </a:prstGeom>
+        </p:spPr>
+        <p:style>
+          <a:lnRef idx="2">
+            <a:schemeClr val="accent6"/>
+          </a:lnRef>
+          <a:fillRef idx="1">
+            <a:schemeClr val="lt1"/>
+          </a:fillRef>
+          <a:effectRef idx="0">
+            <a:schemeClr val="accent6"/>
+          </a:effectRef>
+          <a:fontRef idx="minor">
+            <a:schemeClr val="dk1"/>
+          </a:fontRef>
+        </p:style>
+        <p:txBody>
+          <a:bodyPr rtlCol="0" anchor="ctr"/>
+          <a:lstStyle/>
+          <a:p>
+            <a:pPr algn="ctr"/>
+            <a:r>
+              <a:rPr lang="it-IT" sz="1200" dirty="0" smtClean="0"/>
+              <a:t>LED</a:t>
+            </a:r>
+          </a:p>
+          <a:p>
+            <a:pPr algn="ctr"/>
+            <a:r>
+              <a:rPr lang="it-IT" sz="1200" dirty="0" smtClean="0"/>
+              <a:t>HUE</a:t>
+            </a:r>
+          </a:p>
+          <a:p>
+            <a:pPr algn="ctr"/>
+            <a:r>
+              <a:rPr lang="it-IT" sz="1200" dirty="0" smtClean="0"/>
+              <a:t>LAMP</a:t>
+            </a:r>
+          </a:p>
+        </p:txBody>
+      </p:sp>
+      <p:cxnSp>
+        <p:nvCxnSpPr>
+          <p:cNvPr id="39" name="Connettore 2 38"/>
+          <p:cNvCxnSpPr/>
+          <p:nvPr/>
+        </p:nvCxnSpPr>
+        <p:spPr>
+          <a:xfrm>
+            <a:off x="7033654" y="4227837"/>
+            <a:ext cx="710092" cy="0"/>
+          </a:xfrm>
+          <a:prstGeom prst="straightConnector1">
+            <a:avLst/>
+          </a:prstGeom>
+          <a:ln w="31750">
+            <a:solidFill>
+              <a:schemeClr val="tx2"/>
+            </a:solidFill>
+            <a:headEnd type="none"/>
+            <a:tailEnd type="arrow"/>
+          </a:ln>
+        </p:spPr>
+        <p:style>
+          <a:lnRef idx="1">
+            <a:schemeClr val="accent1"/>
+          </a:lnRef>
+          <a:fillRef idx="0">
+            <a:schemeClr val="accent1"/>
+          </a:fillRef>
+          <a:effectRef idx="0">
+            <a:schemeClr val="accent1"/>
+          </a:effectRef>
+          <a:fontRef idx="minor">
+            <a:schemeClr val="tx1"/>
+          </a:fontRef>
+        </p:style>
+      </p:cxnSp>
+      <p:cxnSp>
+        <p:nvCxnSpPr>
+          <p:cNvPr id="41" name="Connettore 2 40"/>
+          <p:cNvCxnSpPr>
+            <a:endCxn id="37" idx="1"/>
+          </p:cNvCxnSpPr>
+          <p:nvPr/>
+        </p:nvCxnSpPr>
+        <p:spPr>
+          <a:xfrm>
+            <a:off x="7033654" y="4227837"/>
+            <a:ext cx="696710" cy="725283"/>
+          </a:xfrm>
+          <a:prstGeom prst="straightConnector1">
+            <a:avLst/>
+          </a:prstGeom>
+          <a:ln w="31750">
+            <a:solidFill>
+              <a:schemeClr val="tx2"/>
+            </a:solidFill>
+            <a:headEnd type="none"/>
+            <a:tailEnd type="arrow"/>
+          </a:ln>
+        </p:spPr>
+        <p:style>
+          <a:lnRef idx="1">
+            <a:schemeClr val="accent1"/>
+          </a:lnRef>
+          <a:fillRef idx="0">
+            <a:schemeClr val="accent1"/>
+          </a:fillRef>
+          <a:effectRef idx="0">
+            <a:schemeClr val="accent1"/>
+          </a:effectRef>
+          <a:fontRef idx="minor">
+            <a:schemeClr val="tx1"/>
+          </a:fontRef>
+        </p:style>
+      </p:cxnSp>
     </p:spTree>
     <p:extLst>
       <p:ext uri="{BB962C8B-B14F-4D97-AF65-F5344CB8AC3E}">
@@ -5625,10 +6349,17 @@
   <p:clrMapOvr>
     <a:masterClrMapping/>
   </p:clrMapOvr>
+  <p:timing>
+    <p:tnLst>
+      <p:par>
+        <p:cTn id="1" dur="indefinite" restart="never" nodeType="tmRoot"/>
+      </p:par>
+    </p:tnLst>
+  </p:timing>
 </p:sld>
 </file>
 
-<file path=ppt/slides/slide4.xml><?xml version="1.0" encoding="utf-8"?>
+<file path=ppt/slides/slide5.xml><?xml version="1.0" encoding="utf-8"?>
 <p:sld xmlns:a="http://schemas.openxmlformats.org/drawingml/2006/main" xmlns:r="http://schemas.openxmlformats.org/officeDocument/2006/relationships" xmlns:p="http://schemas.openxmlformats.org/presentationml/2006/main">
   <p:cSld>
     <p:spTree>
@@ -5696,7 +6427,7 @@
         </p:nvSpPr>
         <p:spPr>
           <a:xfrm>
-            <a:off x="7730364" y="1916832"/>
+            <a:off x="7730364" y="1394017"/>
             <a:ext cx="1296144" cy="864096"/>
           </a:xfrm>
           <a:prstGeom prst="rect">
@@ -5745,7 +6476,7 @@
         </p:nvSpPr>
         <p:spPr>
           <a:xfrm>
-            <a:off x="7730364" y="3789040"/>
+            <a:off x="7748366" y="2760571"/>
             <a:ext cx="1296144" cy="864096"/>
           </a:xfrm>
           <a:prstGeom prst="rect">
@@ -5838,37 +6569,20 @@
               <a:t>Utente</a:t>
             </a:r>
           </a:p>
-          <a:p>
-            <a:pPr algn="ctr"/>
-            <a:r>
-              <a:rPr lang="it-IT" dirty="0" smtClean="0">
-                <a:solidFill>
-                  <a:schemeClr val="tx1"/>
-                </a:solidFill>
-              </a:rPr>
-              <a:t>Autorizzato</a:t>
-            </a:r>
-            <a:endParaRPr lang="it-IT" dirty="0">
-              <a:solidFill>
-                <a:schemeClr val="tx1"/>
-              </a:solidFill>
-            </a:endParaRPr>
-          </a:p>
         </p:txBody>
       </p:sp>
       <p:cxnSp>
         <p:nvCxnSpPr>
           <p:cNvPr id="3" name="Connettore 2 2"/>
           <p:cNvCxnSpPr>
-            <a:stCxn id="8" idx="3"/>
-            <a:endCxn id="4" idx="1"/>
+            <a:endCxn id="19" idx="1"/>
           </p:cNvCxnSpPr>
           <p:nvPr/>
         </p:nvCxnSpPr>
         <p:spPr>
           <a:xfrm>
-            <a:off x="1727176" y="3320988"/>
-            <a:ext cx="558570" cy="13543"/>
+            <a:off x="1291758" y="3840913"/>
+            <a:ext cx="2006600" cy="2162224"/>
           </a:xfrm>
           <a:prstGeom prst="straightConnector1">
             <a:avLst/>
@@ -5904,7 +6618,7 @@
         </p:nvCxnSpPr>
         <p:spPr>
           <a:xfrm>
-            <a:off x="7020272" y="2348880"/>
+            <a:off x="7038274" y="1826065"/>
             <a:ext cx="710092" cy="0"/>
           </a:xfrm>
           <a:prstGeom prst="straightConnector1">
@@ -5941,7 +6655,7 @@
         </p:nvCxnSpPr>
         <p:spPr>
           <a:xfrm>
-            <a:off x="7020272" y="4221088"/>
+            <a:off x="7038274" y="3192619"/>
             <a:ext cx="710092" cy="0"/>
           </a:xfrm>
           <a:prstGeom prst="straightConnector1">
@@ -6025,7 +6739,7 @@
         </p:nvSpPr>
         <p:spPr>
           <a:xfrm>
-            <a:off x="5661121" y="3123575"/>
+            <a:off x="5217991" y="3123575"/>
             <a:ext cx="1241654" cy="864096"/>
           </a:xfrm>
           <a:prstGeom prst="ellipse">
@@ -6302,8 +7016,8 @@
         </p:nvCxnSpPr>
         <p:spPr>
           <a:xfrm flipV="1">
-            <a:off x="6902775" y="2380975"/>
-            <a:ext cx="117497" cy="1174648"/>
+            <a:off x="6459645" y="1826065"/>
+            <a:ext cx="578629" cy="1729558"/>
           </a:xfrm>
           <a:prstGeom prst="straightConnector1">
             <a:avLst/>
@@ -6337,9 +7051,9 @@
           <p:nvPr/>
         </p:nvCxnSpPr>
         <p:spPr>
-          <a:xfrm>
-            <a:off x="6902775" y="3555623"/>
-            <a:ext cx="117497" cy="665465"/>
+          <a:xfrm flipV="1">
+            <a:off x="6459645" y="3192619"/>
+            <a:ext cx="578629" cy="363004"/>
           </a:xfrm>
           <a:prstGeom prst="straightConnector1">
             <a:avLst/>
@@ -6541,6 +7255,13 @@
               <a:rPr lang="it-IT" dirty="0" smtClean="0"/>
               <a:t>Tempo</a:t>
             </a:r>
+          </a:p>
+          <a:p>
+            <a:pPr algn="ctr"/>
+            <a:r>
+              <a:rPr lang="it-IT" dirty="0" smtClean="0"/>
+              <a:t>(O.S.)</a:t>
+            </a:r>
             <a:endParaRPr lang="it-IT" dirty="0"/>
           </a:p>
         </p:txBody>
@@ -6604,7 +7325,7 @@
         <p:spPr>
           <a:xfrm flipV="1">
             <a:off x="4306317" y="3861127"/>
-            <a:ext cx="1536640" cy="773800"/>
+            <a:ext cx="1093510" cy="773800"/>
           </a:xfrm>
           <a:prstGeom prst="straightConnector1">
             <a:avLst/>
@@ -6930,7 +7651,7 @@
         </p:nvSpPr>
         <p:spPr>
           <a:xfrm>
-            <a:off x="2294747" y="1387865"/>
+            <a:off x="2323721" y="1394017"/>
             <a:ext cx="4734526" cy="5017742"/>
           </a:xfrm>
           <a:prstGeom prst="ellipse">
@@ -7018,6 +7739,415 @@
           </a:fontRef>
         </p:style>
       </p:cxnSp>
+      <p:sp>
+        <p:nvSpPr>
+          <p:cNvPr id="37" name="Rettangolo 36"/>
+          <p:cNvSpPr/>
+          <p:nvPr/>
+        </p:nvSpPr>
+        <p:spPr>
+          <a:xfrm>
+            <a:off x="7777029" y="3903801"/>
+            <a:ext cx="648072" cy="648072"/>
+          </a:xfrm>
+          <a:prstGeom prst="rect">
+            <a:avLst/>
+          </a:prstGeom>
+        </p:spPr>
+        <p:style>
+          <a:lnRef idx="2">
+            <a:schemeClr val="accent6"/>
+          </a:lnRef>
+          <a:fillRef idx="1">
+            <a:schemeClr val="lt1"/>
+          </a:fillRef>
+          <a:effectRef idx="0">
+            <a:schemeClr val="accent6"/>
+          </a:effectRef>
+          <a:fontRef idx="minor">
+            <a:schemeClr val="dk1"/>
+          </a:fontRef>
+        </p:style>
+        <p:txBody>
+          <a:bodyPr rtlCol="0" anchor="ctr"/>
+          <a:lstStyle/>
+          <a:p>
+            <a:pPr algn="ctr"/>
+            <a:r>
+              <a:rPr lang="it-IT" dirty="0" smtClean="0"/>
+              <a:t>LED</a:t>
+            </a:r>
+          </a:p>
+        </p:txBody>
+      </p:sp>
+      <p:sp>
+        <p:nvSpPr>
+          <p:cNvPr id="39" name="Rettangolo 38"/>
+          <p:cNvSpPr/>
+          <p:nvPr/>
+        </p:nvSpPr>
+        <p:spPr>
+          <a:xfrm>
+            <a:off x="7763647" y="4629084"/>
+            <a:ext cx="648072" cy="648072"/>
+          </a:xfrm>
+          <a:prstGeom prst="rect">
+            <a:avLst/>
+          </a:prstGeom>
+        </p:spPr>
+        <p:style>
+          <a:lnRef idx="2">
+            <a:schemeClr val="accent6"/>
+          </a:lnRef>
+          <a:fillRef idx="1">
+            <a:schemeClr val="lt1"/>
+          </a:fillRef>
+          <a:effectRef idx="0">
+            <a:schemeClr val="accent6"/>
+          </a:effectRef>
+          <a:fontRef idx="minor">
+            <a:schemeClr val="dk1"/>
+          </a:fontRef>
+        </p:style>
+        <p:txBody>
+          <a:bodyPr rtlCol="0" anchor="ctr"/>
+          <a:lstStyle/>
+          <a:p>
+            <a:pPr algn="ctr"/>
+            <a:r>
+              <a:rPr lang="it-IT" sz="1200" dirty="0" smtClean="0"/>
+              <a:t>LED</a:t>
+            </a:r>
+          </a:p>
+          <a:p>
+            <a:pPr algn="ctr"/>
+            <a:r>
+              <a:rPr lang="it-IT" sz="1200" dirty="0" smtClean="0"/>
+              <a:t>HUE</a:t>
+            </a:r>
+          </a:p>
+          <a:p>
+            <a:pPr algn="ctr"/>
+            <a:r>
+              <a:rPr lang="it-IT" sz="1200" dirty="0" smtClean="0"/>
+              <a:t>LAMP</a:t>
+            </a:r>
+          </a:p>
+        </p:txBody>
+      </p:sp>
+      <p:cxnSp>
+        <p:nvCxnSpPr>
+          <p:cNvPr id="41" name="Connettore 2 40"/>
+          <p:cNvCxnSpPr/>
+          <p:nvPr/>
+        </p:nvCxnSpPr>
+        <p:spPr>
+          <a:xfrm>
+            <a:off x="7066937" y="4227837"/>
+            <a:ext cx="710092" cy="0"/>
+          </a:xfrm>
+          <a:prstGeom prst="straightConnector1">
+            <a:avLst/>
+          </a:prstGeom>
+          <a:ln w="31750">
+            <a:solidFill>
+              <a:schemeClr val="tx2"/>
+            </a:solidFill>
+            <a:headEnd type="none"/>
+            <a:tailEnd type="arrow"/>
+          </a:ln>
+        </p:spPr>
+        <p:style>
+          <a:lnRef idx="1">
+            <a:schemeClr val="accent1"/>
+          </a:lnRef>
+          <a:fillRef idx="0">
+            <a:schemeClr val="accent1"/>
+          </a:fillRef>
+          <a:effectRef idx="0">
+            <a:schemeClr val="accent1"/>
+          </a:effectRef>
+          <a:fontRef idx="minor">
+            <a:schemeClr val="tx1"/>
+          </a:fontRef>
+        </p:style>
+      </p:cxnSp>
+      <p:cxnSp>
+        <p:nvCxnSpPr>
+          <p:cNvPr id="42" name="Connettore 2 41"/>
+          <p:cNvCxnSpPr>
+            <a:endCxn id="39" idx="1"/>
+          </p:cNvCxnSpPr>
+          <p:nvPr/>
+        </p:nvCxnSpPr>
+        <p:spPr>
+          <a:xfrm>
+            <a:off x="7066937" y="4227837"/>
+            <a:ext cx="696710" cy="725283"/>
+          </a:xfrm>
+          <a:prstGeom prst="straightConnector1">
+            <a:avLst/>
+          </a:prstGeom>
+          <a:ln w="31750">
+            <a:solidFill>
+              <a:schemeClr val="tx2"/>
+            </a:solidFill>
+            <a:headEnd type="none"/>
+            <a:tailEnd type="arrow"/>
+          </a:ln>
+        </p:spPr>
+        <p:style>
+          <a:lnRef idx="1">
+            <a:schemeClr val="accent1"/>
+          </a:lnRef>
+          <a:fillRef idx="0">
+            <a:schemeClr val="accent1"/>
+          </a:fillRef>
+          <a:effectRef idx="0">
+            <a:schemeClr val="accent1"/>
+          </a:effectRef>
+          <a:fontRef idx="minor">
+            <a:schemeClr val="tx1"/>
+          </a:fontRef>
+        </p:style>
+      </p:cxnSp>
+      <p:sp>
+        <p:nvSpPr>
+          <p:cNvPr id="20" name="AutoShape 2" descr="Risultati immagini per google"/>
+          <p:cNvSpPr>
+            <a:spLocks noChangeAspect="1" noChangeArrowheads="1"/>
+          </p:cNvSpPr>
+          <p:nvPr/>
+        </p:nvSpPr>
+        <p:spPr bwMode="auto">
+          <a:xfrm>
+            <a:off x="155575" y="-144463"/>
+            <a:ext cx="304800" cy="304801"/>
+          </a:xfrm>
+          <a:prstGeom prst="rect">
+            <a:avLst/>
+          </a:prstGeom>
+          <a:noFill/>
+          <a:extLst>
+            <a:ext uri="{909E8E84-426E-40DD-AFC4-6F175D3DCCD1}">
+              <a14:hiddenFill xmlns:a14="http://schemas.microsoft.com/office/drawing/2010/main">
+                <a:solidFill>
+                  <a:srgbClr val="FFFFFF"/>
+                </a:solidFill>
+              </a14:hiddenFill>
+            </a:ext>
+          </a:extLst>
+        </p:spPr>
+        <p:txBody>
+          <a:bodyPr vert="horz" wrap="square" lIns="91440" tIns="45720" rIns="91440" bIns="45720" numCol="1" anchor="t" anchorCtr="0" compatLnSpc="1">
+            <a:prstTxWarp prst="textNoShape">
+              <a:avLst/>
+            </a:prstTxWarp>
+          </a:bodyPr>
+          <a:lstStyle/>
+          <a:p>
+            <a:endParaRPr lang="it-IT"/>
+          </a:p>
+        </p:txBody>
+      </p:sp>
+      <p:pic>
+        <p:nvPicPr>
+          <p:cNvPr id="1032" name="Picture 8" descr="Risultati immagini per google"/>
+          <p:cNvPicPr>
+            <a:picLocks noChangeAspect="1" noChangeArrowheads="1"/>
+          </p:cNvPicPr>
+          <p:nvPr/>
+        </p:nvPicPr>
+        <p:blipFill>
+          <a:blip r:embed="rId2" cstate="print">
+            <a:extLst>
+              <a:ext uri="{28A0092B-C50C-407E-A947-70E740481C1C}">
+                <a14:useLocalDpi xmlns:a14="http://schemas.microsoft.com/office/drawing/2010/main" val="0"/>
+              </a:ext>
+            </a:extLst>
+          </a:blip>
+          <a:srcRect/>
+          <a:stretch>
+            <a:fillRect/>
+          </a:stretch>
+        </p:blipFill>
+        <p:spPr bwMode="auto">
+          <a:xfrm>
+            <a:off x="658526" y="6309320"/>
+            <a:ext cx="912517" cy="424683"/>
+          </a:xfrm>
+          <a:prstGeom prst="rect">
+            <a:avLst/>
+          </a:prstGeom>
+          <a:solidFill>
+            <a:srgbClr val="FFFFFF">
+              <a:shade val="85000"/>
+            </a:srgbClr>
+          </a:solidFill>
+          <a:ln w="28575" cap="sq">
+            <a:solidFill>
+              <a:schemeClr val="tx2">
+                <a:lumMod val="20000"/>
+                <a:lumOff val="80000"/>
+              </a:schemeClr>
+            </a:solidFill>
+            <a:miter lim="800000"/>
+          </a:ln>
+          <a:effectLst>
+            <a:outerShdw blurRad="55000" dist="18000" dir="5400000" algn="tl" rotWithShape="0">
+              <a:srgbClr val="000000">
+                <a:alpha val="40000"/>
+              </a:srgbClr>
+            </a:outerShdw>
+          </a:effectLst>
+          <a:scene3d>
+            <a:camera prst="orthographicFront"/>
+            <a:lightRig rig="twoPt" dir="t">
+              <a:rot lat="0" lon="0" rev="7200000"/>
+            </a:lightRig>
+          </a:scene3d>
+          <a:sp3d>
+            <a:bevelT w="25400" h="19050"/>
+            <a:contourClr>
+              <a:srgbClr val="FFFFFF"/>
+            </a:contourClr>
+          </a:sp3d>
+          <a:extLst/>
+        </p:spPr>
+      </p:pic>
+      <p:pic>
+        <p:nvPicPr>
+          <p:cNvPr id="1034" name="Picture 10" descr="Risultati immagini per open weather map"/>
+          <p:cNvPicPr>
+            <a:picLocks noChangeAspect="1" noChangeArrowheads="1"/>
+          </p:cNvPicPr>
+          <p:nvPr/>
+        </p:nvPicPr>
+        <p:blipFill>
+          <a:blip r:embed="rId3" cstate="print">
+            <a:extLst>
+              <a:ext uri="{28A0092B-C50C-407E-A947-70E740481C1C}">
+                <a14:useLocalDpi xmlns:a14="http://schemas.microsoft.com/office/drawing/2010/main" val="0"/>
+              </a:ext>
+            </a:extLst>
+          </a:blip>
+          <a:srcRect/>
+          <a:stretch>
+            <a:fillRect/>
+          </a:stretch>
+        </p:blipFill>
+        <p:spPr bwMode="auto">
+          <a:xfrm>
+            <a:off x="3729795" y="189592"/>
+            <a:ext cx="1006207" cy="1006207"/>
+          </a:xfrm>
+          <a:prstGeom prst="rect">
+            <a:avLst/>
+          </a:prstGeom>
+          <a:noFill/>
+          <a:extLst>
+            <a:ext uri="{909E8E84-426E-40DD-AFC4-6F175D3DCCD1}">
+              <a14:hiddenFill xmlns:a14="http://schemas.microsoft.com/office/drawing/2010/main">
+                <a:solidFill>
+                  <a:srgbClr val="FFFFFF"/>
+                </a:solidFill>
+              </a14:hiddenFill>
+            </a:ext>
+          </a:extLst>
+        </p:spPr>
+      </p:pic>
+      <p:pic>
+        <p:nvPicPr>
+          <p:cNvPr id="1036" name="Picture 12" descr="Risultati immagini per mbot"/>
+          <p:cNvPicPr>
+            <a:picLocks noChangeAspect="1" noChangeArrowheads="1"/>
+          </p:cNvPicPr>
+          <p:nvPr/>
+        </p:nvPicPr>
+        <p:blipFill>
+          <a:blip r:embed="rId4" cstate="print">
+            <a:extLst>
+              <a:ext uri="{28A0092B-C50C-407E-A947-70E740481C1C}">
+                <a14:useLocalDpi xmlns:a14="http://schemas.microsoft.com/office/drawing/2010/main" val="0"/>
+              </a:ext>
+            </a:extLst>
+          </a:blip>
+          <a:srcRect/>
+          <a:stretch>
+            <a:fillRect/>
+          </a:stretch>
+        </p:blipFill>
+        <p:spPr bwMode="auto">
+          <a:xfrm>
+            <a:off x="7981114" y="703429"/>
+            <a:ext cx="794644" cy="794644"/>
+          </a:xfrm>
+          <a:prstGeom prst="rect">
+            <a:avLst/>
+          </a:prstGeom>
+          <a:noFill/>
+          <a:ln w="28575">
+            <a:solidFill>
+              <a:schemeClr val="accent6"/>
+            </a:solidFill>
+          </a:ln>
+          <a:extLst>
+            <a:ext uri="{909E8E84-426E-40DD-AFC4-6F175D3DCCD1}">
+              <a14:hiddenFill xmlns:a14="http://schemas.microsoft.com/office/drawing/2010/main">
+                <a:solidFill>
+                  <a:srgbClr val="FFFFFF"/>
+                </a:solidFill>
+              </a14:hiddenFill>
+            </a:ext>
+          </a:extLst>
+        </p:spPr>
+      </p:pic>
+      <p:pic>
+        <p:nvPicPr>
+          <p:cNvPr id="1038" name="Picture 14" descr="Risultati immagini per led hue lamp"/>
+          <p:cNvPicPr>
+            <a:picLocks noChangeAspect="1" noChangeArrowheads="1"/>
+          </p:cNvPicPr>
+          <p:nvPr/>
+        </p:nvPicPr>
+        <p:blipFill>
+          <a:blip r:embed="rId5" cstate="print">
+            <a:extLst>
+              <a:ext uri="{28A0092B-C50C-407E-A947-70E740481C1C}">
+                <a14:useLocalDpi xmlns:a14="http://schemas.microsoft.com/office/drawing/2010/main" val="0"/>
+              </a:ext>
+            </a:extLst>
+          </a:blip>
+          <a:srcRect/>
+          <a:stretch>
+            <a:fillRect/>
+          </a:stretch>
+        </p:blipFill>
+        <p:spPr bwMode="auto">
+          <a:xfrm>
+            <a:off x="8275696" y="5189287"/>
+            <a:ext cx="615978" cy="615978"/>
+          </a:xfrm>
+          <a:prstGeom prst="rect">
+            <a:avLst/>
+          </a:prstGeom>
+          <a:noFill/>
+          <a:ln w="28575">
+            <a:solidFill>
+              <a:schemeClr val="accent6"/>
+            </a:solidFill>
+          </a:ln>
+          <a:extLst>
+            <a:ext uri="{909E8E84-426E-40DD-AFC4-6F175D3DCCD1}">
+              <a14:hiddenFill xmlns:a14="http://schemas.microsoft.com/office/drawing/2010/main">
+                <a:solidFill>
+                  <a:srgbClr val="FFFFFF"/>
+                </a:solidFill>
+              </a14:hiddenFill>
+            </a:ext>
+          </a:extLst>
+        </p:spPr>
+      </p:pic>
     </p:spTree>
     <p:extLst>
       <p:ext uri="{BB962C8B-B14F-4D97-AF65-F5344CB8AC3E}">
@@ -7028,6 +8158,13 @@
   <p:clrMapOvr>
     <a:masterClrMapping/>
   </p:clrMapOvr>
+  <p:timing>
+    <p:tnLst>
+      <p:par>
+        <p:cTn id="1" dur="indefinite" restart="never" nodeType="tmRoot"/>
+      </p:par>
+    </p:tnLst>
+  </p:timing>
 </p:sld>
 </file>
 

</xml_diff>

<commit_message>
possibile differenza con req analisi
</commit_message>
<xml_diff>
--- a/ArchitetturaInformale/ArchGen.pptx
+++ b/ArchitetturaInformale/ArchGen.pptx
@@ -13,6 +13,7 @@
     <p:sldId id="261" r:id="rId7"/>
     <p:sldId id="262" r:id="rId8"/>
     <p:sldId id="263" r:id="rId9"/>
+    <p:sldId id="265" r:id="rId10"/>
   </p:sldIdLst>
   <p:sldSz cx="9144000" cy="6858000" type="screen4x3"/>
   <p:notesSz cx="6858000" cy="9144000"/>
@@ -3159,7 +3160,7 @@
     </p:spTree>
     <p:extLst>
       <p:ext uri="{BB962C8B-B14F-4D97-AF65-F5344CB8AC3E}">
-        <p14:creationId xmlns:p14="http://schemas.microsoft.com/office/powerpoint/2010/main" xmlns="" val="464794635"/>
+        <p14:creationId xmlns:p14="http://schemas.microsoft.com/office/powerpoint/2010/main" val="464794635"/>
       </p:ext>
     </p:extLst>
   </p:cSld>
@@ -3778,7 +3779,7 @@
     </p:spTree>
     <p:extLst>
       <p:ext uri="{BB962C8B-B14F-4D97-AF65-F5344CB8AC3E}">
-        <p14:creationId xmlns:p14="http://schemas.microsoft.com/office/powerpoint/2010/main" xmlns="" val="677034703"/>
+        <p14:creationId xmlns:p14="http://schemas.microsoft.com/office/powerpoint/2010/main" val="677034703"/>
       </p:ext>
     </p:extLst>
   </p:cSld>
@@ -4822,7 +4823,7 @@
     </p:spTree>
     <p:extLst>
       <p:ext uri="{BB962C8B-B14F-4D97-AF65-F5344CB8AC3E}">
-        <p14:creationId xmlns:p14="http://schemas.microsoft.com/office/powerpoint/2010/main" xmlns="" val="5359794"/>
+        <p14:creationId xmlns:p14="http://schemas.microsoft.com/office/powerpoint/2010/main" val="5359794"/>
       </p:ext>
     </p:extLst>
   </p:cSld>
@@ -6369,7 +6370,7 @@
     </p:spTree>
     <p:extLst>
       <p:ext uri="{BB962C8B-B14F-4D97-AF65-F5344CB8AC3E}">
-        <p14:creationId xmlns:p14="http://schemas.microsoft.com/office/powerpoint/2010/main" xmlns="" val="2470554592"/>
+        <p14:creationId xmlns:p14="http://schemas.microsoft.com/office/powerpoint/2010/main" val="2470554592"/>
       </p:ext>
     </p:extLst>
   </p:cSld>
@@ -7957,7 +7958,7 @@
           <a:noFill/>
           <a:extLst>
             <a:ext uri="{909E8E84-426E-40DD-AFC4-6F175D3DCCD1}">
-              <a14:hiddenFill xmlns:a14="http://schemas.microsoft.com/office/drawing/2010/main" xmlns="">
+              <a14:hiddenFill xmlns:a14="http://schemas.microsoft.com/office/drawing/2010/main">
                 <a:solidFill>
                   <a:srgbClr val="FFFFFF"/>
                 </a:solidFill>
@@ -7989,7 +7990,7 @@
           <a:blip r:embed="rId2" cstate="print">
             <a:extLst>
               <a:ext uri="{28A0092B-C50C-407E-A947-70E740481C1C}">
-                <a14:useLocalDpi xmlns:a14="http://schemas.microsoft.com/office/drawing/2010/main" xmlns="" val="0"/>
+                <a14:useLocalDpi xmlns:a14="http://schemas.microsoft.com/office/drawing/2010/main" val="0"/>
               </a:ext>
             </a:extLst>
           </a:blip>
@@ -8054,7 +8055,7 @@
           <a:blip r:embed="rId3" cstate="print">
             <a:extLst>
               <a:ext uri="{28A0092B-C50C-407E-A947-70E740481C1C}">
-                <a14:useLocalDpi xmlns:a14="http://schemas.microsoft.com/office/drawing/2010/main" xmlns="" val="0"/>
+                <a14:useLocalDpi xmlns:a14="http://schemas.microsoft.com/office/drawing/2010/main" val="0"/>
               </a:ext>
             </a:extLst>
           </a:blip>
@@ -8074,7 +8075,7 @@
           <a:noFill/>
           <a:extLst>
             <a:ext uri="{909E8E84-426E-40DD-AFC4-6F175D3DCCD1}">
-              <a14:hiddenFill xmlns:a14="http://schemas.microsoft.com/office/drawing/2010/main" xmlns="">
+              <a14:hiddenFill xmlns:a14="http://schemas.microsoft.com/office/drawing/2010/main">
                 <a:solidFill>
                   <a:srgbClr val="FFFFFF"/>
                 </a:solidFill>
@@ -8095,7 +8096,7 @@
           <a:blip r:embed="rId4" cstate="print">
             <a:extLst>
               <a:ext uri="{28A0092B-C50C-407E-A947-70E740481C1C}">
-                <a14:useLocalDpi xmlns:a14="http://schemas.microsoft.com/office/drawing/2010/main" xmlns="" val="0"/>
+                <a14:useLocalDpi xmlns:a14="http://schemas.microsoft.com/office/drawing/2010/main" val="0"/>
               </a:ext>
             </a:extLst>
           </a:blip>
@@ -8120,7 +8121,7 @@
           </a:ln>
           <a:extLst>
             <a:ext uri="{909E8E84-426E-40DD-AFC4-6F175D3DCCD1}">
-              <a14:hiddenFill xmlns:a14="http://schemas.microsoft.com/office/drawing/2010/main" xmlns="">
+              <a14:hiddenFill xmlns:a14="http://schemas.microsoft.com/office/drawing/2010/main">
                 <a:solidFill>
                   <a:srgbClr val="FFFFFF"/>
                 </a:solidFill>
@@ -8141,7 +8142,7 @@
           <a:blip r:embed="rId5" cstate="print">
             <a:extLst>
               <a:ext uri="{28A0092B-C50C-407E-A947-70E740481C1C}">
-                <a14:useLocalDpi xmlns:a14="http://schemas.microsoft.com/office/drawing/2010/main" xmlns="" val="0"/>
+                <a14:useLocalDpi xmlns:a14="http://schemas.microsoft.com/office/drawing/2010/main" val="0"/>
               </a:ext>
             </a:extLst>
           </a:blip>
@@ -8166,7 +8167,7 @@
           </a:ln>
           <a:extLst>
             <a:ext uri="{909E8E84-426E-40DD-AFC4-6F175D3DCCD1}">
-              <a14:hiddenFill xmlns:a14="http://schemas.microsoft.com/office/drawing/2010/main" xmlns="">
+              <a14:hiddenFill xmlns:a14="http://schemas.microsoft.com/office/drawing/2010/main">
                 <a:solidFill>
                   <a:srgbClr val="FFFFFF"/>
                 </a:solidFill>
@@ -8209,7 +8210,7 @@
     </p:spTree>
     <p:extLst>
       <p:ext uri="{BB962C8B-B14F-4D97-AF65-F5344CB8AC3E}">
-        <p14:creationId xmlns:p14="http://schemas.microsoft.com/office/powerpoint/2010/main" xmlns="" val="809657917"/>
+        <p14:creationId xmlns:p14="http://schemas.microsoft.com/office/powerpoint/2010/main" val="809657917"/>
       </p:ext>
     </p:extLst>
   </p:cSld>
@@ -8287,7 +8288,7 @@
           <a:blip r:embed="rId2" cstate="print">
             <a:extLst>
               <a:ext uri="{28A0092B-C50C-407E-A947-70E740481C1C}">
-                <a14:useLocalDpi xmlns:a14="http://schemas.microsoft.com/office/drawing/2010/main" xmlns="" val="0"/>
+                <a14:useLocalDpi xmlns:a14="http://schemas.microsoft.com/office/drawing/2010/main" val="0"/>
               </a:ext>
             </a:extLst>
           </a:blip>
@@ -8311,14 +8312,14 @@
           <a:effectLst/>
           <a:extLst>
             <a:ext uri="{909E8E84-426E-40DD-AFC4-6F175D3DCCD1}">
-              <a14:hiddenFill xmlns:a14="http://schemas.microsoft.com/office/drawing/2010/main" xmlns="">
+              <a14:hiddenFill xmlns:a14="http://schemas.microsoft.com/office/drawing/2010/main">
                 <a:solidFill>
                   <a:schemeClr val="accent1"/>
                 </a:solidFill>
               </a14:hiddenFill>
             </a:ext>
             <a:ext uri="{91240B29-F687-4F45-9708-019B960494DF}">
-              <a14:hiddenLine xmlns:a14="http://schemas.microsoft.com/office/drawing/2010/main" xmlns="" w="9525">
+              <a14:hiddenLine xmlns:a14="http://schemas.microsoft.com/office/drawing/2010/main" w="9525">
                 <a:solidFill>
                   <a:schemeClr val="tx1"/>
                 </a:solidFill>
@@ -8328,7 +8329,7 @@
               </a14:hiddenLine>
             </a:ext>
             <a:ext uri="{AF507438-7753-43E0-B8FC-AC1667EBCBE1}">
-              <a14:hiddenEffects xmlns:a14="http://schemas.microsoft.com/office/drawing/2010/main" xmlns="">
+              <a14:hiddenEffects xmlns:a14="http://schemas.microsoft.com/office/drawing/2010/main">
                 <a:effectLst>
                   <a:outerShdw dist="35921" dir="2700000" algn="ctr" rotWithShape="0">
                     <a:schemeClr val="bg2"/>
@@ -8418,7 +8419,7 @@
     </p:spTree>
     <p:extLst>
       <p:ext uri="{BB962C8B-B14F-4D97-AF65-F5344CB8AC3E}">
-        <p14:creationId xmlns:p14="http://schemas.microsoft.com/office/powerpoint/2010/main" xmlns="" val="2493361294"/>
+        <p14:creationId xmlns:p14="http://schemas.microsoft.com/office/powerpoint/2010/main" val="2493361294"/>
       </p:ext>
     </p:extLst>
   </p:cSld>
@@ -8496,7 +8497,7 @@
           <a:blip r:embed="rId2" cstate="print">
             <a:extLst>
               <a:ext uri="{28A0092B-C50C-407E-A947-70E740481C1C}">
-                <a14:useLocalDpi xmlns:a14="http://schemas.microsoft.com/office/drawing/2010/main" xmlns="" val="0"/>
+                <a14:useLocalDpi xmlns:a14="http://schemas.microsoft.com/office/drawing/2010/main" val="0"/>
               </a:ext>
             </a:extLst>
           </a:blip>
@@ -8516,7 +8517,7 @@
           <a:noFill/>
           <a:extLst>
             <a:ext uri="{909E8E84-426E-40DD-AFC4-6F175D3DCCD1}">
-              <a14:hiddenFill xmlns:a14="http://schemas.microsoft.com/office/drawing/2010/main" xmlns="">
+              <a14:hiddenFill xmlns:a14="http://schemas.microsoft.com/office/drawing/2010/main">
                 <a:solidFill>
                   <a:srgbClr val="FFFFFF"/>
                 </a:solidFill>
@@ -8778,7 +8779,7 @@
     </p:spTree>
     <p:extLst>
       <p:ext uri="{BB962C8B-B14F-4D97-AF65-F5344CB8AC3E}">
-        <p14:creationId xmlns:p14="http://schemas.microsoft.com/office/powerpoint/2010/main" xmlns="" val="3409606095"/>
+        <p14:creationId xmlns:p14="http://schemas.microsoft.com/office/powerpoint/2010/main" val="3409606095"/>
       </p:ext>
     </p:extLst>
   </p:cSld>
@@ -8847,7 +8848,7 @@
           <a:blip r:embed="rId2" cstate="print">
             <a:extLst>
               <a:ext uri="{28A0092B-C50C-407E-A947-70E740481C1C}">
-                <a14:useLocalDpi xmlns:a14="http://schemas.microsoft.com/office/drawing/2010/main" xmlns="" val="0"/>
+                <a14:useLocalDpi xmlns:a14="http://schemas.microsoft.com/office/drawing/2010/main" val="0"/>
               </a:ext>
             </a:extLst>
           </a:blip>
@@ -8871,24 +8872,14 @@
           </a:ln>
           <a:extLst>
             <a:ext uri="{909E8E84-426E-40DD-AFC4-6F175D3DCCD1}">
-              <a14:hiddenFill xmlns:a14="http://schemas.microsoft.com/office/drawing/2010/main" xmlns="">
+              <a14:hiddenFill xmlns:a14="http://schemas.microsoft.com/office/drawing/2010/main">
                 <a:solidFill>
                   <a:schemeClr val="accent1"/>
                 </a:solidFill>
               </a14:hiddenFill>
             </a:ext>
-            <a:ext uri="{91240B29-F687-4F45-9708-019B960494DF}">
-              <a14:hiddenLine xmlns:a14="http://schemas.microsoft.com/office/drawing/2010/main" xmlns="" w="9525">
-                <a:solidFill>
-                  <a:schemeClr val="tx1"/>
-                </a:solidFill>
-                <a:miter lim="800000"/>
-                <a:headEnd/>
-                <a:tailEnd/>
-              </a14:hiddenLine>
-            </a:ext>
             <a:ext uri="{AF507438-7753-43E0-B8FC-AC1667EBCBE1}">
-              <a14:hiddenEffects xmlns:a14="http://schemas.microsoft.com/office/drawing/2010/main" xmlns="">
+              <a14:hiddenEffects xmlns:a14="http://schemas.microsoft.com/office/drawing/2010/main">
                 <a:effectLst>
                   <a:outerShdw dist="35921" dir="2700000" algn="ctr" rotWithShape="0">
                     <a:schemeClr val="bg2"/>
@@ -8911,7 +8902,7 @@
           <a:blip r:embed="rId3" cstate="print">
             <a:extLst>
               <a:ext uri="{28A0092B-C50C-407E-A947-70E740481C1C}">
-                <a14:useLocalDpi xmlns:a14="http://schemas.microsoft.com/office/drawing/2010/main" xmlns="" val="0"/>
+                <a14:useLocalDpi xmlns:a14="http://schemas.microsoft.com/office/drawing/2010/main" val="0"/>
               </a:ext>
             </a:extLst>
           </a:blip>
@@ -8936,7 +8927,7 @@
           </a:ln>
           <a:extLst>
             <a:ext uri="{909E8E84-426E-40DD-AFC4-6F175D3DCCD1}">
-              <a14:hiddenFill xmlns:a14="http://schemas.microsoft.com/office/drawing/2010/main" xmlns="">
+              <a14:hiddenFill xmlns:a14="http://schemas.microsoft.com/office/drawing/2010/main">
                 <a:solidFill>
                   <a:srgbClr val="FFFFFF"/>
                 </a:solidFill>
@@ -9015,7 +9006,7 @@
           <a:blip r:embed="rId4" cstate="print">
             <a:extLst>
               <a:ext uri="{28A0092B-C50C-407E-A947-70E740481C1C}">
-                <a14:useLocalDpi xmlns:a14="http://schemas.microsoft.com/office/drawing/2010/main" xmlns="" val="0"/>
+                <a14:useLocalDpi xmlns:a14="http://schemas.microsoft.com/office/drawing/2010/main" val="0"/>
               </a:ext>
             </a:extLst>
           </a:blip>
@@ -9035,7 +9026,7 @@
           <a:noFill/>
           <a:extLst>
             <a:ext uri="{909E8E84-426E-40DD-AFC4-6F175D3DCCD1}">
-              <a14:hiddenFill xmlns:a14="http://schemas.microsoft.com/office/drawing/2010/main" xmlns="">
+              <a14:hiddenFill xmlns:a14="http://schemas.microsoft.com/office/drawing/2010/main">
                 <a:solidFill>
                   <a:srgbClr val="FFFFFF"/>
                 </a:solidFill>
@@ -9107,7 +9098,7 @@
           <a:blip r:embed="rId5" cstate="print">
             <a:extLst>
               <a:ext uri="{28A0092B-C50C-407E-A947-70E740481C1C}">
-                <a14:useLocalDpi xmlns:a14="http://schemas.microsoft.com/office/drawing/2010/main" xmlns="" val="0"/>
+                <a14:useLocalDpi xmlns:a14="http://schemas.microsoft.com/office/drawing/2010/main" val="0"/>
               </a:ext>
             </a:extLst>
           </a:blip>
@@ -9492,29 +9483,8 @@
                   <a:schemeClr val="tx1"/>
                 </a:solidFill>
               </a:rPr>
-              <a:t>(PC/</a:t>
-            </a:r>
-            <a:r>
-              <a:rPr lang="it-IT" sz="1700" dirty="0" err="1" smtClean="0">
-                <a:solidFill>
-                  <a:schemeClr val="tx1"/>
-                </a:solidFill>
-              </a:rPr>
-              <a:t>Smartphone</a:t>
-            </a:r>
-            <a:r>
-              <a:rPr lang="it-IT" sz="1700" dirty="0" smtClean="0">
-                <a:solidFill>
-                  <a:schemeClr val="tx1"/>
-                </a:solidFill>
-              </a:rPr>
-              <a:t>)</a:t>
-            </a:r>
-            <a:endParaRPr lang="it-IT" sz="1700" dirty="0" smtClean="0">
-              <a:solidFill>
-                <a:schemeClr val="tx1"/>
-              </a:solidFill>
-            </a:endParaRPr>
+              <a:t>(PC/Smartphone)</a:t>
+            </a:r>
           </a:p>
         </p:txBody>
       </p:sp>
@@ -9527,7 +9497,7 @@
         <p:spPr>
           <a:xfrm>
             <a:off x="179512" y="1484784"/>
-            <a:ext cx="2808312" cy="2520280"/>
+            <a:ext cx="2808312" cy="3384376"/>
           </a:xfrm>
           <a:prstGeom prst="rect">
             <a:avLst/>
@@ -9685,7 +9655,7 @@
           <a:blip r:embed="rId6" cstate="print">
             <a:extLst>
               <a:ext uri="{28A0092B-C50C-407E-A947-70E740481C1C}">
-                <a14:useLocalDpi xmlns:a14="http://schemas.microsoft.com/office/drawing/2010/main" xmlns="" val="0"/>
+                <a14:useLocalDpi xmlns:a14="http://schemas.microsoft.com/office/drawing/2010/main" val="0"/>
               </a:ext>
             </a:extLst>
           </a:blip>
@@ -9710,7 +9680,7 @@
           </a:ln>
           <a:extLst>
             <a:ext uri="{909E8E84-426E-40DD-AFC4-6F175D3DCCD1}">
-              <a14:hiddenFill xmlns:a14="http://schemas.microsoft.com/office/drawing/2010/main" xmlns="">
+              <a14:hiddenFill xmlns:a14="http://schemas.microsoft.com/office/drawing/2010/main">
                 <a:solidFill>
                   <a:srgbClr val="FFFFFF"/>
                 </a:solidFill>
@@ -9750,7 +9720,1330 @@
           </a:ln>
         </p:spPr>
       </p:pic>
+      <p:sp>
+        <p:nvSpPr>
+          <p:cNvPr id="23" name="Rettangolo 22"/>
+          <p:cNvSpPr/>
+          <p:nvPr/>
+        </p:nvSpPr>
+        <p:spPr>
+          <a:xfrm>
+            <a:off x="379489" y="4077072"/>
+            <a:ext cx="2376264" cy="576064"/>
+          </a:xfrm>
+          <a:prstGeom prst="rect">
+            <a:avLst/>
+          </a:prstGeom>
+          <a:ln>
+            <a:solidFill>
+              <a:schemeClr val="tx2"/>
+            </a:solidFill>
+          </a:ln>
+        </p:spPr>
+        <p:style>
+          <a:lnRef idx="2">
+            <a:schemeClr val="accent6"/>
+          </a:lnRef>
+          <a:fillRef idx="1">
+            <a:schemeClr val="lt1"/>
+          </a:fillRef>
+          <a:effectRef idx="0">
+            <a:schemeClr val="accent6"/>
+          </a:effectRef>
+          <a:fontRef idx="minor">
+            <a:schemeClr val="dk1"/>
+          </a:fontRef>
+        </p:style>
+        <p:txBody>
+          <a:bodyPr rtlCol="0" anchor="ctr"/>
+          <a:lstStyle/>
+          <a:p>
+            <a:pPr algn="ctr"/>
+            <a:r>
+              <a:rPr lang="it-IT" dirty="0" smtClean="0"/>
+              <a:t>Mosquitto broker</a:t>
+            </a:r>
+            <a:endParaRPr lang="it-IT" dirty="0"/>
+          </a:p>
+        </p:txBody>
+      </p:sp>
     </p:spTree>
+  </p:cSld>
+  <p:clrMapOvr>
+    <a:masterClrMapping/>
+  </p:clrMapOvr>
+  <p:timing>
+    <p:tnLst>
+      <p:par>
+        <p:cTn id="1" dur="indefinite" restart="never" nodeType="tmRoot"/>
+      </p:par>
+    </p:tnLst>
+  </p:timing>
+</p:sld>
+</file>
+
+<file path=ppt/slides/slide9.xml><?xml version="1.0" encoding="utf-8"?>
+<p:sld xmlns:a="http://schemas.openxmlformats.org/drawingml/2006/main" xmlns:r="http://schemas.openxmlformats.org/officeDocument/2006/relationships" xmlns:p="http://schemas.openxmlformats.org/presentationml/2006/main">
+  <p:cSld>
+    <p:spTree>
+      <p:nvGrpSpPr>
+        <p:cNvPr id="1" name=""/>
+        <p:cNvGrpSpPr/>
+        <p:nvPr/>
+      </p:nvGrpSpPr>
+      <p:grpSpPr>
+        <a:xfrm>
+          <a:off x="0" y="0"/>
+          <a:ext cx="0" cy="0"/>
+          <a:chOff x="0" y="0"/>
+          <a:chExt cx="0" cy="0"/>
+        </a:xfrm>
+      </p:grpSpPr>
+      <p:sp>
+        <p:nvSpPr>
+          <p:cNvPr id="2" name="Titolo 1"/>
+          <p:cNvSpPr>
+            <a:spLocks noGrp="1"/>
+          </p:cNvSpPr>
+          <p:nvPr>
+            <p:ph type="title"/>
+          </p:nvPr>
+        </p:nvSpPr>
+        <p:spPr>
+          <a:xfrm>
+            <a:off x="0" y="0"/>
+            <a:ext cx="8229600" cy="1143000"/>
+          </a:xfrm>
+        </p:spPr>
+        <p:txBody>
+          <a:bodyPr/>
+          <a:lstStyle/>
+          <a:p>
+            <a:r>
+              <a:rPr lang="it-IT" dirty="0" smtClean="0"/>
+              <a:t>…possibili scenari</a:t>
+            </a:r>
+            <a:endParaRPr lang="it-IT" dirty="0"/>
+          </a:p>
+        </p:txBody>
+      </p:sp>
+      <p:pic>
+        <p:nvPicPr>
+          <p:cNvPr id="4" name="Picture 3"/>
+          <p:cNvPicPr>
+            <a:picLocks noChangeAspect="1" noChangeArrowheads="1"/>
+          </p:cNvPicPr>
+          <p:nvPr/>
+        </p:nvPicPr>
+        <p:blipFill>
+          <a:blip r:embed="rId2" cstate="print">
+            <a:extLst>
+              <a:ext uri="{28A0092B-C50C-407E-A947-70E740481C1C}">
+                <a14:useLocalDpi xmlns:a14="http://schemas.microsoft.com/office/drawing/2010/main" val="0"/>
+              </a:ext>
+            </a:extLst>
+          </a:blip>
+          <a:srcRect/>
+          <a:stretch>
+            <a:fillRect/>
+          </a:stretch>
+        </p:blipFill>
+        <p:spPr bwMode="auto">
+          <a:xfrm>
+            <a:off x="1007159" y="4973345"/>
+            <a:ext cx="2376264" cy="1231873"/>
+          </a:xfrm>
+          <a:prstGeom prst="rect">
+            <a:avLst/>
+          </a:prstGeom>
+          <a:ln>
+            <a:solidFill>
+              <a:schemeClr val="tx2"/>
+            </a:solidFill>
+          </a:ln>
+          <a:extLst>
+            <a:ext uri="{909E8E84-426E-40DD-AFC4-6F175D3DCCD1}">
+              <a14:hiddenFill xmlns:a14="http://schemas.microsoft.com/office/drawing/2010/main">
+                <a:solidFill>
+                  <a:schemeClr val="accent1"/>
+                </a:solidFill>
+              </a14:hiddenFill>
+            </a:ext>
+            <a:ext uri="{AF507438-7753-43E0-B8FC-AC1667EBCBE1}">
+              <a14:hiddenEffects xmlns:a14="http://schemas.microsoft.com/office/drawing/2010/main">
+                <a:effectLst>
+                  <a:outerShdw dist="35921" dir="2700000" algn="ctr" rotWithShape="0">
+                    <a:schemeClr val="bg2"/>
+                  </a:outerShdw>
+                </a:effectLst>
+              </a14:hiddenEffects>
+            </a:ext>
+          </a:extLst>
+        </p:spPr>
+      </p:pic>
+      <p:pic>
+        <p:nvPicPr>
+          <p:cNvPr id="5" name="Picture 2" descr="C:\Users\Giuseppe\Desktop\WhatsApp Image 2018-07-02 at 19.09.35.jpeg"/>
+          <p:cNvPicPr>
+            <a:picLocks noChangeAspect="1" noChangeArrowheads="1"/>
+          </p:cNvPicPr>
+          <p:nvPr/>
+        </p:nvPicPr>
+        <p:blipFill>
+          <a:blip r:embed="rId3" cstate="print">
+            <a:extLst>
+              <a:ext uri="{28A0092B-C50C-407E-A947-70E740481C1C}">
+                <a14:useLocalDpi xmlns:a14="http://schemas.microsoft.com/office/drawing/2010/main" val="0"/>
+              </a:ext>
+            </a:extLst>
+          </a:blip>
+          <a:srcRect/>
+          <a:stretch>
+            <a:fillRect/>
+          </a:stretch>
+        </p:blipFill>
+        <p:spPr bwMode="auto">
+          <a:xfrm>
+            <a:off x="4319972" y="4909074"/>
+            <a:ext cx="2232248" cy="1292578"/>
+          </a:xfrm>
+          <a:prstGeom prst="rect">
+            <a:avLst/>
+          </a:prstGeom>
+          <a:noFill/>
+          <a:ln w="28575">
+            <a:solidFill>
+              <a:schemeClr val="accent6"/>
+            </a:solidFill>
+          </a:ln>
+          <a:extLst>
+            <a:ext uri="{909E8E84-426E-40DD-AFC4-6F175D3DCCD1}">
+              <a14:hiddenFill xmlns:a14="http://schemas.microsoft.com/office/drawing/2010/main">
+                <a:solidFill>
+                  <a:srgbClr val="FFFFFF"/>
+                </a:solidFill>
+              </a14:hiddenFill>
+            </a:ext>
+          </a:extLst>
+        </p:spPr>
+      </p:pic>
+      <p:sp>
+        <p:nvSpPr>
+          <p:cNvPr id="6" name="Rettangolo 5"/>
+          <p:cNvSpPr/>
+          <p:nvPr/>
+        </p:nvSpPr>
+        <p:spPr>
+          <a:xfrm>
+            <a:off x="6810846" y="2718700"/>
+            <a:ext cx="2052228" cy="864096"/>
+          </a:xfrm>
+          <a:prstGeom prst="rect">
+            <a:avLst/>
+          </a:prstGeom>
+        </p:spPr>
+        <p:style>
+          <a:lnRef idx="2">
+            <a:schemeClr val="accent1">
+              <a:shade val="50000"/>
+            </a:schemeClr>
+          </a:lnRef>
+          <a:fillRef idx="1">
+            <a:schemeClr val="accent1"/>
+          </a:fillRef>
+          <a:effectRef idx="0">
+            <a:schemeClr val="accent1"/>
+          </a:effectRef>
+          <a:fontRef idx="minor">
+            <a:schemeClr val="lt1"/>
+          </a:fontRef>
+        </p:style>
+        <p:txBody>
+          <a:bodyPr rtlCol="0" anchor="ctr"/>
+          <a:lstStyle/>
+          <a:p>
+            <a:pPr algn="ctr"/>
+            <a:r>
+              <a:rPr lang="it-IT" dirty="0" smtClean="0"/>
+              <a:t>Provider </a:t>
+            </a:r>
+          </a:p>
+          <a:p>
+            <a:pPr algn="ctr"/>
+            <a:r>
+              <a:rPr lang="it-IT" dirty="0" smtClean="0"/>
+              <a:t>Meteo</a:t>
+            </a:r>
+          </a:p>
+          <a:p>
+            <a:pPr algn="ctr"/>
+            <a:r>
+              <a:rPr lang="it-IT" dirty="0" smtClean="0"/>
+              <a:t>(OWM)</a:t>
+            </a:r>
+            <a:endParaRPr lang="it-IT" dirty="0"/>
+          </a:p>
+        </p:txBody>
+      </p:sp>
+      <p:pic>
+        <p:nvPicPr>
+          <p:cNvPr id="7" name="Picture 10" descr="Risultati immagini per open weather map"/>
+          <p:cNvPicPr>
+            <a:picLocks noChangeAspect="1" noChangeArrowheads="1"/>
+          </p:cNvPicPr>
+          <p:nvPr/>
+        </p:nvPicPr>
+        <p:blipFill>
+          <a:blip r:embed="rId4" cstate="print">
+            <a:extLst>
+              <a:ext uri="{28A0092B-C50C-407E-A947-70E740481C1C}">
+                <a14:useLocalDpi xmlns:a14="http://schemas.microsoft.com/office/drawing/2010/main" val="0"/>
+              </a:ext>
+            </a:extLst>
+          </a:blip>
+          <a:srcRect/>
+          <a:stretch>
+            <a:fillRect/>
+          </a:stretch>
+        </p:blipFill>
+        <p:spPr bwMode="auto">
+          <a:xfrm>
+            <a:off x="8137793" y="2636912"/>
+            <a:ext cx="1006207" cy="1006207"/>
+          </a:xfrm>
+          <a:prstGeom prst="rect">
+            <a:avLst/>
+          </a:prstGeom>
+          <a:noFill/>
+          <a:extLst>
+            <a:ext uri="{909E8E84-426E-40DD-AFC4-6F175D3DCCD1}">
+              <a14:hiddenFill xmlns:a14="http://schemas.microsoft.com/office/drawing/2010/main">
+                <a:solidFill>
+                  <a:srgbClr val="FFFFFF"/>
+                </a:solidFill>
+              </a14:hiddenFill>
+            </a:ext>
+          </a:extLst>
+        </p:spPr>
+      </p:pic>
+      <p:sp>
+        <p:nvSpPr>
+          <p:cNvPr id="8" name="Rettangolo 7"/>
+          <p:cNvSpPr/>
+          <p:nvPr/>
+        </p:nvSpPr>
+        <p:spPr>
+          <a:xfrm>
+            <a:off x="6804248" y="1340768"/>
+            <a:ext cx="2052228" cy="864096"/>
+          </a:xfrm>
+          <a:prstGeom prst="rect">
+            <a:avLst/>
+          </a:prstGeom>
+        </p:spPr>
+        <p:style>
+          <a:lnRef idx="2">
+            <a:schemeClr val="accent1">
+              <a:shade val="50000"/>
+            </a:schemeClr>
+          </a:lnRef>
+          <a:fillRef idx="1">
+            <a:schemeClr val="accent1"/>
+          </a:fillRef>
+          <a:effectRef idx="0">
+            <a:schemeClr val="accent1"/>
+          </a:effectRef>
+          <a:fontRef idx="minor">
+            <a:schemeClr val="lt1"/>
+          </a:fontRef>
+        </p:style>
+        <p:txBody>
+          <a:bodyPr rtlCol="0" anchor="ctr"/>
+          <a:lstStyle/>
+          <a:p>
+            <a:pPr algn="ctr"/>
+            <a:r>
+              <a:rPr lang="it-IT" dirty="0" smtClean="0"/>
+              <a:t>Provider </a:t>
+            </a:r>
+          </a:p>
+          <a:p>
+            <a:pPr algn="ctr"/>
+            <a:r>
+              <a:rPr lang="it-IT" dirty="0" smtClean="0"/>
+              <a:t>Autenticatore</a:t>
+            </a:r>
+            <a:endParaRPr lang="it-IT" dirty="0"/>
+          </a:p>
+        </p:txBody>
+      </p:sp>
+      <p:pic>
+        <p:nvPicPr>
+          <p:cNvPr id="9" name="Picture 8" descr="Risultati immagini per google"/>
+          <p:cNvPicPr>
+            <a:picLocks noChangeAspect="1" noChangeArrowheads="1"/>
+          </p:cNvPicPr>
+          <p:nvPr/>
+        </p:nvPicPr>
+        <p:blipFill>
+          <a:blip r:embed="rId5" cstate="print">
+            <a:extLst>
+              <a:ext uri="{28A0092B-C50C-407E-A947-70E740481C1C}">
+                <a14:useLocalDpi xmlns:a14="http://schemas.microsoft.com/office/drawing/2010/main" val="0"/>
+              </a:ext>
+            </a:extLst>
+          </a:blip>
+          <a:srcRect/>
+          <a:stretch>
+            <a:fillRect/>
+          </a:stretch>
+        </p:blipFill>
+        <p:spPr bwMode="auto">
+          <a:xfrm>
+            <a:off x="7346015" y="2078999"/>
+            <a:ext cx="912517" cy="424683"/>
+          </a:xfrm>
+          <a:prstGeom prst="rect">
+            <a:avLst/>
+          </a:prstGeom>
+          <a:solidFill>
+            <a:srgbClr val="FFFFFF">
+              <a:shade val="85000"/>
+            </a:srgbClr>
+          </a:solidFill>
+          <a:ln w="28575" cap="sq">
+            <a:solidFill>
+              <a:schemeClr val="tx2">
+                <a:lumMod val="20000"/>
+                <a:lumOff val="80000"/>
+              </a:schemeClr>
+            </a:solidFill>
+            <a:miter lim="800000"/>
+          </a:ln>
+          <a:effectLst>
+            <a:outerShdw blurRad="55000" dist="18000" dir="5400000" algn="tl" rotWithShape="0">
+              <a:srgbClr val="000000">
+                <a:alpha val="40000"/>
+              </a:srgbClr>
+            </a:outerShdw>
+          </a:effectLst>
+          <a:scene3d>
+            <a:camera prst="orthographicFront"/>
+            <a:lightRig rig="twoPt" dir="t">
+              <a:rot lat="0" lon="0" rev="7200000"/>
+            </a:lightRig>
+          </a:scene3d>
+          <a:sp3d>
+            <a:bevelT w="25400" h="19050"/>
+            <a:contourClr>
+              <a:srgbClr val="FFFFFF"/>
+            </a:contourClr>
+          </a:sp3d>
+          <a:extLst/>
+        </p:spPr>
+      </p:pic>
+      <p:sp>
+        <p:nvSpPr>
+          <p:cNvPr id="10" name="Rettangolo 9"/>
+          <p:cNvSpPr/>
+          <p:nvPr/>
+        </p:nvSpPr>
+        <p:spPr>
+          <a:xfrm>
+            <a:off x="347158" y="2430668"/>
+            <a:ext cx="2376264" cy="576064"/>
+          </a:xfrm>
+          <a:prstGeom prst="rect">
+            <a:avLst/>
+          </a:prstGeom>
+          <a:ln>
+            <a:solidFill>
+              <a:schemeClr val="tx2"/>
+            </a:solidFill>
+          </a:ln>
+        </p:spPr>
+        <p:style>
+          <a:lnRef idx="2">
+            <a:schemeClr val="accent6"/>
+          </a:lnRef>
+          <a:fillRef idx="1">
+            <a:schemeClr val="lt1"/>
+          </a:fillRef>
+          <a:effectRef idx="0">
+            <a:schemeClr val="accent6"/>
+          </a:effectRef>
+          <a:fontRef idx="minor">
+            <a:schemeClr val="dk1"/>
+          </a:fontRef>
+        </p:style>
+        <p:txBody>
+          <a:bodyPr rtlCol="0" anchor="ctr"/>
+          <a:lstStyle/>
+          <a:p>
+            <a:pPr algn="ctr"/>
+            <a:r>
+              <a:rPr lang="it-IT" dirty="0" smtClean="0"/>
+              <a:t>FrontEnd Server</a:t>
+            </a:r>
+            <a:endParaRPr lang="it-IT" dirty="0"/>
+          </a:p>
+        </p:txBody>
+      </p:sp>
+      <p:sp>
+        <p:nvSpPr>
+          <p:cNvPr id="12" name="Disco magnetico 11"/>
+          <p:cNvSpPr/>
+          <p:nvPr/>
+        </p:nvSpPr>
+        <p:spPr>
+          <a:xfrm>
+            <a:off x="4067944" y="3573016"/>
+            <a:ext cx="1008112" cy="576064"/>
+          </a:xfrm>
+          <a:prstGeom prst="flowChartMagneticDisk">
+            <a:avLst/>
+          </a:prstGeom>
+          <a:solidFill>
+            <a:schemeClr val="accent4">
+              <a:lumMod val="60000"/>
+              <a:lumOff val="40000"/>
+            </a:schemeClr>
+          </a:solidFill>
+          <a:ln>
+            <a:solidFill>
+              <a:schemeClr val="accent4"/>
+            </a:solidFill>
+          </a:ln>
+        </p:spPr>
+        <p:style>
+          <a:lnRef idx="2">
+            <a:schemeClr val="accent1">
+              <a:shade val="50000"/>
+            </a:schemeClr>
+          </a:lnRef>
+          <a:fillRef idx="1">
+            <a:schemeClr val="accent1"/>
+          </a:fillRef>
+          <a:effectRef idx="0">
+            <a:schemeClr val="accent1"/>
+          </a:effectRef>
+          <a:fontRef idx="minor">
+            <a:schemeClr val="lt1"/>
+          </a:fontRef>
+        </p:style>
+        <p:txBody>
+          <a:bodyPr rtlCol="0" anchor="ctr"/>
+          <a:lstStyle/>
+          <a:p>
+            <a:pPr algn="ctr"/>
+            <a:r>
+              <a:rPr lang="it-IT" dirty="0" smtClean="0"/>
+              <a:t>ROUTER</a:t>
+            </a:r>
+            <a:endParaRPr lang="it-IT" dirty="0"/>
+          </a:p>
+        </p:txBody>
+      </p:sp>
+      <p:sp>
+        <p:nvSpPr>
+          <p:cNvPr id="13" name="Nuvola 12"/>
+          <p:cNvSpPr/>
+          <p:nvPr/>
+        </p:nvSpPr>
+        <p:spPr>
+          <a:xfrm>
+            <a:off x="3635896" y="1988840"/>
+            <a:ext cx="1872208" cy="792088"/>
+          </a:xfrm>
+          <a:prstGeom prst="cloud">
+            <a:avLst/>
+          </a:prstGeom>
+          <a:solidFill>
+            <a:schemeClr val="bg1"/>
+          </a:solidFill>
+          <a:ln>
+            <a:solidFill>
+              <a:schemeClr val="tx2"/>
+            </a:solidFill>
+          </a:ln>
+        </p:spPr>
+        <p:style>
+          <a:lnRef idx="2">
+            <a:schemeClr val="accent1">
+              <a:shade val="50000"/>
+            </a:schemeClr>
+          </a:lnRef>
+          <a:fillRef idx="1">
+            <a:schemeClr val="accent1"/>
+          </a:fillRef>
+          <a:effectRef idx="0">
+            <a:schemeClr val="accent1"/>
+          </a:effectRef>
+          <a:fontRef idx="minor">
+            <a:schemeClr val="lt1"/>
+          </a:fontRef>
+        </p:style>
+        <p:txBody>
+          <a:bodyPr rtlCol="0" anchor="ctr"/>
+          <a:lstStyle/>
+          <a:p>
+            <a:pPr algn="ctr"/>
+            <a:r>
+              <a:rPr lang="it-IT" sz="1200" dirty="0" smtClean="0">
+                <a:solidFill>
+                  <a:schemeClr val="tx1"/>
+                </a:solidFill>
+              </a:rPr>
+              <a:t>internet</a:t>
+            </a:r>
+            <a:endParaRPr lang="it-IT" sz="1200" dirty="0">
+              <a:solidFill>
+                <a:schemeClr val="tx1"/>
+              </a:solidFill>
+            </a:endParaRPr>
+          </a:p>
+        </p:txBody>
+      </p:sp>
+      <p:cxnSp>
+        <p:nvCxnSpPr>
+          <p:cNvPr id="15" name="Connettore 2 14"/>
+          <p:cNvCxnSpPr>
+            <a:stCxn id="22" idx="0"/>
+          </p:cNvCxnSpPr>
+          <p:nvPr/>
+        </p:nvCxnSpPr>
+        <p:spPr>
+          <a:xfrm flipH="1" flipV="1">
+            <a:off x="5004048" y="4077072"/>
+            <a:ext cx="2832959" cy="832002"/>
+          </a:xfrm>
+          <a:prstGeom prst="straightConnector1">
+            <a:avLst/>
+          </a:prstGeom>
+          <a:ln>
+            <a:solidFill>
+              <a:schemeClr val="accent4"/>
+            </a:solidFill>
+            <a:headEnd type="arrow"/>
+            <a:tailEnd type="arrow"/>
+          </a:ln>
+        </p:spPr>
+        <p:style>
+          <a:lnRef idx="1">
+            <a:schemeClr val="accent1"/>
+          </a:lnRef>
+          <a:fillRef idx="0">
+            <a:schemeClr val="accent1"/>
+          </a:fillRef>
+          <a:effectRef idx="0">
+            <a:schemeClr val="accent1"/>
+          </a:effectRef>
+          <a:fontRef idx="minor">
+            <a:schemeClr val="tx1"/>
+          </a:fontRef>
+        </p:style>
+      </p:cxnSp>
+      <p:cxnSp>
+        <p:nvCxnSpPr>
+          <p:cNvPr id="16" name="Connettore 2 15"/>
+          <p:cNvCxnSpPr>
+            <a:endCxn id="8" idx="1"/>
+          </p:cNvCxnSpPr>
+          <p:nvPr/>
+        </p:nvCxnSpPr>
+        <p:spPr>
+          <a:xfrm flipV="1">
+            <a:off x="5436096" y="1772816"/>
+            <a:ext cx="1368152" cy="360040"/>
+          </a:xfrm>
+          <a:prstGeom prst="straightConnector1">
+            <a:avLst/>
+          </a:prstGeom>
+          <a:ln>
+            <a:headEnd type="arrow"/>
+            <a:tailEnd type="arrow"/>
+          </a:ln>
+        </p:spPr>
+        <p:style>
+          <a:lnRef idx="1">
+            <a:schemeClr val="accent1"/>
+          </a:lnRef>
+          <a:fillRef idx="0">
+            <a:schemeClr val="accent1"/>
+          </a:fillRef>
+          <a:effectRef idx="0">
+            <a:schemeClr val="accent1"/>
+          </a:effectRef>
+          <a:fontRef idx="minor">
+            <a:schemeClr val="tx1"/>
+          </a:fontRef>
+        </p:style>
+      </p:cxnSp>
+      <p:cxnSp>
+        <p:nvCxnSpPr>
+          <p:cNvPr id="18" name="Connettore 2 17"/>
+          <p:cNvCxnSpPr>
+            <a:endCxn id="6" idx="1"/>
+          </p:cNvCxnSpPr>
+          <p:nvPr/>
+        </p:nvCxnSpPr>
+        <p:spPr>
+          <a:xfrm>
+            <a:off x="5436096" y="2492896"/>
+            <a:ext cx="1374750" cy="657852"/>
+          </a:xfrm>
+          <a:prstGeom prst="straightConnector1">
+            <a:avLst/>
+          </a:prstGeom>
+          <a:ln>
+            <a:headEnd type="arrow"/>
+            <a:tailEnd type="arrow"/>
+          </a:ln>
+        </p:spPr>
+        <p:style>
+          <a:lnRef idx="1">
+            <a:schemeClr val="accent1"/>
+          </a:lnRef>
+          <a:fillRef idx="0">
+            <a:schemeClr val="accent1"/>
+          </a:fillRef>
+          <a:effectRef idx="0">
+            <a:schemeClr val="accent1"/>
+          </a:effectRef>
+          <a:fontRef idx="minor">
+            <a:schemeClr val="tx1"/>
+          </a:fontRef>
+        </p:style>
+      </p:cxnSp>
+      <p:sp>
+        <p:nvSpPr>
+          <p:cNvPr id="22" name="Rettangolo 21"/>
+          <p:cNvSpPr/>
+          <p:nvPr/>
+        </p:nvSpPr>
+        <p:spPr>
+          <a:xfrm>
+            <a:off x="6720883" y="4909074"/>
+            <a:ext cx="2232248" cy="1296144"/>
+          </a:xfrm>
+          <a:prstGeom prst="rect">
+            <a:avLst/>
+          </a:prstGeom>
+          <a:solidFill>
+            <a:schemeClr val="bg1"/>
+          </a:solidFill>
+          <a:ln>
+            <a:solidFill>
+              <a:srgbClr val="00B050"/>
+            </a:solidFill>
+          </a:ln>
+        </p:spPr>
+        <p:style>
+          <a:lnRef idx="2">
+            <a:schemeClr val="accent1">
+              <a:shade val="50000"/>
+            </a:schemeClr>
+          </a:lnRef>
+          <a:fillRef idx="1">
+            <a:schemeClr val="accent1"/>
+          </a:fillRef>
+          <a:effectRef idx="0">
+            <a:schemeClr val="accent1"/>
+          </a:effectRef>
+          <a:fontRef idx="minor">
+            <a:schemeClr val="lt1"/>
+          </a:fontRef>
+        </p:style>
+        <p:txBody>
+          <a:bodyPr rtlCol="0" anchor="ctr"/>
+          <a:lstStyle/>
+          <a:p>
+            <a:pPr algn="ctr"/>
+            <a:r>
+              <a:rPr lang="it-IT" sz="1700" dirty="0" smtClean="0">
+                <a:solidFill>
+                  <a:schemeClr val="tx1"/>
+                </a:solidFill>
+              </a:rPr>
+              <a:t>Utente</a:t>
+            </a:r>
+          </a:p>
+          <a:p>
+            <a:pPr algn="ctr"/>
+            <a:r>
+              <a:rPr lang="it-IT" sz="1700" dirty="0" smtClean="0">
+                <a:solidFill>
+                  <a:schemeClr val="tx1"/>
+                </a:solidFill>
+              </a:rPr>
+              <a:t>(PC/Smartphone)</a:t>
+            </a:r>
+          </a:p>
+        </p:txBody>
+      </p:sp>
+      <p:sp>
+        <p:nvSpPr>
+          <p:cNvPr id="24" name="Rettangolo 23"/>
+          <p:cNvSpPr/>
+          <p:nvPr/>
+        </p:nvSpPr>
+        <p:spPr>
+          <a:xfrm>
+            <a:off x="789112" y="4800600"/>
+            <a:ext cx="2808312" cy="1512168"/>
+          </a:xfrm>
+          <a:prstGeom prst="rect">
+            <a:avLst/>
+          </a:prstGeom>
+          <a:noFill/>
+          <a:ln>
+            <a:solidFill>
+              <a:schemeClr val="tx2"/>
+            </a:solidFill>
+          </a:ln>
+        </p:spPr>
+        <p:style>
+          <a:lnRef idx="2">
+            <a:schemeClr val="accent6"/>
+          </a:lnRef>
+          <a:fillRef idx="1">
+            <a:schemeClr val="lt1"/>
+          </a:fillRef>
+          <a:effectRef idx="0">
+            <a:schemeClr val="accent6"/>
+          </a:effectRef>
+          <a:fontRef idx="minor">
+            <a:schemeClr val="dk1"/>
+          </a:fontRef>
+        </p:style>
+        <p:txBody>
+          <a:bodyPr rtlCol="0" anchor="ctr"/>
+          <a:lstStyle/>
+          <a:p>
+            <a:pPr algn="ctr"/>
+            <a:endParaRPr lang="it-IT"/>
+          </a:p>
+        </p:txBody>
+      </p:sp>
+      <p:cxnSp>
+        <p:nvCxnSpPr>
+          <p:cNvPr id="29" name="Connettore 2 28"/>
+          <p:cNvCxnSpPr>
+            <a:endCxn id="5" idx="0"/>
+          </p:cNvCxnSpPr>
+          <p:nvPr/>
+        </p:nvCxnSpPr>
+        <p:spPr>
+          <a:xfrm>
+            <a:off x="4535551" y="4149080"/>
+            <a:ext cx="900545" cy="759994"/>
+          </a:xfrm>
+          <a:prstGeom prst="straightConnector1">
+            <a:avLst/>
+          </a:prstGeom>
+          <a:ln>
+            <a:solidFill>
+              <a:schemeClr val="accent4"/>
+            </a:solidFill>
+            <a:headEnd type="arrow"/>
+            <a:tailEnd type="arrow"/>
+          </a:ln>
+        </p:spPr>
+        <p:style>
+          <a:lnRef idx="1">
+            <a:schemeClr val="accent1"/>
+          </a:lnRef>
+          <a:fillRef idx="0">
+            <a:schemeClr val="accent1"/>
+          </a:fillRef>
+          <a:effectRef idx="0">
+            <a:schemeClr val="accent1"/>
+          </a:effectRef>
+          <a:fontRef idx="minor">
+            <a:schemeClr val="tx1"/>
+          </a:fontRef>
+        </p:style>
+      </p:cxnSp>
+      <p:cxnSp>
+        <p:nvCxnSpPr>
+          <p:cNvPr id="34" name="Connettore 2 33"/>
+          <p:cNvCxnSpPr>
+            <a:stCxn id="12" idx="2"/>
+            <a:endCxn id="24" idx="0"/>
+          </p:cNvCxnSpPr>
+          <p:nvPr/>
+        </p:nvCxnSpPr>
+        <p:spPr>
+          <a:xfrm flipH="1">
+            <a:off x="2193268" y="3861048"/>
+            <a:ext cx="1874676" cy="939552"/>
+          </a:xfrm>
+          <a:prstGeom prst="straightConnector1">
+            <a:avLst/>
+          </a:prstGeom>
+          <a:ln>
+            <a:solidFill>
+              <a:schemeClr val="accent4"/>
+            </a:solidFill>
+            <a:headEnd type="arrow"/>
+            <a:tailEnd type="arrow"/>
+          </a:ln>
+        </p:spPr>
+        <p:style>
+          <a:lnRef idx="1">
+            <a:schemeClr val="accent1"/>
+          </a:lnRef>
+          <a:fillRef idx="0">
+            <a:schemeClr val="accent1"/>
+          </a:fillRef>
+          <a:effectRef idx="0">
+            <a:schemeClr val="accent1"/>
+          </a:effectRef>
+          <a:fontRef idx="minor">
+            <a:schemeClr val="tx1"/>
+          </a:fontRef>
+        </p:style>
+      </p:cxnSp>
+      <p:cxnSp>
+        <p:nvCxnSpPr>
+          <p:cNvPr id="38" name="Connettore 2 37"/>
+          <p:cNvCxnSpPr/>
+          <p:nvPr/>
+        </p:nvCxnSpPr>
+        <p:spPr>
+          <a:xfrm>
+            <a:off x="4572000" y="2780928"/>
+            <a:ext cx="0" cy="792701"/>
+          </a:xfrm>
+          <a:prstGeom prst="straightConnector1">
+            <a:avLst/>
+          </a:prstGeom>
+          <a:ln>
+            <a:solidFill>
+              <a:schemeClr val="accent4"/>
+            </a:solidFill>
+            <a:headEnd type="arrow"/>
+            <a:tailEnd type="arrow"/>
+          </a:ln>
+        </p:spPr>
+        <p:style>
+          <a:lnRef idx="1">
+            <a:schemeClr val="accent1"/>
+          </a:lnRef>
+          <a:fillRef idx="0">
+            <a:schemeClr val="accent1"/>
+          </a:fillRef>
+          <a:effectRef idx="0">
+            <a:schemeClr val="accent1"/>
+          </a:effectRef>
+          <a:fontRef idx="minor">
+            <a:schemeClr val="tx1"/>
+          </a:fontRef>
+        </p:style>
+      </p:cxnSp>
+      <p:pic>
+        <p:nvPicPr>
+          <p:cNvPr id="50" name="Picture 14" descr="Risultati immagini per led hue lamp"/>
+          <p:cNvPicPr>
+            <a:picLocks noChangeAspect="1" noChangeArrowheads="1"/>
+          </p:cNvPicPr>
+          <p:nvPr/>
+        </p:nvPicPr>
+        <p:blipFill>
+          <a:blip r:embed="rId6" cstate="print">
+            <a:extLst>
+              <a:ext uri="{28A0092B-C50C-407E-A947-70E740481C1C}">
+                <a14:useLocalDpi xmlns:a14="http://schemas.microsoft.com/office/drawing/2010/main" val="0"/>
+              </a:ext>
+            </a:extLst>
+          </a:blip>
+          <a:srcRect/>
+          <a:stretch>
+            <a:fillRect/>
+          </a:stretch>
+        </p:blipFill>
+        <p:spPr bwMode="auto">
+          <a:xfrm>
+            <a:off x="3742911" y="5445111"/>
+            <a:ext cx="615978" cy="615978"/>
+          </a:xfrm>
+          <a:prstGeom prst="rect">
+            <a:avLst/>
+          </a:prstGeom>
+          <a:noFill/>
+          <a:ln w="28575">
+            <a:solidFill>
+              <a:schemeClr val="accent6"/>
+            </a:solidFill>
+          </a:ln>
+          <a:extLst>
+            <a:ext uri="{909E8E84-426E-40DD-AFC4-6F175D3DCCD1}">
+              <a14:hiddenFill xmlns:a14="http://schemas.microsoft.com/office/drawing/2010/main">
+                <a:solidFill>
+                  <a:srgbClr val="FFFFFF"/>
+                </a:solidFill>
+              </a14:hiddenFill>
+            </a:ext>
+          </a:extLst>
+        </p:spPr>
+      </p:pic>
+      <p:pic>
+        <p:nvPicPr>
+          <p:cNvPr id="1026" name="Picture 2" descr="Risultati immagini per led rosso"/>
+          <p:cNvPicPr>
+            <a:picLocks noChangeAspect="1" noChangeArrowheads="1"/>
+          </p:cNvPicPr>
+          <p:nvPr/>
+        </p:nvPicPr>
+        <p:blipFill>
+          <a:blip r:embed="rId7" cstate="print"/>
+          <a:srcRect/>
+          <a:stretch>
+            <a:fillRect/>
+          </a:stretch>
+        </p:blipFill>
+        <p:spPr bwMode="auto">
+          <a:xfrm>
+            <a:off x="4105195" y="6019670"/>
+            <a:ext cx="648072" cy="648072"/>
+          </a:xfrm>
+          <a:prstGeom prst="rect">
+            <a:avLst/>
+          </a:prstGeom>
+          <a:noFill/>
+          <a:ln w="28575">
+            <a:solidFill>
+              <a:schemeClr val="accent6"/>
+            </a:solidFill>
+          </a:ln>
+        </p:spPr>
+      </p:pic>
+      <p:sp>
+        <p:nvSpPr>
+          <p:cNvPr id="23" name="Rettangolo 22"/>
+          <p:cNvSpPr/>
+          <p:nvPr/>
+        </p:nvSpPr>
+        <p:spPr>
+          <a:xfrm>
+            <a:off x="3383423" y="1028406"/>
+            <a:ext cx="2376264" cy="576064"/>
+          </a:xfrm>
+          <a:prstGeom prst="rect">
+            <a:avLst/>
+          </a:prstGeom>
+        </p:spPr>
+        <p:style>
+          <a:lnRef idx="2">
+            <a:schemeClr val="accent1">
+              <a:shade val="50000"/>
+            </a:schemeClr>
+          </a:lnRef>
+          <a:fillRef idx="1">
+            <a:schemeClr val="accent1"/>
+          </a:fillRef>
+          <a:effectRef idx="0">
+            <a:schemeClr val="accent1"/>
+          </a:effectRef>
+          <a:fontRef idx="minor">
+            <a:schemeClr val="lt1"/>
+          </a:fontRef>
+        </p:style>
+        <p:txBody>
+          <a:bodyPr rtlCol="0" anchor="ctr"/>
+          <a:lstStyle/>
+          <a:p>
+            <a:pPr algn="ctr"/>
+            <a:r>
+              <a:rPr lang="it-IT" dirty="0" smtClean="0"/>
+              <a:t>B</a:t>
+            </a:r>
+            <a:r>
+              <a:rPr lang="it-IT" dirty="0" smtClean="0">
+                <a:solidFill>
+                  <a:schemeClr val="lt1"/>
+                </a:solidFill>
+              </a:rPr>
+              <a:t>roker MQTT</a:t>
+            </a:r>
+            <a:endParaRPr lang="it-IT" dirty="0">
+              <a:solidFill>
+                <a:schemeClr val="lt1"/>
+              </a:solidFill>
+            </a:endParaRPr>
+          </a:p>
+        </p:txBody>
+      </p:sp>
+      <p:sp>
+        <p:nvSpPr>
+          <p:cNvPr id="25" name="Rettangolo 24"/>
+          <p:cNvSpPr/>
+          <p:nvPr/>
+        </p:nvSpPr>
+        <p:spPr>
+          <a:xfrm>
+            <a:off x="331637" y="3194932"/>
+            <a:ext cx="2376264" cy="576064"/>
+          </a:xfrm>
+          <a:prstGeom prst="rect">
+            <a:avLst/>
+          </a:prstGeom>
+          <a:noFill/>
+          <a:ln w="28575">
+            <a:solidFill>
+              <a:schemeClr val="accent6"/>
+            </a:solidFill>
+          </a:ln>
+          <a:extLst>
+            <a:ext uri="{909E8E84-426E-40DD-AFC4-6F175D3DCCD1}">
+              <a14:hiddenFill xmlns:a14="http://schemas.microsoft.com/office/drawing/2010/main">
+                <a:solidFill>
+                  <a:srgbClr val="FFFFFF"/>
+                </a:solidFill>
+              </a14:hiddenFill>
+            </a:ext>
+          </a:extLst>
+        </p:spPr>
+        <p:style>
+          <a:lnRef idx="2">
+            <a:schemeClr val="accent6"/>
+          </a:lnRef>
+          <a:fillRef idx="1">
+            <a:schemeClr val="lt1"/>
+          </a:fillRef>
+          <a:effectRef idx="0">
+            <a:schemeClr val="accent6"/>
+          </a:effectRef>
+          <a:fontRef idx="minor">
+            <a:schemeClr val="dk1"/>
+          </a:fontRef>
+        </p:style>
+        <p:txBody>
+          <a:bodyPr rtlCol="0" anchor="ctr"/>
+          <a:lstStyle/>
+          <a:p>
+            <a:pPr algn="ctr"/>
+            <a:r>
+              <a:rPr lang="it-IT" dirty="0"/>
+              <a:t>m</a:t>
+            </a:r>
+            <a:r>
+              <a:rPr lang="it-IT" dirty="0" smtClean="0"/>
+              <a:t>ind (del robot)</a:t>
+            </a:r>
+            <a:endParaRPr lang="it-IT" dirty="0"/>
+          </a:p>
+        </p:txBody>
+      </p:sp>
+      <p:cxnSp>
+        <p:nvCxnSpPr>
+          <p:cNvPr id="32" name="Connettore 2 31"/>
+          <p:cNvCxnSpPr/>
+          <p:nvPr/>
+        </p:nvCxnSpPr>
+        <p:spPr>
+          <a:xfrm flipV="1">
+            <a:off x="4716016" y="1628800"/>
+            <a:ext cx="0" cy="360040"/>
+          </a:xfrm>
+          <a:prstGeom prst="straightConnector1">
+            <a:avLst/>
+          </a:prstGeom>
+          <a:ln>
+            <a:headEnd type="arrow"/>
+            <a:tailEnd type="arrow"/>
+          </a:ln>
+        </p:spPr>
+        <p:style>
+          <a:lnRef idx="1">
+            <a:schemeClr val="accent1"/>
+          </a:lnRef>
+          <a:fillRef idx="0">
+            <a:schemeClr val="accent1"/>
+          </a:fillRef>
+          <a:effectRef idx="0">
+            <a:schemeClr val="accent1"/>
+          </a:effectRef>
+          <a:fontRef idx="minor">
+            <a:schemeClr val="tx1"/>
+          </a:fontRef>
+        </p:style>
+      </p:cxnSp>
+      <p:pic>
+        <p:nvPicPr>
+          <p:cNvPr id="30" name="Picture 2" descr="Risultati immagini per broker.hivemq"/>
+          <p:cNvPicPr>
+            <a:picLocks noChangeAspect="1" noChangeArrowheads="1"/>
+          </p:cNvPicPr>
+          <p:nvPr/>
+        </p:nvPicPr>
+        <p:blipFill>
+          <a:blip r:embed="rId8" cstate="print">
+            <a:extLst>
+              <a:ext uri="{28A0092B-C50C-407E-A947-70E740481C1C}">
+                <a14:useLocalDpi xmlns:a14="http://schemas.microsoft.com/office/drawing/2010/main" val="0"/>
+              </a:ext>
+            </a:extLst>
+          </a:blip>
+          <a:srcRect/>
+          <a:stretch>
+            <a:fillRect/>
+          </a:stretch>
+        </p:blipFill>
+        <p:spPr bwMode="auto">
+          <a:xfrm>
+            <a:off x="5449814" y="877436"/>
+            <a:ext cx="854308" cy="578082"/>
+          </a:xfrm>
+          <a:prstGeom prst="rect">
+            <a:avLst/>
+          </a:prstGeom>
+          <a:ln>
+            <a:solidFill>
+              <a:schemeClr val="tx2"/>
+            </a:solidFill>
+          </a:ln>
+          <a:extLst>
+            <a:ext uri="{909E8E84-426E-40DD-AFC4-6F175D3DCCD1}">
+              <a14:hiddenFill xmlns:a14="http://schemas.microsoft.com/office/drawing/2010/main">
+                <a:solidFill>
+                  <a:srgbClr val="FFFFFF"/>
+                </a:solidFill>
+              </a14:hiddenFill>
+            </a:ext>
+          </a:extLst>
+        </p:spPr>
+      </p:pic>
+      <p:sp>
+        <p:nvSpPr>
+          <p:cNvPr id="31" name="Rettangolo 30"/>
+          <p:cNvSpPr/>
+          <p:nvPr/>
+        </p:nvSpPr>
+        <p:spPr>
+          <a:xfrm>
+            <a:off x="159610" y="2227877"/>
+            <a:ext cx="2808312" cy="1752007"/>
+          </a:xfrm>
+          <a:prstGeom prst="rect">
+            <a:avLst/>
+          </a:prstGeom>
+          <a:noFill/>
+          <a:ln>
+            <a:solidFill>
+              <a:srgbClr val="FF0000"/>
+            </a:solidFill>
+          </a:ln>
+        </p:spPr>
+        <p:style>
+          <a:lnRef idx="2">
+            <a:schemeClr val="accent1">
+              <a:shade val="50000"/>
+            </a:schemeClr>
+          </a:lnRef>
+          <a:fillRef idx="1">
+            <a:schemeClr val="accent1"/>
+          </a:fillRef>
+          <a:effectRef idx="0">
+            <a:schemeClr val="accent1"/>
+          </a:effectRef>
+          <a:fontRef idx="minor">
+            <a:schemeClr val="lt1"/>
+          </a:fontRef>
+        </p:style>
+        <p:txBody>
+          <a:bodyPr rtlCol="0" anchor="ctr"/>
+          <a:lstStyle/>
+          <a:p>
+            <a:pPr algn="ctr"/>
+            <a:endParaRPr lang="it-IT"/>
+          </a:p>
+        </p:txBody>
+      </p:sp>
+      <p:cxnSp>
+        <p:nvCxnSpPr>
+          <p:cNvPr id="39" name="Connettore 2 38"/>
+          <p:cNvCxnSpPr>
+            <a:stCxn id="31" idx="3"/>
+            <a:endCxn id="13" idx="2"/>
+          </p:cNvCxnSpPr>
+          <p:nvPr/>
+        </p:nvCxnSpPr>
+        <p:spPr>
+          <a:xfrm flipV="1">
+            <a:off x="2967922" y="2384884"/>
+            <a:ext cx="673781" cy="718997"/>
+          </a:xfrm>
+          <a:prstGeom prst="straightConnector1">
+            <a:avLst/>
+          </a:prstGeom>
+          <a:ln>
+            <a:headEnd type="arrow"/>
+            <a:tailEnd type="arrow"/>
+          </a:ln>
+        </p:spPr>
+        <p:style>
+          <a:lnRef idx="1">
+            <a:schemeClr val="accent1"/>
+          </a:lnRef>
+          <a:fillRef idx="0">
+            <a:schemeClr val="accent1"/>
+          </a:fillRef>
+          <a:effectRef idx="0">
+            <a:schemeClr val="accent1"/>
+          </a:effectRef>
+          <a:fontRef idx="minor">
+            <a:schemeClr val="tx1"/>
+          </a:fontRef>
+        </p:style>
+      </p:cxnSp>
+      <p:pic>
+        <p:nvPicPr>
+          <p:cNvPr id="1028" name="Picture 4" descr="Risultati immagini per amazon aws"/>
+          <p:cNvPicPr>
+            <a:picLocks noChangeAspect="1" noChangeArrowheads="1"/>
+          </p:cNvPicPr>
+          <p:nvPr/>
+        </p:nvPicPr>
+        <p:blipFill>
+          <a:blip r:embed="rId9" cstate="print">
+            <a:extLst>
+              <a:ext uri="{28A0092B-C50C-407E-A947-70E740481C1C}">
+                <a14:useLocalDpi xmlns:a14="http://schemas.microsoft.com/office/drawing/2010/main" val="0"/>
+              </a:ext>
+            </a:extLst>
+          </a:blip>
+          <a:srcRect/>
+          <a:stretch>
+            <a:fillRect/>
+          </a:stretch>
+        </p:blipFill>
+        <p:spPr bwMode="auto">
+          <a:xfrm>
+            <a:off x="318682" y="1204053"/>
+            <a:ext cx="2185438" cy="1229309"/>
+          </a:xfrm>
+          <a:prstGeom prst="rect">
+            <a:avLst/>
+          </a:prstGeom>
+          <a:noFill/>
+          <a:extLst>
+            <a:ext uri="{909E8E84-426E-40DD-AFC4-6F175D3DCCD1}">
+              <a14:hiddenFill xmlns:a14="http://schemas.microsoft.com/office/drawing/2010/main">
+                <a:solidFill>
+                  <a:srgbClr val="FFFFFF"/>
+                </a:solidFill>
+              </a14:hiddenFill>
+            </a:ext>
+          </a:extLst>
+        </p:spPr>
+      </p:pic>
+    </p:spTree>
+    <p:extLst>
+      <p:ext uri="{BB962C8B-B14F-4D97-AF65-F5344CB8AC3E}">
+        <p14:creationId xmlns:p14="http://schemas.microsoft.com/office/powerpoint/2010/main" val="1358064436"/>
+      </p:ext>
+    </p:extLst>
   </p:cSld>
   <p:clrMapOvr>
     <a:masterClrMapping/>

</xml_diff>